<commit_message>
create the structure to code dfg, finish part of transform from PN to dfg
</commit_message>
<xml_diff>
--- a/official_report/MasterThesis_Report_02_BaseLine.pptx
+++ b/official_report/MasterThesis_Report_02_BaseLine.pptx
@@ -4076,7 +4076,7 @@
         <p:spPr>
           <a:xfrm>
             <a:off x="7203960" y="6043680"/>
-            <a:ext cx="1776240" cy="811080"/>
+            <a:ext cx="1775880" cy="810720"/>
           </a:xfrm>
           <a:prstGeom prst="rect">
             <a:avLst/>
@@ -4095,7 +4095,7 @@
         <p:spPr>
           <a:xfrm>
             <a:off x="1123920" y="6227640"/>
-            <a:ext cx="4248000" cy="627120"/>
+            <a:ext cx="4247640" cy="626760"/>
           </a:xfrm>
           <a:prstGeom prst="rect">
             <a:avLst/>
@@ -4220,7 +4220,7 @@
         <p:spPr>
           <a:xfrm>
             <a:off x="-2245320" y="5412240"/>
-            <a:ext cx="2030040" cy="1458000"/>
+            <a:ext cx="2029680" cy="1457640"/>
           </a:xfrm>
           <a:prstGeom prst="rect">
             <a:avLst/>
@@ -4289,7 +4289,7 @@
         <p:spPr>
           <a:xfrm>
             <a:off x="-2246400" y="506520"/>
-            <a:ext cx="2063520" cy="4655880"/>
+            <a:ext cx="2063160" cy="4655520"/>
           </a:xfrm>
           <a:prstGeom prst="rect">
             <a:avLst/>
@@ -4468,7 +4468,7 @@
         <p:spPr>
           <a:xfrm>
             <a:off x="9231480" y="506520"/>
-            <a:ext cx="2063520" cy="4960440"/>
+            <a:ext cx="2063160" cy="4960080"/>
           </a:xfrm>
           <a:prstGeom prst="rect">
             <a:avLst/>
@@ -4547,7 +4547,7 @@
             </a:endParaRPr>
           </a:p>
           <a:p>
-            <a:pPr marL="228600" indent="-225360">
+            <a:pPr marL="228600" indent="-225000">
               <a:lnSpc>
                 <a:spcPct val="100000"/>
               </a:lnSpc>
@@ -4602,7 +4602,7 @@
             </a:endParaRPr>
           </a:p>
           <a:p>
-            <a:pPr marL="228600" indent="-225360">
+            <a:pPr marL="228600" indent="-225000">
               <a:lnSpc>
                 <a:spcPct val="100000"/>
               </a:lnSpc>
@@ -4667,7 +4667,7 @@
             </a:endParaRPr>
           </a:p>
           <a:p>
-            <a:pPr marL="228600" indent="-225360">
+            <a:pPr marL="228600" indent="-225000">
               <a:lnSpc>
                 <a:spcPct val="100000"/>
               </a:lnSpc>
@@ -4692,7 +4692,7 @@
             </a:endParaRPr>
           </a:p>
           <a:p>
-            <a:pPr marL="228600" indent="-225360">
+            <a:pPr marL="228600" indent="-225000">
               <a:lnSpc>
                 <a:spcPct val="100000"/>
               </a:lnSpc>
@@ -4777,7 +4777,7 @@
             </a:endParaRPr>
           </a:p>
           <a:p>
-            <a:pPr marL="228600" indent="-225360">
+            <a:pPr marL="228600" indent="-225000">
               <a:lnSpc>
                 <a:spcPct val="100000"/>
               </a:lnSpc>
@@ -4802,7 +4802,7 @@
             </a:endParaRPr>
           </a:p>
           <a:p>
-            <a:pPr marL="228600" indent="-225360">
+            <a:pPr marL="228600" indent="-225000">
               <a:lnSpc>
                 <a:spcPct val="100000"/>
               </a:lnSpc>
@@ -4857,7 +4857,7 @@
             </a:endParaRPr>
           </a:p>
           <a:p>
-            <a:pPr marL="228600" indent="-225360">
+            <a:pPr marL="228600" indent="-225000">
               <a:lnSpc>
                 <a:spcPct val="100000"/>
               </a:lnSpc>
@@ -4912,7 +4912,7 @@
         <p:spPr>
           <a:xfrm>
             <a:off x="0" y="0"/>
-            <a:ext cx="9140760" cy="2309760"/>
+            <a:ext cx="9140400" cy="2309400"/>
           </a:xfrm>
           <a:prstGeom prst="rect">
             <a:avLst/>
@@ -4944,7 +4944,7 @@
         <p:spPr>
           <a:xfrm>
             <a:off x="7203960" y="6043680"/>
-            <a:ext cx="1776240" cy="811080"/>
+            <a:ext cx="1775880" cy="810720"/>
           </a:xfrm>
           <a:prstGeom prst="rect">
             <a:avLst/>
@@ -4963,7 +4963,7 @@
         <p:spPr>
           <a:xfrm>
             <a:off x="-1820880" y="531720"/>
-            <a:ext cx="1638360" cy="1305000"/>
+            <a:ext cx="1638000" cy="1304640"/>
           </a:xfrm>
           <a:prstGeom prst="rect">
             <a:avLst/>
@@ -5002,7 +5002,7 @@
             </a:endParaRPr>
           </a:p>
           <a:p>
-            <a:pPr marL="171360" indent="-168120">
+            <a:pPr marL="171360" indent="-167760">
               <a:lnSpc>
                 <a:spcPct val="100000"/>
               </a:lnSpc>
@@ -5027,7 +5027,7 @@
             </a:endParaRPr>
           </a:p>
           <a:p>
-            <a:pPr marL="171360" indent="-168120">
+            <a:pPr marL="171360" indent="-167760">
               <a:lnSpc>
                 <a:spcPct val="100000"/>
               </a:lnSpc>
@@ -5170,79 +5170,7 @@
               <a:rPr b="0" lang="en-US" sz="4400" spc="-1" strike="noStrike">
                 <a:latin typeface="Arial"/>
               </a:rPr>
-              <a:t>Cli</a:t>
-            </a:r>
-            <a:r>
-              <a:rPr b="0" lang="en-US" sz="4400" spc="-1" strike="noStrike">
-                <a:latin typeface="Arial"/>
-              </a:rPr>
-              <a:t>ck </a:t>
-            </a:r>
-            <a:r>
-              <a:rPr b="0" lang="en-US" sz="4400" spc="-1" strike="noStrike">
-                <a:latin typeface="Arial"/>
-              </a:rPr>
-              <a:t>to </a:t>
-            </a:r>
-            <a:r>
-              <a:rPr b="0" lang="en-US" sz="4400" spc="-1" strike="noStrike">
-                <a:latin typeface="Arial"/>
-              </a:rPr>
-              <a:t>edi</a:t>
-            </a:r>
-            <a:r>
-              <a:rPr b="0" lang="en-US" sz="4400" spc="-1" strike="noStrike">
-                <a:latin typeface="Arial"/>
-              </a:rPr>
-              <a:t>t </a:t>
-            </a:r>
-            <a:r>
-              <a:rPr b="0" lang="en-US" sz="4400" spc="-1" strike="noStrike">
-                <a:latin typeface="Arial"/>
-              </a:rPr>
-              <a:t>the </a:t>
-            </a:r>
-            <a:r>
-              <a:rPr b="0" lang="en-US" sz="4400" spc="-1" strike="noStrike">
-                <a:latin typeface="Arial"/>
-              </a:rPr>
-              <a:t>titl</a:t>
-            </a:r>
-            <a:r>
-              <a:rPr b="0" lang="en-US" sz="4400" spc="-1" strike="noStrike">
-                <a:latin typeface="Arial"/>
-              </a:rPr>
-              <a:t>e </a:t>
-            </a:r>
-            <a:r>
-              <a:rPr b="0" lang="en-US" sz="4400" spc="-1" strike="noStrike">
-                <a:latin typeface="Arial"/>
-              </a:rPr>
-              <a:t>tex</a:t>
-            </a:r>
-            <a:r>
-              <a:rPr b="0" lang="en-US" sz="4400" spc="-1" strike="noStrike">
-                <a:latin typeface="Arial"/>
-              </a:rPr>
-              <a:t>t </a:t>
-            </a:r>
-            <a:r>
-              <a:rPr b="0" lang="en-US" sz="4400" spc="-1" strike="noStrike">
-                <a:latin typeface="Arial"/>
-              </a:rPr>
-              <a:t>for</a:t>
-            </a:r>
-            <a:r>
-              <a:rPr b="0" lang="en-US" sz="4400" spc="-1" strike="noStrike">
-                <a:latin typeface="Arial"/>
-              </a:rPr>
-              <a:t>ma</a:t>
-            </a:r>
-            <a:r>
-              <a:rPr b="0" lang="en-US" sz="4400" spc="-1" strike="noStrike">
-                <a:latin typeface="Arial"/>
-              </a:rPr>
-              <a:t>t</a:t>
+              <a:t>Click to edit the title text format</a:t>
             </a:r>
             <a:endParaRPr b="0" lang="en-US" sz="4400" spc="-1" strike="noStrike">
               <a:latin typeface="Arial"/>
@@ -5486,7 +5414,7 @@
         <p:spPr>
           <a:xfrm>
             <a:off x="5229720" y="5943600"/>
-            <a:ext cx="3911400" cy="911520"/>
+            <a:ext cx="3911040" cy="911160"/>
           </a:xfrm>
           <a:prstGeom prst="rect">
             <a:avLst/>
@@ -5504,8 +5432,8 @@
         </p:nvSpPr>
         <p:spPr>
           <a:xfrm rot="21598800">
-            <a:off x="1188720" y="6037920"/>
-            <a:ext cx="2740320" cy="454320"/>
+            <a:off x="1188720" y="6037560"/>
+            <a:ext cx="2739960" cy="453960"/>
           </a:xfrm>
           <a:prstGeom prst="rect">
             <a:avLst/>
@@ -5650,7 +5578,7 @@
         <p:spPr>
           <a:xfrm>
             <a:off x="-2245320" y="5412240"/>
-            <a:ext cx="2030040" cy="1458000"/>
+            <a:ext cx="2029680" cy="1457640"/>
           </a:xfrm>
           <a:prstGeom prst="rect">
             <a:avLst/>
@@ -5719,7 +5647,7 @@
         <p:spPr>
           <a:xfrm>
             <a:off x="-2246400" y="506520"/>
-            <a:ext cx="2063520" cy="4655880"/>
+            <a:ext cx="2063160" cy="4655520"/>
           </a:xfrm>
           <a:prstGeom prst="rect">
             <a:avLst/>
@@ -5898,7 +5826,7 @@
         <p:spPr>
           <a:xfrm>
             <a:off x="9231480" y="506520"/>
-            <a:ext cx="2063520" cy="4960440"/>
+            <a:ext cx="2063160" cy="4960080"/>
           </a:xfrm>
           <a:prstGeom prst="rect">
             <a:avLst/>
@@ -5977,7 +5905,7 @@
             </a:endParaRPr>
           </a:p>
           <a:p>
-            <a:pPr marL="228600" indent="-225360">
+            <a:pPr marL="228600" indent="-225000">
               <a:lnSpc>
                 <a:spcPct val="100000"/>
               </a:lnSpc>
@@ -6032,7 +5960,7 @@
             </a:endParaRPr>
           </a:p>
           <a:p>
-            <a:pPr marL="228600" indent="-225360">
+            <a:pPr marL="228600" indent="-225000">
               <a:lnSpc>
                 <a:spcPct val="100000"/>
               </a:lnSpc>
@@ -6097,7 +6025,7 @@
             </a:endParaRPr>
           </a:p>
           <a:p>
-            <a:pPr marL="228600" indent="-225360">
+            <a:pPr marL="228600" indent="-225000">
               <a:lnSpc>
                 <a:spcPct val="100000"/>
               </a:lnSpc>
@@ -6122,7 +6050,7 @@
             </a:endParaRPr>
           </a:p>
           <a:p>
-            <a:pPr marL="228600" indent="-225360">
+            <a:pPr marL="228600" indent="-225000">
               <a:lnSpc>
                 <a:spcPct val="100000"/>
               </a:lnSpc>
@@ -6207,7 +6135,7 @@
             </a:endParaRPr>
           </a:p>
           <a:p>
-            <a:pPr marL="228600" indent="-225360">
+            <a:pPr marL="228600" indent="-225000">
               <a:lnSpc>
                 <a:spcPct val="100000"/>
               </a:lnSpc>
@@ -6232,7 +6160,7 @@
             </a:endParaRPr>
           </a:p>
           <a:p>
-            <a:pPr marL="228600" indent="-225360">
+            <a:pPr marL="228600" indent="-225000">
               <a:lnSpc>
                 <a:spcPct val="100000"/>
               </a:lnSpc>
@@ -6287,7 +6215,7 @@
             </a:endParaRPr>
           </a:p>
           <a:p>
-            <a:pPr marL="228600" indent="-225360">
+            <a:pPr marL="228600" indent="-225000">
               <a:lnSpc>
                 <a:spcPct val="100000"/>
               </a:lnSpc>
@@ -6360,19 +6288,7 @@
               <a:rPr b="0" lang="en-US" sz="4400" spc="-1" strike="noStrike">
                 <a:latin typeface="Arial"/>
               </a:rPr>
-              <a:t>Click to edit </a:t>
-            </a:r>
-            <a:r>
-              <a:rPr b="0" lang="en-US" sz="4400" spc="-1" strike="noStrike">
-                <a:latin typeface="Arial"/>
-              </a:rPr>
-              <a:t>the title text </a:t>
-            </a:r>
-            <a:r>
-              <a:rPr b="0" lang="en-US" sz="4400" spc="-1" strike="noStrike">
-                <a:latin typeface="Arial"/>
-              </a:rPr>
-              <a:t>format</a:t>
+              <a:t>Click to edit the title text format</a:t>
             </a:r>
             <a:endParaRPr b="0" lang="en-US" sz="4400" spc="-1" strike="noStrike">
               <a:latin typeface="Arial"/>
@@ -6616,7 +6532,7 @@
         <p:spPr>
           <a:xfrm>
             <a:off x="7203960" y="6043680"/>
-            <a:ext cx="1776240" cy="811080"/>
+            <a:ext cx="1775880" cy="810720"/>
           </a:xfrm>
           <a:prstGeom prst="rect">
             <a:avLst/>
@@ -6635,7 +6551,7 @@
         <p:spPr>
           <a:xfrm>
             <a:off x="1123920" y="6227640"/>
-            <a:ext cx="4248000" cy="627120"/>
+            <a:ext cx="4247640" cy="626760"/>
           </a:xfrm>
           <a:prstGeom prst="rect">
             <a:avLst/>
@@ -6760,7 +6676,7 @@
         <p:spPr>
           <a:xfrm>
             <a:off x="-2245320" y="5412240"/>
-            <a:ext cx="2030040" cy="1458000"/>
+            <a:ext cx="2029680" cy="1457640"/>
           </a:xfrm>
           <a:prstGeom prst="rect">
             <a:avLst/>
@@ -6829,7 +6745,7 @@
         <p:spPr>
           <a:xfrm>
             <a:off x="-2246400" y="506520"/>
-            <a:ext cx="2063520" cy="4655880"/>
+            <a:ext cx="2063160" cy="4655520"/>
           </a:xfrm>
           <a:prstGeom prst="rect">
             <a:avLst/>
@@ -7008,7 +6924,7 @@
         <p:spPr>
           <a:xfrm>
             <a:off x="9231480" y="506520"/>
-            <a:ext cx="2063520" cy="4960440"/>
+            <a:ext cx="2063160" cy="4960080"/>
           </a:xfrm>
           <a:prstGeom prst="rect">
             <a:avLst/>
@@ -7087,7 +7003,7 @@
             </a:endParaRPr>
           </a:p>
           <a:p>
-            <a:pPr marL="228600" indent="-225360">
+            <a:pPr marL="228600" indent="-225000">
               <a:lnSpc>
                 <a:spcPct val="100000"/>
               </a:lnSpc>
@@ -7142,7 +7058,7 @@
             </a:endParaRPr>
           </a:p>
           <a:p>
-            <a:pPr marL="228600" indent="-225360">
+            <a:pPr marL="228600" indent="-225000">
               <a:lnSpc>
                 <a:spcPct val="100000"/>
               </a:lnSpc>
@@ -7207,7 +7123,7 @@
             </a:endParaRPr>
           </a:p>
           <a:p>
-            <a:pPr marL="228600" indent="-225360">
+            <a:pPr marL="228600" indent="-225000">
               <a:lnSpc>
                 <a:spcPct val="100000"/>
               </a:lnSpc>
@@ -7232,7 +7148,7 @@
             </a:endParaRPr>
           </a:p>
           <a:p>
-            <a:pPr marL="228600" indent="-225360">
+            <a:pPr marL="228600" indent="-225000">
               <a:lnSpc>
                 <a:spcPct val="100000"/>
               </a:lnSpc>
@@ -7317,7 +7233,7 @@
             </a:endParaRPr>
           </a:p>
           <a:p>
-            <a:pPr marL="228600" indent="-225360">
+            <a:pPr marL="228600" indent="-225000">
               <a:lnSpc>
                 <a:spcPct val="100000"/>
               </a:lnSpc>
@@ -7342,7 +7258,7 @@
             </a:endParaRPr>
           </a:p>
           <a:p>
-            <a:pPr marL="228600" indent="-225360">
+            <a:pPr marL="228600" indent="-225000">
               <a:lnSpc>
                 <a:spcPct val="100000"/>
               </a:lnSpc>
@@ -7397,7 +7313,7 @@
             </a:endParaRPr>
           </a:p>
           <a:p>
-            <a:pPr marL="228600" indent="-225360">
+            <a:pPr marL="228600" indent="-225000">
               <a:lnSpc>
                 <a:spcPct val="100000"/>
               </a:lnSpc>
@@ -7452,7 +7368,7 @@
         <p:spPr>
           <a:xfrm>
             <a:off x="0" y="0"/>
-            <a:ext cx="9140760" cy="2309760"/>
+            <a:ext cx="9140400" cy="2309400"/>
           </a:xfrm>
           <a:prstGeom prst="rect">
             <a:avLst/>
@@ -7484,7 +7400,7 @@
         <p:spPr>
           <a:xfrm>
             <a:off x="7203960" y="6043680"/>
-            <a:ext cx="1776240" cy="811080"/>
+            <a:ext cx="1775880" cy="810720"/>
           </a:xfrm>
           <a:prstGeom prst="rect">
             <a:avLst/>
@@ -7503,7 +7419,7 @@
         <p:spPr>
           <a:xfrm>
             <a:off x="-1820880" y="531720"/>
-            <a:ext cx="1638360" cy="1305000"/>
+            <a:ext cx="1638000" cy="1304640"/>
           </a:xfrm>
           <a:prstGeom prst="rect">
             <a:avLst/>
@@ -7542,7 +7458,7 @@
             </a:endParaRPr>
           </a:p>
           <a:p>
-            <a:pPr marL="171360" indent="-168120">
+            <a:pPr marL="171360" indent="-167760">
               <a:lnSpc>
                 <a:spcPct val="100000"/>
               </a:lnSpc>
@@ -7567,7 +7483,7 @@
             </a:endParaRPr>
           </a:p>
           <a:p>
-            <a:pPr marL="171360" indent="-168120">
+            <a:pPr marL="171360" indent="-167760">
               <a:lnSpc>
                 <a:spcPct val="100000"/>
               </a:lnSpc>
@@ -7710,49 +7626,7 @@
               <a:rPr b="0" lang="en-US" sz="4400" spc="-1" strike="noStrike">
                 <a:latin typeface="Arial"/>
               </a:rPr>
-              <a:t>Clic</a:t>
-            </a:r>
-            <a:r>
-              <a:rPr b="0" lang="en-US" sz="4400" spc="-1" strike="noStrike">
-                <a:latin typeface="Arial"/>
-              </a:rPr>
-              <a:t>k to </a:t>
-            </a:r>
-            <a:r>
-              <a:rPr b="0" lang="en-US" sz="4400" spc="-1" strike="noStrike">
-                <a:latin typeface="Arial"/>
-              </a:rPr>
-              <a:t>edit </a:t>
-            </a:r>
-            <a:r>
-              <a:rPr b="0" lang="en-US" sz="4400" spc="-1" strike="noStrike">
-                <a:latin typeface="Arial"/>
-              </a:rPr>
-              <a:t>the </a:t>
-            </a:r>
-            <a:r>
-              <a:rPr b="0" lang="en-US" sz="4400" spc="-1" strike="noStrike">
-                <a:latin typeface="Arial"/>
-              </a:rPr>
-              <a:t>title </a:t>
-            </a:r>
-            <a:r>
-              <a:rPr b="0" lang="en-US" sz="4400" spc="-1" strike="noStrike">
-                <a:latin typeface="Arial"/>
-              </a:rPr>
-              <a:t>text </a:t>
-            </a:r>
-            <a:r>
-              <a:rPr b="0" lang="en-US" sz="4400" spc="-1" strike="noStrike">
-                <a:latin typeface="Arial"/>
-              </a:rPr>
-              <a:t>form</a:t>
-            </a:r>
-            <a:r>
-              <a:rPr b="0" lang="en-US" sz="4400" spc="-1" strike="noStrike">
-                <a:latin typeface="Arial"/>
-              </a:rPr>
-              <a:t>at</a:t>
+              <a:t>Click to edit the title text format</a:t>
             </a:r>
             <a:endParaRPr b="0" lang="en-US" sz="4400" spc="-1" strike="noStrike">
               <a:latin typeface="Arial"/>
@@ -7985,7 +7859,7 @@
         <p:spPr>
           <a:xfrm>
             <a:off x="300600" y="2761920"/>
-            <a:ext cx="8566200" cy="801360"/>
+            <a:ext cx="8565840" cy="801000"/>
           </a:xfrm>
           <a:prstGeom prst="rect">
             <a:avLst/>
@@ -8070,7 +7944,7 @@
         <p:spPr>
           <a:xfrm>
             <a:off x="457200" y="3474720"/>
-            <a:ext cx="8318160" cy="2282760"/>
+            <a:ext cx="8317800" cy="2282400"/>
           </a:xfrm>
           <a:prstGeom prst="rect">
             <a:avLst/>
@@ -8257,7 +8131,7 @@
         <p:spPr>
           <a:xfrm>
             <a:off x="5478840" y="6054480"/>
-            <a:ext cx="3375000" cy="800280"/>
+            <a:ext cx="3374640" cy="799920"/>
           </a:xfrm>
           <a:prstGeom prst="rect">
             <a:avLst/>
@@ -8329,7 +8203,7 @@
         <p:spPr>
           <a:xfrm>
             <a:off x="3931920" y="3108960"/>
-            <a:ext cx="5213880" cy="1004760"/>
+            <a:ext cx="5213520" cy="1004400"/>
           </a:xfrm>
           <a:prstGeom prst="rect">
             <a:avLst/>
@@ -8348,7 +8222,7 @@
         <p:spPr>
           <a:xfrm>
             <a:off x="365760" y="274320"/>
-            <a:ext cx="8318160" cy="816120"/>
+            <a:ext cx="8317800" cy="815760"/>
           </a:xfrm>
           <a:prstGeom prst="rect">
             <a:avLst/>
@@ -8397,7 +8271,7 @@
         <p:spPr>
           <a:xfrm>
             <a:off x="457200" y="1005840"/>
-            <a:ext cx="8135280" cy="4406040"/>
+            <a:ext cx="8134920" cy="4405680"/>
           </a:xfrm>
           <a:prstGeom prst="rect">
             <a:avLst/>
@@ -8856,7 +8730,7 @@
         <p:spPr>
           <a:xfrm>
             <a:off x="6858000" y="2834640"/>
-            <a:ext cx="1095480" cy="273240"/>
+            <a:ext cx="1095120" cy="272880"/>
           </a:xfrm>
           <a:prstGeom prst="rect">
             <a:avLst/>
@@ -8905,7 +8779,7 @@
         <p:spPr>
           <a:xfrm>
             <a:off x="4846320" y="1249200"/>
-            <a:ext cx="912600" cy="256320"/>
+            <a:ext cx="912240" cy="255960"/>
           </a:xfrm>
           <a:prstGeom prst="rect">
             <a:avLst/>
@@ -8954,7 +8828,7 @@
         <p:spPr>
           <a:xfrm>
             <a:off x="6950160" y="3931920"/>
-            <a:ext cx="1369800" cy="273240"/>
+            <a:ext cx="1369440" cy="272880"/>
           </a:xfrm>
           <a:prstGeom prst="rect">
             <a:avLst/>
@@ -9003,7 +8877,7 @@
         <p:spPr>
           <a:xfrm>
             <a:off x="3932640" y="5669280"/>
-            <a:ext cx="1369800" cy="273240"/>
+            <a:ext cx="1369440" cy="272880"/>
           </a:xfrm>
           <a:prstGeom prst="rect">
             <a:avLst/>
@@ -9052,7 +8926,7 @@
         <p:spPr>
           <a:xfrm>
             <a:off x="5944320" y="4937760"/>
-            <a:ext cx="1369800" cy="273240"/>
+            <a:ext cx="1369440" cy="272880"/>
           </a:xfrm>
           <a:prstGeom prst="rect">
             <a:avLst/>
@@ -9105,7 +8979,7 @@
         <p:spPr>
           <a:xfrm>
             <a:off x="4663440" y="1828800"/>
-            <a:ext cx="4479480" cy="1004760"/>
+            <a:ext cx="4479120" cy="1004400"/>
           </a:xfrm>
           <a:prstGeom prst="rect">
             <a:avLst/>
@@ -9128,7 +9002,7 @@
         <p:spPr>
           <a:xfrm>
             <a:off x="5394960" y="4241520"/>
-            <a:ext cx="3843720" cy="786600"/>
+            <a:ext cx="3843360" cy="786240"/>
           </a:xfrm>
           <a:prstGeom prst="rect">
             <a:avLst/>
@@ -9151,7 +9025,7 @@
         <p:spPr>
           <a:xfrm>
             <a:off x="4739040" y="5212080"/>
-            <a:ext cx="4488840" cy="913320"/>
+            <a:ext cx="4488480" cy="912960"/>
           </a:xfrm>
           <a:prstGeom prst="rect">
             <a:avLst/>
@@ -9174,7 +9048,7 @@
         <p:spPr>
           <a:xfrm>
             <a:off x="5486400" y="947520"/>
-            <a:ext cx="3589560" cy="788760"/>
+            <a:ext cx="3589200" cy="788400"/>
           </a:xfrm>
           <a:prstGeom prst="rect">
             <a:avLst/>
@@ -9242,7 +9116,7 @@
         <p:spPr>
           <a:xfrm>
             <a:off x="365760" y="274320"/>
-            <a:ext cx="8318160" cy="816120"/>
+            <a:ext cx="8317800" cy="815760"/>
           </a:xfrm>
           <a:prstGeom prst="rect">
             <a:avLst/>
@@ -9291,7 +9165,7 @@
         <p:spPr>
           <a:xfrm>
             <a:off x="457200" y="1005840"/>
-            <a:ext cx="8135280" cy="4406040"/>
+            <a:ext cx="8134920" cy="4405680"/>
           </a:xfrm>
           <a:prstGeom prst="rect">
             <a:avLst/>
@@ -9346,7 +9220,7 @@
             </a:endParaRPr>
           </a:p>
           <a:p>
-            <a:pPr marL="216000" indent="-213120">
+            <a:pPr marL="216000" indent="-212760">
               <a:lnSpc>
                 <a:spcPct val="100000"/>
               </a:lnSpc>
@@ -9378,7 +9252,7 @@
             </a:endParaRPr>
           </a:p>
           <a:p>
-            <a:pPr marL="216000" indent="-213120">
+            <a:pPr marL="216000" indent="-212760">
               <a:lnSpc>
                 <a:spcPct val="100000"/>
               </a:lnSpc>
@@ -9410,7 +9284,7 @@
             </a:endParaRPr>
           </a:p>
           <a:p>
-            <a:pPr marL="216000" indent="-213120">
+            <a:pPr marL="216000" indent="-212760">
               <a:lnSpc>
                 <a:spcPct val="100000"/>
               </a:lnSpc>
@@ -9442,7 +9316,7 @@
             </a:endParaRPr>
           </a:p>
           <a:p>
-            <a:pPr marL="216000" indent="-213120">
+            <a:pPr marL="216000" indent="-212760">
               <a:lnSpc>
                 <a:spcPct val="100000"/>
               </a:lnSpc>
@@ -9542,7 +9416,7 @@
             </a:endParaRPr>
           </a:p>
           <a:p>
-            <a:pPr marL="216000" indent="-213120">
+            <a:pPr marL="216000" indent="-212760">
               <a:lnSpc>
                 <a:spcPct val="100000"/>
               </a:lnSpc>
@@ -9574,7 +9448,7 @@
             </a:endParaRPr>
           </a:p>
           <a:p>
-            <a:pPr marL="216000" indent="-213120">
+            <a:pPr marL="216000" indent="-212760">
               <a:lnSpc>
                 <a:spcPct val="100000"/>
               </a:lnSpc>
@@ -9606,7 +9480,7 @@
             </a:endParaRPr>
           </a:p>
           <a:p>
-            <a:pPr marL="216000" indent="-213120">
+            <a:pPr marL="216000" indent="-212760">
               <a:lnSpc>
                 <a:spcPct val="100000"/>
               </a:lnSpc>
@@ -9684,7 +9558,7 @@
         <p:spPr>
           <a:xfrm>
             <a:off x="4846320" y="1249200"/>
-            <a:ext cx="912600" cy="256320"/>
+            <a:ext cx="912240" cy="255960"/>
           </a:xfrm>
           <a:prstGeom prst="rect">
             <a:avLst/>
@@ -9737,7 +9611,7 @@
         <p:spPr>
           <a:xfrm>
             <a:off x="5303520" y="1958040"/>
-            <a:ext cx="2925000" cy="1332720"/>
+            <a:ext cx="2924640" cy="1332360"/>
           </a:xfrm>
           <a:prstGeom prst="rect">
             <a:avLst/>
@@ -9756,7 +9630,7 @@
         <p:spPr>
           <a:xfrm>
             <a:off x="7040880" y="3108960"/>
-            <a:ext cx="1369800" cy="335520"/>
+            <a:ext cx="1369440" cy="335160"/>
           </a:xfrm>
           <a:prstGeom prst="rect">
             <a:avLst/>
@@ -9809,7 +9683,7 @@
         <p:spPr>
           <a:xfrm>
             <a:off x="5119560" y="3839400"/>
-            <a:ext cx="3472920" cy="457200"/>
+            <a:ext cx="3472560" cy="456840"/>
           </a:xfrm>
           <a:prstGeom prst="rect">
             <a:avLst/>
@@ -9832,7 +9706,7 @@
         <p:spPr>
           <a:xfrm>
             <a:off x="4663440" y="4935960"/>
-            <a:ext cx="4393440" cy="457920"/>
+            <a:ext cx="4393080" cy="457560"/>
           </a:xfrm>
           <a:prstGeom prst="rect">
             <a:avLst/>
@@ -9851,7 +9725,7 @@
         <p:spPr>
           <a:xfrm>
             <a:off x="6217920" y="4297680"/>
-            <a:ext cx="1095480" cy="244800"/>
+            <a:ext cx="1095120" cy="244440"/>
           </a:xfrm>
           <a:prstGeom prst="rect">
             <a:avLst/>
@@ -9900,7 +9774,7 @@
         <p:spPr>
           <a:xfrm>
             <a:off x="6492960" y="5394960"/>
-            <a:ext cx="1095480" cy="244800"/>
+            <a:ext cx="1095120" cy="244440"/>
           </a:xfrm>
           <a:prstGeom prst="rect">
             <a:avLst/>
@@ -9953,7 +9827,7 @@
         <p:spPr>
           <a:xfrm>
             <a:off x="5461920" y="1038960"/>
-            <a:ext cx="3589560" cy="788760"/>
+            <a:ext cx="3589200" cy="788400"/>
           </a:xfrm>
           <a:prstGeom prst="rect">
             <a:avLst/>
@@ -10021,7 +9895,7 @@
         <p:spPr>
           <a:xfrm>
             <a:off x="365760" y="274320"/>
-            <a:ext cx="8318160" cy="816120"/>
+            <a:ext cx="8317800" cy="815760"/>
           </a:xfrm>
           <a:prstGeom prst="rect">
             <a:avLst/>
@@ -10070,7 +9944,7 @@
         <p:spPr>
           <a:xfrm>
             <a:off x="457200" y="822960"/>
-            <a:ext cx="8135280" cy="4406040"/>
+            <a:ext cx="8134920" cy="4405680"/>
           </a:xfrm>
           <a:prstGeom prst="rect">
             <a:avLst/>
@@ -10089,7 +9963,7 @@
         <p:txBody>
           <a:bodyPr lIns="90000" rIns="90000" tIns="45000" bIns="45000"/>
           <a:p>
-            <a:pPr marL="216000" indent="-213120">
+            <a:pPr marL="216000" indent="-212760">
               <a:lnSpc>
                 <a:spcPct val="100000"/>
               </a:lnSpc>
@@ -10141,7 +10015,7 @@
             </a:endParaRPr>
           </a:p>
           <a:p>
-            <a:pPr marL="216000" indent="-213120">
+            <a:pPr marL="216000" indent="-212760">
               <a:lnSpc>
                 <a:spcPct val="100000"/>
               </a:lnSpc>
@@ -10173,7 +10047,7 @@
             </a:endParaRPr>
           </a:p>
           <a:p>
-            <a:pPr marL="216000" indent="-214920">
+            <a:pPr marL="216000" indent="-214560">
               <a:lnSpc>
                 <a:spcPct val="100000"/>
               </a:lnSpc>
@@ -10259,7 +10133,7 @@
             </a:endParaRPr>
           </a:p>
           <a:p>
-            <a:pPr marL="216000" indent="-213120">
+            <a:pPr marL="216000" indent="-212760">
               <a:lnSpc>
                 <a:spcPct val="100000"/>
               </a:lnSpc>
@@ -10291,7 +10165,7 @@
             </a:endParaRPr>
           </a:p>
           <a:p>
-            <a:pPr marL="216000" indent="-213120">
+            <a:pPr marL="216000" indent="-212760">
               <a:lnSpc>
                 <a:spcPct val="100000"/>
               </a:lnSpc>
@@ -10323,7 +10197,7 @@
             </a:endParaRPr>
           </a:p>
           <a:p>
-            <a:pPr marL="216000" indent="-213120">
+            <a:pPr>
               <a:lnSpc>
                 <a:spcPct val="100000"/>
               </a:lnSpc>
@@ -10333,12 +10207,6 @@
               <a:spcAft>
                 <a:spcPts val="575"/>
               </a:spcAft>
-              <a:buClr>
-                <a:srgbClr val="000000"/>
-              </a:buClr>
-              <a:buSzPct val="45000"/>
-              <a:buFont typeface="Wingdings" charset="2"/>
-              <a:buChar char=""/>
             </a:pPr>
             <a:endParaRPr b="0" lang="en-US" sz="1300" spc="-1" strike="noStrike">
               <a:latin typeface="Arial"/>
@@ -10525,7 +10393,7 @@
             </a:endParaRPr>
           </a:p>
           <a:p>
-            <a:pPr marL="216000" indent="-213120">
+            <a:pPr>
               <a:lnSpc>
                 <a:spcPct val="100000"/>
               </a:lnSpc>
@@ -10535,12 +10403,6 @@
               <a:spcAft>
                 <a:spcPts val="575"/>
               </a:spcAft>
-              <a:buClr>
-                <a:srgbClr val="000000"/>
-              </a:buClr>
-              <a:buSzPct val="45000"/>
-              <a:buFont typeface="Wingdings" charset="2"/>
-              <a:buChar char=""/>
             </a:pPr>
             <a:endParaRPr b="0" lang="en-US" sz="1300" spc="-1" strike="noStrike">
               <a:latin typeface="Arial"/>
@@ -10609,7 +10471,7 @@
         <p:spPr>
           <a:xfrm>
             <a:off x="5120640" y="1371600"/>
-            <a:ext cx="912600" cy="256320"/>
+            <a:ext cx="912240" cy="255960"/>
           </a:xfrm>
           <a:prstGeom prst="rect">
             <a:avLst/>
@@ -10662,7 +10524,7 @@
         <p:spPr>
           <a:xfrm>
             <a:off x="5187600" y="1953360"/>
-            <a:ext cx="3589560" cy="788760"/>
+            <a:ext cx="3589200" cy="788400"/>
           </a:xfrm>
           <a:prstGeom prst="rect">
             <a:avLst/>
@@ -10685,7 +10547,7 @@
         <p:spPr>
           <a:xfrm>
             <a:off x="5463720" y="3840480"/>
-            <a:ext cx="3497400" cy="1645920"/>
+            <a:ext cx="3497040" cy="1645560"/>
           </a:xfrm>
           <a:prstGeom prst="rect">
             <a:avLst/>
@@ -10704,7 +10566,7 @@
         <p:spPr>
           <a:xfrm>
             <a:off x="5852160" y="5504400"/>
-            <a:ext cx="912600" cy="256320"/>
+            <a:ext cx="912240" cy="255960"/>
           </a:xfrm>
           <a:prstGeom prst="rect">
             <a:avLst/>
@@ -10806,7 +10668,7 @@
         <p:spPr>
           <a:xfrm>
             <a:off x="4389120" y="3108960"/>
-            <a:ext cx="4433040" cy="1186920"/>
+            <a:ext cx="4432680" cy="1186560"/>
           </a:xfrm>
           <a:prstGeom prst="rect">
             <a:avLst/>
@@ -10829,7 +10691,7 @@
         <p:spPr>
           <a:xfrm>
             <a:off x="4389120" y="1828800"/>
-            <a:ext cx="4425840" cy="914040"/>
+            <a:ext cx="4425480" cy="913680"/>
           </a:xfrm>
           <a:prstGeom prst="rect">
             <a:avLst/>
@@ -10848,7 +10710,7 @@
         <p:spPr>
           <a:xfrm>
             <a:off x="365760" y="274320"/>
-            <a:ext cx="8318160" cy="816120"/>
+            <a:ext cx="8317800" cy="815760"/>
           </a:xfrm>
           <a:prstGeom prst="rect">
             <a:avLst/>
@@ -10897,7 +10759,7 @@
         <p:spPr>
           <a:xfrm>
             <a:off x="457200" y="1005840"/>
-            <a:ext cx="8135280" cy="4406040"/>
+            <a:ext cx="8134920" cy="4405680"/>
           </a:xfrm>
           <a:prstGeom prst="rect">
             <a:avLst/>
@@ -10916,7 +10778,7 @@
         <p:txBody>
           <a:bodyPr lIns="90000" rIns="90000" tIns="45000" bIns="45000"/>
           <a:p>
-            <a:pPr marL="216000" indent="-213120">
+            <a:pPr marL="216000" indent="-212760">
               <a:lnSpc>
                 <a:spcPct val="100000"/>
               </a:lnSpc>
@@ -10994,7 +10856,7 @@
             </a:endParaRPr>
           </a:p>
           <a:p>
-            <a:pPr marL="216000" indent="-213120">
+            <a:pPr marL="216000" indent="-212760">
               <a:lnSpc>
                 <a:spcPct val="100000"/>
               </a:lnSpc>
@@ -11036,7 +10898,7 @@
             </a:endParaRPr>
           </a:p>
           <a:p>
-            <a:pPr marL="216000" indent="-213120">
+            <a:pPr marL="216000" indent="-212760">
               <a:lnSpc>
                 <a:spcPct val="100000"/>
               </a:lnSpc>
@@ -11078,7 +10940,7 @@
             </a:endParaRPr>
           </a:p>
           <a:p>
-            <a:pPr marL="216000" indent="-213120">
+            <a:pPr marL="216000" indent="-212760">
               <a:lnSpc>
                 <a:spcPct val="100000"/>
               </a:lnSpc>
@@ -11110,7 +10972,7 @@
             </a:endParaRPr>
           </a:p>
           <a:p>
-            <a:pPr marL="216000" indent="-213120">
+            <a:pPr marL="216000" indent="-212760">
               <a:lnSpc>
                 <a:spcPct val="100000"/>
               </a:lnSpc>
@@ -11142,7 +11004,7 @@
             </a:endParaRPr>
           </a:p>
           <a:p>
-            <a:pPr marL="216000" indent="-213120">
+            <a:pPr marL="216000" indent="-212760">
               <a:lnSpc>
                 <a:spcPct val="100000"/>
               </a:lnSpc>
@@ -11406,7 +11268,7 @@
         <p:spPr>
           <a:xfrm>
             <a:off x="5852160" y="4144680"/>
-            <a:ext cx="1369800" cy="518400"/>
+            <a:ext cx="1369440" cy="518040"/>
           </a:xfrm>
           <a:prstGeom prst="rect">
             <a:avLst/>
@@ -11455,7 +11317,7 @@
         <p:spPr>
           <a:xfrm>
             <a:off x="5669280" y="2744640"/>
-            <a:ext cx="1095480" cy="455400"/>
+            <a:ext cx="1095120" cy="455040"/>
           </a:xfrm>
           <a:prstGeom prst="rect">
             <a:avLst/>
@@ -11504,7 +11366,7 @@
         <p:spPr>
           <a:xfrm>
             <a:off x="5943600" y="1479240"/>
-            <a:ext cx="912600" cy="256320"/>
+            <a:ext cx="912240" cy="255960"/>
           </a:xfrm>
           <a:prstGeom prst="rect">
             <a:avLst/>
@@ -11557,7 +11419,7 @@
         <p:spPr>
           <a:xfrm>
             <a:off x="4390560" y="1126800"/>
-            <a:ext cx="4661640" cy="427320"/>
+            <a:ext cx="4661280" cy="426960"/>
           </a:xfrm>
           <a:prstGeom prst="rect">
             <a:avLst/>
@@ -11580,7 +11442,7 @@
         <p:spPr>
           <a:xfrm>
             <a:off x="5120640" y="4663440"/>
-            <a:ext cx="3648960" cy="1012680"/>
+            <a:ext cx="3648600" cy="1012320"/>
           </a:xfrm>
           <a:prstGeom prst="rect">
             <a:avLst/>
@@ -11599,7 +11461,7 @@
         <p:spPr>
           <a:xfrm>
             <a:off x="6036480" y="5676480"/>
-            <a:ext cx="912600" cy="256320"/>
+            <a:ext cx="912240" cy="255960"/>
           </a:xfrm>
           <a:prstGeom prst="rect">
             <a:avLst/>
@@ -11700,8 +11562,8 @@
         </p:blipFill>
         <p:spPr>
           <a:xfrm>
-            <a:off x="4663440" y="5244120"/>
-            <a:ext cx="4297320" cy="607680"/>
+            <a:off x="4390560" y="914400"/>
+            <a:ext cx="4661280" cy="426960"/>
           </a:xfrm>
           <a:prstGeom prst="rect">
             <a:avLst/>
@@ -11711,16 +11573,39 @@
           </a:ln>
         </p:spPr>
       </p:pic>
+      <p:pic>
+        <p:nvPicPr>
+          <p:cNvPr id="249" name="" descr=""/>
+          <p:cNvPicPr/>
+          <p:nvPr/>
+        </p:nvPicPr>
+        <p:blipFill>
+          <a:blip r:embed="rId2"/>
+          <a:stretch/>
+        </p:blipFill>
+        <p:spPr>
+          <a:xfrm>
+            <a:off x="4663440" y="5244120"/>
+            <a:ext cx="4296960" cy="607320"/>
+          </a:xfrm>
+          <a:prstGeom prst="rect">
+            <a:avLst/>
+          </a:prstGeom>
+          <a:ln>
+            <a:noFill/>
+          </a:ln>
+        </p:spPr>
+      </p:pic>
       <p:sp>
         <p:nvSpPr>
-          <p:cNvPr id="249" name="CustomShape 1"/>
+          <p:cNvPr id="250" name="CustomShape 1"/>
           <p:cNvSpPr/>
           <p:nvPr/>
         </p:nvSpPr>
         <p:spPr>
           <a:xfrm>
             <a:off x="365760" y="274320"/>
-            <a:ext cx="8318160" cy="816120"/>
+            <a:ext cx="8317800" cy="815760"/>
           </a:xfrm>
           <a:prstGeom prst="rect">
             <a:avLst/>
@@ -11762,14 +11647,14 @@
       </p:sp>
       <p:sp>
         <p:nvSpPr>
-          <p:cNvPr id="250" name="CustomShape 2"/>
+          <p:cNvPr id="251" name="CustomShape 2"/>
           <p:cNvSpPr/>
           <p:nvPr/>
         </p:nvSpPr>
         <p:spPr>
           <a:xfrm>
             <a:off x="457200" y="1005840"/>
-            <a:ext cx="8135280" cy="4406040"/>
+            <a:ext cx="8134920" cy="4405680"/>
           </a:xfrm>
           <a:prstGeom prst="rect">
             <a:avLst/>
@@ -12006,7 +11891,7 @@
             </a:endParaRPr>
           </a:p>
           <a:p>
-            <a:pPr marL="216000" indent="-213120">
+            <a:pPr marL="216000" indent="-212760">
               <a:lnSpc>
                 <a:spcPct val="100000"/>
               </a:lnSpc>
@@ -12048,7 +11933,7 @@
             </a:endParaRPr>
           </a:p>
           <a:p>
-            <a:pPr marL="216000" indent="-213120">
+            <a:pPr marL="216000" indent="-212760">
               <a:lnSpc>
                 <a:spcPct val="100000"/>
               </a:lnSpc>
@@ -12133,14 +12018,14 @@
                 <a:latin typeface="Times New Roman"/>
                 <a:ea typeface="DejaVu Sans"/>
               </a:rPr>
-              <a:t>Neg: 50&lt;A,B,C&gt; , 50&lt;A,B,B,C&gt;</a:t>
+              <a:t>Neg: 50&lt;A,B,C&gt; , 50&lt;A,B,C,B,C&gt;</a:t>
             </a:r>
             <a:endParaRPr b="0" lang="en-US" sz="1300" spc="-1" strike="noStrike">
               <a:latin typeface="Arial"/>
             </a:endParaRPr>
           </a:p>
           <a:p>
-            <a:pPr marL="216000" indent="-213120">
+            <a:pPr marL="216000" indent="-212760">
               <a:lnSpc>
                 <a:spcPct val="100000"/>
               </a:lnSpc>
@@ -12172,7 +12057,7 @@
             </a:endParaRPr>
           </a:p>
           <a:p>
-            <a:pPr marL="216000" indent="-213120">
+            <a:pPr marL="216000" indent="-212760">
               <a:lnSpc>
                 <a:spcPct val="100000"/>
               </a:lnSpc>
@@ -12204,7 +12089,7 @@
             </a:endParaRPr>
           </a:p>
           <a:p>
-            <a:pPr marL="216000" indent="-213120">
+            <a:pPr marL="216000" indent="-212760">
               <a:lnSpc>
                 <a:spcPct val="100000"/>
               </a:lnSpc>
@@ -12291,14 +12176,14 @@
       </p:sp>
       <p:sp>
         <p:nvSpPr>
-          <p:cNvPr id="251" name="CustomShape 3"/>
+          <p:cNvPr id="252" name="CustomShape 3"/>
           <p:cNvSpPr/>
           <p:nvPr/>
         </p:nvSpPr>
         <p:spPr>
           <a:xfrm>
             <a:off x="6036480" y="1389240"/>
-            <a:ext cx="912600" cy="256320"/>
+            <a:ext cx="912240" cy="255960"/>
           </a:xfrm>
           <a:prstGeom prst="rect">
             <a:avLst/>
@@ -12340,18 +12225,18 @@
       </p:sp>
       <p:pic>
         <p:nvPicPr>
-          <p:cNvPr id="252" name="" descr=""/>
+          <p:cNvPr id="253" name="" descr=""/>
           <p:cNvPicPr/>
           <p:nvPr/>
         </p:nvPicPr>
         <p:blipFill>
-          <a:blip r:embed="rId2"/>
+          <a:blip r:embed="rId3"/>
           <a:stretch/>
         </p:blipFill>
         <p:spPr>
           <a:xfrm>
             <a:off x="4297680" y="4389120"/>
-            <a:ext cx="4564440" cy="720720"/>
+            <a:ext cx="4564080" cy="720360"/>
           </a:xfrm>
           <a:prstGeom prst="rect">
             <a:avLst/>
@@ -12363,14 +12248,14 @@
       </p:pic>
       <p:sp>
         <p:nvSpPr>
-          <p:cNvPr id="253" name="CustomShape 4"/>
+          <p:cNvPr id="254" name="CustomShape 4"/>
           <p:cNvSpPr/>
           <p:nvPr/>
         </p:nvSpPr>
         <p:spPr>
           <a:xfrm>
             <a:off x="6217920" y="5046840"/>
-            <a:ext cx="912600" cy="256320"/>
+            <a:ext cx="912240" cy="255960"/>
           </a:xfrm>
           <a:prstGeom prst="rect">
             <a:avLst/>
@@ -12412,14 +12297,14 @@
       </p:sp>
       <p:sp>
         <p:nvSpPr>
-          <p:cNvPr id="254" name="CustomShape 5"/>
+          <p:cNvPr id="255" name="CustomShape 5"/>
           <p:cNvSpPr/>
           <p:nvPr/>
         </p:nvSpPr>
         <p:spPr>
           <a:xfrm>
             <a:off x="6583680" y="5760720"/>
-            <a:ext cx="912600" cy="256320"/>
+            <a:ext cx="912240" cy="255960"/>
           </a:xfrm>
           <a:prstGeom prst="rect">
             <a:avLst/>
@@ -12459,29 +12344,6 @@
           </a:p>
         </p:txBody>
       </p:sp>
-      <p:pic>
-        <p:nvPicPr>
-          <p:cNvPr id="255" name="" descr=""/>
-          <p:cNvPicPr/>
-          <p:nvPr/>
-        </p:nvPicPr>
-        <p:blipFill>
-          <a:blip r:embed="rId3"/>
-          <a:stretch/>
-        </p:blipFill>
-        <p:spPr>
-          <a:xfrm>
-            <a:off x="4390560" y="914400"/>
-            <a:ext cx="4661640" cy="427320"/>
-          </a:xfrm>
-          <a:prstGeom prst="rect">
-            <a:avLst/>
-          </a:prstGeom>
-          <a:ln>
-            <a:noFill/>
-          </a:ln>
-        </p:spPr>
-      </p:pic>
       <p:pic>
         <p:nvPicPr>
           <p:cNvPr id="256" name="" descr=""/>
@@ -12495,7 +12357,7 @@
         <p:spPr>
           <a:xfrm>
             <a:off x="4663440" y="1645920"/>
-            <a:ext cx="4431960" cy="974880"/>
+            <a:ext cx="4431600" cy="974520"/>
           </a:xfrm>
           <a:prstGeom prst="rect">
             <a:avLst/>
@@ -12518,7 +12380,7 @@
         <p:spPr>
           <a:xfrm>
             <a:off x="3522960" y="2847600"/>
-            <a:ext cx="5620680" cy="992520"/>
+            <a:ext cx="5620320" cy="992160"/>
           </a:xfrm>
           <a:prstGeom prst="rect">
             <a:avLst/>
@@ -12537,7 +12399,7 @@
         <p:spPr>
           <a:xfrm>
             <a:off x="6126480" y="2560320"/>
-            <a:ext cx="912600" cy="256320"/>
+            <a:ext cx="912240" cy="255960"/>
           </a:xfrm>
           <a:prstGeom prst="rect">
             <a:avLst/>
@@ -12586,7 +12448,7 @@
         <p:spPr>
           <a:xfrm>
             <a:off x="6766560" y="3766680"/>
-            <a:ext cx="912600" cy="256320"/>
+            <a:ext cx="912240" cy="255960"/>
           </a:xfrm>
           <a:prstGeom prst="rect">
             <a:avLst/>
@@ -12688,7 +12550,7 @@
         <p:spPr>
           <a:xfrm>
             <a:off x="4393800" y="2595600"/>
-            <a:ext cx="4198680" cy="878760"/>
+            <a:ext cx="4198320" cy="878400"/>
           </a:xfrm>
           <a:prstGeom prst="rect">
             <a:avLst/>
@@ -12707,7 +12569,7 @@
         <p:spPr>
           <a:xfrm>
             <a:off x="365760" y="274320"/>
-            <a:ext cx="8318160" cy="816120"/>
+            <a:ext cx="8317800" cy="815760"/>
           </a:xfrm>
           <a:prstGeom prst="rect">
             <a:avLst/>
@@ -12756,7 +12618,7 @@
         <p:spPr>
           <a:xfrm>
             <a:off x="457200" y="1005840"/>
-            <a:ext cx="8135280" cy="4406040"/>
+            <a:ext cx="8134920" cy="4405680"/>
           </a:xfrm>
           <a:prstGeom prst="rect">
             <a:avLst/>
@@ -12965,7 +12827,7 @@
             </a:endParaRPr>
           </a:p>
           <a:p>
-            <a:pPr marL="216000" indent="-213120">
+            <a:pPr marL="216000" indent="-212760">
               <a:lnSpc>
                 <a:spcPct val="100000"/>
               </a:lnSpc>
@@ -13017,7 +12879,7 @@
             </a:endParaRPr>
           </a:p>
           <a:p>
-            <a:pPr marL="216000" indent="-213120">
+            <a:pPr marL="216000" indent="-212760">
               <a:lnSpc>
                 <a:spcPct val="100000"/>
               </a:lnSpc>
@@ -13119,7 +12981,7 @@
             </a:endParaRPr>
           </a:p>
           <a:p>
-            <a:pPr marL="216000" indent="-213120">
+            <a:pPr marL="216000" indent="-212760">
               <a:lnSpc>
                 <a:spcPct val="100000"/>
               </a:lnSpc>
@@ -13151,7 +13013,7 @@
             </a:endParaRPr>
           </a:p>
           <a:p>
-            <a:pPr marL="216000" indent="-213120">
+            <a:pPr marL="216000" indent="-212760">
               <a:lnSpc>
                 <a:spcPct val="100000"/>
               </a:lnSpc>
@@ -13261,7 +13123,7 @@
         <p:spPr>
           <a:xfrm>
             <a:off x="6035040" y="3566160"/>
-            <a:ext cx="1369800" cy="364680"/>
+            <a:ext cx="1369440" cy="364320"/>
           </a:xfrm>
           <a:prstGeom prst="rect">
             <a:avLst/>
@@ -13310,7 +13172,7 @@
         <p:spPr>
           <a:xfrm>
             <a:off x="6127200" y="2377440"/>
-            <a:ext cx="912600" cy="256320"/>
+            <a:ext cx="912240" cy="255960"/>
           </a:xfrm>
           <a:prstGeom prst="rect">
             <a:avLst/>
@@ -13363,7 +13225,7 @@
         <p:spPr>
           <a:xfrm>
             <a:off x="4389120" y="1564200"/>
-            <a:ext cx="4564440" cy="720720"/>
+            <a:ext cx="4564080" cy="720360"/>
           </a:xfrm>
           <a:prstGeom prst="rect">
             <a:avLst/>
@@ -13386,7 +13248,7 @@
         <p:spPr>
           <a:xfrm>
             <a:off x="4389120" y="3931920"/>
-            <a:ext cx="4473000" cy="906120"/>
+            <a:ext cx="4472640" cy="905760"/>
           </a:xfrm>
           <a:prstGeom prst="rect">
             <a:avLst/>
@@ -13409,7 +13271,7 @@
         <p:spPr>
           <a:xfrm>
             <a:off x="4121280" y="5050080"/>
-            <a:ext cx="4655880" cy="801000"/>
+            <a:ext cx="4655520" cy="800640"/>
           </a:xfrm>
           <a:prstGeom prst="rect">
             <a:avLst/>
@@ -13428,7 +13290,7 @@
         <p:spPr>
           <a:xfrm>
             <a:off x="5943600" y="4754880"/>
-            <a:ext cx="1369800" cy="364680"/>
+            <a:ext cx="1369440" cy="364320"/>
           </a:xfrm>
           <a:prstGeom prst="rect">
             <a:avLst/>
@@ -13477,7 +13339,7 @@
         <p:spPr>
           <a:xfrm>
             <a:off x="6309360" y="5760720"/>
-            <a:ext cx="1369800" cy="364680"/>
+            <a:ext cx="1369440" cy="364320"/>
           </a:xfrm>
           <a:prstGeom prst="rect">
             <a:avLst/>
@@ -13579,7 +13441,7 @@
         <p:spPr>
           <a:xfrm>
             <a:off x="4663440" y="1836720"/>
-            <a:ext cx="4479480" cy="687600"/>
+            <a:ext cx="4479120" cy="687240"/>
           </a:xfrm>
           <a:prstGeom prst="rect">
             <a:avLst/>
@@ -13598,7 +13460,7 @@
         <p:spPr>
           <a:xfrm>
             <a:off x="365760" y="274320"/>
-            <a:ext cx="8318160" cy="816120"/>
+            <a:ext cx="8317800" cy="815760"/>
           </a:xfrm>
           <a:prstGeom prst="rect">
             <a:avLst/>
@@ -13647,7 +13509,7 @@
         <p:spPr>
           <a:xfrm>
             <a:off x="457200" y="1005840"/>
-            <a:ext cx="8135280" cy="4406040"/>
+            <a:ext cx="8134920" cy="4405680"/>
           </a:xfrm>
           <a:prstGeom prst="rect">
             <a:avLst/>
@@ -13702,7 +13564,7 @@
             </a:endParaRPr>
           </a:p>
           <a:p>
-            <a:pPr marL="216000" indent="-213120">
+            <a:pPr marL="216000" indent="-212760">
               <a:lnSpc>
                 <a:spcPct val="100000"/>
               </a:lnSpc>
@@ -13727,7 +13589,7 @@
                 <a:latin typeface="Times New Roman"/>
                 <a:ea typeface="DejaVu Sans"/>
               </a:rPr>
-              <a:t>Data: </a:t>
+              <a:t>Data: existing model M3.2</a:t>
             </a:r>
             <a:endParaRPr b="0" lang="en-US" sz="1300" spc="-1" strike="noStrike">
               <a:latin typeface="Arial"/>
@@ -13764,7 +13626,7 @@
             </a:endParaRPr>
           </a:p>
           <a:p>
-            <a:pPr marL="216000" indent="-213120">
+            <a:pPr marL="216000" indent="-212760">
               <a:lnSpc>
                 <a:spcPct val="100000"/>
               </a:lnSpc>
@@ -13796,7 +13658,7 @@
             </a:endParaRPr>
           </a:p>
           <a:p>
-            <a:pPr marL="216000" indent="-213120">
+            <a:pPr marL="216000" indent="-212760">
               <a:lnSpc>
                 <a:spcPct val="100000"/>
               </a:lnSpc>
@@ -13880,7 +13742,115 @@
             </a:endParaRPr>
           </a:p>
           <a:p>
-            <a:pPr marL="216000" indent="-213120">
+            <a:pPr>
+              <a:lnSpc>
+                <a:spcPct val="100000"/>
+              </a:lnSpc>
+              <a:spcBef>
+                <a:spcPts val="431"/>
+              </a:spcBef>
+              <a:spcAft>
+                <a:spcPts val="575"/>
+              </a:spcAft>
+            </a:pPr>
+            <a:r>
+              <a:rPr b="1" lang="en-US" sz="1300" spc="-1" strike="noStrike">
+                <a:solidFill>
+                  <a:srgbClr val="000000"/>
+                </a:solidFill>
+                <a:latin typeface="Times New Roman"/>
+                <a:ea typeface="DejaVu Sans"/>
+              </a:rPr>
+              <a:t>Data: </a:t>
+            </a:r>
+            <a:r>
+              <a:rPr b="1" lang="en-US" sz="1300" spc="-1" strike="noStrike">
+                <a:solidFill>
+                  <a:srgbClr val="000000"/>
+                </a:solidFill>
+                <a:latin typeface="Times New Roman"/>
+                <a:ea typeface="DejaVu Sans"/>
+              </a:rPr>
+              <a:t>existing model M3.2</a:t>
+            </a:r>
+            <a:endParaRPr b="0" lang="en-US" sz="1300" spc="-1" strike="noStrike">
+              <a:latin typeface="Arial"/>
+            </a:endParaRPr>
+          </a:p>
+          <a:p>
+            <a:pPr marL="216000" indent="-212760">
+              <a:lnSpc>
+                <a:spcPct val="100000"/>
+              </a:lnSpc>
+              <a:buClr>
+                <a:srgbClr val="000000"/>
+              </a:buClr>
+              <a:buSzPct val="45000"/>
+              <a:buFont typeface="Wingdings" charset="2"/>
+              <a:buChar char=""/>
+            </a:pPr>
+            <a:r>
+              <a:rPr b="1" lang="en-US" sz="1300" spc="-1" strike="noStrike">
+                <a:solidFill>
+                  <a:srgbClr val="000000"/>
+                </a:solidFill>
+                <a:latin typeface="Times New Roman"/>
+                <a:ea typeface="DejaVu Sans"/>
+              </a:rPr>
+              <a:t>    </a:t>
+            </a:r>
+            <a:r>
+              <a:rPr b="1" lang="en-US" sz="1300" spc="-1" strike="noStrike">
+                <a:solidFill>
+                  <a:srgbClr val="000000"/>
+                </a:solidFill>
+                <a:latin typeface="Times New Roman"/>
+                <a:ea typeface="DejaVu Sans"/>
+              </a:rPr>
+              <a:t>Pos: 50 &lt;A,C&gt;, 50 &lt;A,B,D C&gt;, 50&lt;A,B,D,B,D,C&gt;, </a:t>
+            </a:r>
+            <a:endParaRPr b="0" lang="en-US" sz="1300" spc="-1" strike="noStrike">
+              <a:latin typeface="Arial"/>
+            </a:endParaRPr>
+          </a:p>
+          <a:p>
+            <a:pPr marL="216000" indent="-212760">
+              <a:lnSpc>
+                <a:spcPct val="100000"/>
+              </a:lnSpc>
+              <a:buClr>
+                <a:srgbClr val="000000"/>
+              </a:buClr>
+              <a:buSzPct val="45000"/>
+              <a:buFont typeface="Wingdings" charset="2"/>
+              <a:buChar char=""/>
+            </a:pPr>
+            <a:r>
+              <a:rPr b="1" lang="en-US" sz="1300" spc="-1" strike="noStrike">
+                <a:solidFill>
+                  <a:srgbClr val="000000"/>
+                </a:solidFill>
+                <a:latin typeface="Times New Roman"/>
+                <a:ea typeface="DejaVu Sans"/>
+              </a:rPr>
+              <a:t>      </a:t>
+            </a:r>
+            <a:r>
+              <a:rPr b="1" lang="en-US" sz="1300" spc="-1" strike="noStrike">
+                <a:solidFill>
+                  <a:srgbClr val="000000"/>
+                </a:solidFill>
+                <a:latin typeface="Times New Roman"/>
+                <a:ea typeface="DejaVu Sans"/>
+              </a:rPr>
+              <a:t>50 &lt;A,D,B,C&gt;, 50&lt;A,D,B,D,B,C&gt;</a:t>
+            </a:r>
+            <a:endParaRPr b="0" lang="en-US" sz="1300" spc="-1" strike="noStrike">
+              <a:latin typeface="Arial"/>
+            </a:endParaRPr>
+          </a:p>
+          <a:p>
+            <a:pPr marL="216000" indent="-212760">
               <a:lnSpc>
                 <a:spcPct val="100000"/>
               </a:lnSpc>
@@ -13905,86 +13875,14 @@
                 <a:latin typeface="Times New Roman"/>
                 <a:ea typeface="DejaVu Sans"/>
               </a:rPr>
-              <a:t>Data: </a:t>
+              <a:t>IM: create  model without consideration of frequncy :: R3.13</a:t>
             </a:r>
             <a:endParaRPr b="0" lang="en-US" sz="1300" spc="-1" strike="noStrike">
               <a:latin typeface="Arial"/>
             </a:endParaRPr>
           </a:p>
           <a:p>
-            <a:pPr marL="216000" indent="-213120">
-              <a:lnSpc>
-                <a:spcPct val="100000"/>
-              </a:lnSpc>
-              <a:buClr>
-                <a:srgbClr val="000000"/>
-              </a:buClr>
-              <a:buSzPct val="45000"/>
-              <a:buFont typeface="Wingdings" charset="2"/>
-              <a:buChar char=""/>
-            </a:pPr>
-            <a:r>
-              <a:rPr b="1" lang="en-US" sz="1300" spc="-1" strike="noStrike">
-                <a:solidFill>
-                  <a:srgbClr val="000000"/>
-                </a:solidFill>
-                <a:latin typeface="Times New Roman"/>
-                <a:ea typeface="DejaVu Sans"/>
-              </a:rPr>
-              <a:t>    </a:t>
-            </a:r>
-            <a:r>
-              <a:rPr b="1" lang="en-US" sz="1300" spc="-1" strike="noStrike">
-                <a:solidFill>
-                  <a:srgbClr val="000000"/>
-                </a:solidFill>
-                <a:latin typeface="Times New Roman"/>
-                <a:ea typeface="DejaVu Sans"/>
-              </a:rPr>
-              <a:t>Pos: 50 &lt;A,C&gt;, 50 &lt;A,B,D C&gt;, 50&lt;A,B,D,B,D,C&gt;, </a:t>
-            </a:r>
-            <a:endParaRPr b="0" lang="en-US" sz="1300" spc="-1" strike="noStrike">
-              <a:latin typeface="Arial"/>
-            </a:endParaRPr>
-          </a:p>
-          <a:p>
-            <a:pPr marL="216000" indent="-213120">
-              <a:lnSpc>
-                <a:spcPct val="100000"/>
-              </a:lnSpc>
-              <a:buClr>
-                <a:srgbClr val="000000"/>
-              </a:buClr>
-              <a:buSzPct val="45000"/>
-              <a:buFont typeface="Wingdings" charset="2"/>
-              <a:buChar char=""/>
-            </a:pPr>
-            <a:r>
-              <a:rPr b="1" lang="en-US" sz="1300" spc="-1" strike="noStrike">
-                <a:solidFill>
-                  <a:srgbClr val="000000"/>
-                </a:solidFill>
-                <a:latin typeface="Times New Roman"/>
-                <a:ea typeface="DejaVu Sans"/>
-              </a:rPr>
-              <a:t>      </a:t>
-            </a:r>
-            <a:r>
-              <a:rPr b="1" lang="en-US" sz="1300" spc="-1" strike="noStrike">
-                <a:solidFill>
-                  <a:srgbClr val="000000"/>
-                </a:solidFill>
-                <a:latin typeface="Times New Roman"/>
-                <a:ea typeface="DejaVu Sans"/>
-              </a:rPr>
-              <a:t>50 &lt;A,D,B,C&gt;, 50&lt;A,D,B,D,B,C&gt;</a:t>
-            </a:r>
-            <a:endParaRPr b="0" lang="en-US" sz="1300" spc="-1" strike="noStrike">
-              <a:latin typeface="Arial"/>
-            </a:endParaRPr>
-          </a:p>
-          <a:p>
-            <a:pPr marL="216000" indent="-213120">
+            <a:pPr marL="216000" indent="-212760">
               <a:lnSpc>
                 <a:spcPct val="100000"/>
               </a:lnSpc>
@@ -14009,38 +13907,6 @@
                 <a:latin typeface="Times New Roman"/>
                 <a:ea typeface="DejaVu Sans"/>
               </a:rPr>
-              <a:t>IM: create  model without consideration of frequncy :: R3.13</a:t>
-            </a:r>
-            <a:endParaRPr b="0" lang="en-US" sz="1300" spc="-1" strike="noStrike">
-              <a:latin typeface="Arial"/>
-            </a:endParaRPr>
-          </a:p>
-          <a:p>
-            <a:pPr marL="216000" indent="-213120">
-              <a:lnSpc>
-                <a:spcPct val="100000"/>
-              </a:lnSpc>
-              <a:spcBef>
-                <a:spcPts val="431"/>
-              </a:spcBef>
-              <a:spcAft>
-                <a:spcPts val="575"/>
-              </a:spcAft>
-              <a:buClr>
-                <a:srgbClr val="000000"/>
-              </a:buClr>
-              <a:buSzPct val="45000"/>
-              <a:buFont typeface="Wingdings" charset="2"/>
-              <a:buChar char=""/>
-            </a:pPr>
-            <a:r>
-              <a:rPr b="1" lang="en-US" sz="1300" spc="-1" strike="noStrike">
-                <a:solidFill>
-                  <a:srgbClr val="000000"/>
-                </a:solidFill>
-                <a:latin typeface="Times New Roman"/>
-                <a:ea typeface="DejaVu Sans"/>
-              </a:rPr>
               <a:t>RM: add parallel relation  :: R3.12 </a:t>
             </a:r>
             <a:endParaRPr b="0" lang="en-US" sz="1300" spc="-1" strike="noStrike">
@@ -14110,7 +13976,7 @@
         <p:spPr>
           <a:xfrm>
             <a:off x="6217920" y="2525400"/>
-            <a:ext cx="1369800" cy="518400"/>
+            <a:ext cx="1369440" cy="518040"/>
           </a:xfrm>
           <a:prstGeom prst="rect">
             <a:avLst/>
@@ -14163,7 +14029,7 @@
         <p:spPr>
           <a:xfrm>
             <a:off x="5584680" y="822960"/>
-            <a:ext cx="3648960" cy="1012680"/>
+            <a:ext cx="3648600" cy="1012320"/>
           </a:xfrm>
           <a:prstGeom prst="rect">
             <a:avLst/>
@@ -14182,7 +14048,7 @@
         <p:spPr>
           <a:xfrm>
             <a:off x="4846320" y="1249200"/>
-            <a:ext cx="912600" cy="256320"/>
+            <a:ext cx="912240" cy="255960"/>
           </a:xfrm>
           <a:prstGeom prst="rect">
             <a:avLst/>
@@ -14235,7 +14101,7 @@
         <p:spPr>
           <a:xfrm>
             <a:off x="5650920" y="2834640"/>
-            <a:ext cx="3401280" cy="944280"/>
+            <a:ext cx="3400920" cy="943920"/>
           </a:xfrm>
           <a:prstGeom prst="rect">
             <a:avLst/>
@@ -14254,7 +14120,7 @@
         <p:spPr>
           <a:xfrm>
             <a:off x="6583680" y="3779280"/>
-            <a:ext cx="1369800" cy="335520"/>
+            <a:ext cx="1369440" cy="335160"/>
           </a:xfrm>
           <a:prstGeom prst="rect">
             <a:avLst/>
@@ -14307,7 +14173,7 @@
         <p:spPr>
           <a:xfrm>
             <a:off x="4754880" y="4664160"/>
-            <a:ext cx="4392000" cy="821880"/>
+            <a:ext cx="4391640" cy="821520"/>
           </a:xfrm>
           <a:prstGeom prst="rect">
             <a:avLst/>
@@ -14326,7 +14192,7 @@
         <p:spPr>
           <a:xfrm>
             <a:off x="6676560" y="5485680"/>
-            <a:ext cx="1369800" cy="335520"/>
+            <a:ext cx="1369440" cy="335160"/>
           </a:xfrm>
           <a:prstGeom prst="rect">
             <a:avLst/>
@@ -14424,7 +14290,7 @@
         <p:spPr>
           <a:xfrm>
             <a:off x="365760" y="274320"/>
-            <a:ext cx="8318160" cy="816120"/>
+            <a:ext cx="8317800" cy="815760"/>
           </a:xfrm>
           <a:prstGeom prst="rect">
             <a:avLst/>
@@ -14473,7 +14339,7 @@
         <p:spPr>
           <a:xfrm>
             <a:off x="457200" y="1005840"/>
-            <a:ext cx="8135280" cy="4406040"/>
+            <a:ext cx="8134920" cy="4405680"/>
           </a:xfrm>
           <a:prstGeom prst="rect">
             <a:avLst/>
@@ -14528,7 +14394,7 @@
             </a:endParaRPr>
           </a:p>
           <a:p>
-            <a:pPr marL="216000" indent="-213120">
+            <a:pPr marL="216000" indent="-212760">
               <a:lnSpc>
                 <a:spcPct val="100000"/>
               </a:lnSpc>
@@ -14620,7 +14486,7 @@
             </a:endParaRPr>
           </a:p>
           <a:p>
-            <a:pPr marL="216000" indent="-213120">
+            <a:pPr marL="216000" indent="-212760">
               <a:lnSpc>
                 <a:spcPct val="100000"/>
               </a:lnSpc>
@@ -14652,7 +14518,7 @@
             </a:endParaRPr>
           </a:p>
           <a:p>
-            <a:pPr marL="216000" indent="-213120">
+            <a:pPr marL="216000" indent="-212760">
               <a:lnSpc>
                 <a:spcPct val="100000"/>
               </a:lnSpc>
@@ -14794,7 +14660,7 @@
         <p:spPr>
           <a:xfrm>
             <a:off x="6035040" y="3566160"/>
-            <a:ext cx="1369800" cy="364680"/>
+            <a:ext cx="1369440" cy="364320"/>
           </a:xfrm>
           <a:prstGeom prst="rect">
             <a:avLst/>
@@ -14843,7 +14709,7 @@
         <p:spPr>
           <a:xfrm>
             <a:off x="6127200" y="2377440"/>
-            <a:ext cx="912600" cy="256320"/>
+            <a:ext cx="912240" cy="255960"/>
           </a:xfrm>
           <a:prstGeom prst="rect">
             <a:avLst/>
@@ -14896,7 +14762,7 @@
         <p:spPr>
           <a:xfrm>
             <a:off x="4389120" y="1564200"/>
-            <a:ext cx="4564440" cy="720720"/>
+            <a:ext cx="4564080" cy="720360"/>
           </a:xfrm>
           <a:prstGeom prst="rect">
             <a:avLst/>
@@ -14919,7 +14785,7 @@
         <p:spPr>
           <a:xfrm>
             <a:off x="3505680" y="2656440"/>
-            <a:ext cx="5455080" cy="817920"/>
+            <a:ext cx="5454720" cy="817560"/>
           </a:xfrm>
           <a:prstGeom prst="rect">
             <a:avLst/>
@@ -14942,7 +14808,7 @@
         <p:spPr>
           <a:xfrm>
             <a:off x="4480560" y="3968640"/>
-            <a:ext cx="4571280" cy="1243080"/>
+            <a:ext cx="4570920" cy="1242720"/>
           </a:xfrm>
           <a:prstGeom prst="rect">
             <a:avLst/>
@@ -14961,7 +14827,7 @@
         <p:spPr>
           <a:xfrm>
             <a:off x="6309360" y="5304240"/>
-            <a:ext cx="1369800" cy="364680"/>
+            <a:ext cx="1369440" cy="364320"/>
           </a:xfrm>
           <a:prstGeom prst="rect">
             <a:avLst/>
@@ -15063,7 +14929,7 @@
         <p:spPr>
           <a:xfrm>
             <a:off x="4439880" y="2013120"/>
-            <a:ext cx="4703760" cy="1279080"/>
+            <a:ext cx="4703400" cy="1278720"/>
           </a:xfrm>
           <a:prstGeom prst="rect">
             <a:avLst/>
@@ -15082,7 +14948,7 @@
         <p:spPr>
           <a:xfrm>
             <a:off x="368280" y="182880"/>
-            <a:ext cx="8318160" cy="816120"/>
+            <a:ext cx="8317800" cy="815760"/>
           </a:xfrm>
           <a:prstGeom prst="rect">
             <a:avLst/>
@@ -15141,7 +15007,7 @@
         <p:spPr>
           <a:xfrm>
             <a:off x="457200" y="1005840"/>
-            <a:ext cx="8135280" cy="4406040"/>
+            <a:ext cx="8134920" cy="4405680"/>
           </a:xfrm>
           <a:prstGeom prst="rect">
             <a:avLst/>
@@ -15160,7 +15026,7 @@
         <p:txBody>
           <a:bodyPr lIns="90000" rIns="90000" tIns="45000" bIns="45000"/>
           <a:p>
-            <a:pPr marL="216000" indent="-213120">
+            <a:pPr marL="216000" indent="-212760">
               <a:lnSpc>
                 <a:spcPct val="100000"/>
               </a:lnSpc>
@@ -15304,7 +15170,7 @@
             </a:endParaRPr>
           </a:p>
           <a:p>
-            <a:pPr marL="216000" indent="-213120">
+            <a:pPr marL="216000" indent="-212760">
               <a:lnSpc>
                 <a:spcPct val="100000"/>
               </a:lnSpc>
@@ -15411,7 +15277,7 @@
                 <a:latin typeface="Times New Roman"/>
                 <a:ea typeface="DejaVu Sans"/>
               </a:rPr>
-              <a:t>Data: existing model M4.1</a:t>
+              <a:t>Data: existing model M4.2</a:t>
             </a:r>
             <a:endParaRPr b="0" lang="en-US" sz="1300" spc="-1" strike="noStrike">
               <a:latin typeface="Arial"/>
@@ -15714,7 +15580,7 @@
         <p:spPr>
           <a:xfrm>
             <a:off x="6402240" y="1721880"/>
-            <a:ext cx="912600" cy="256320"/>
+            <a:ext cx="912240" cy="255960"/>
           </a:xfrm>
           <a:prstGeom prst="rect">
             <a:avLst/>
@@ -15767,7 +15633,7 @@
         <p:spPr>
           <a:xfrm>
             <a:off x="4754880" y="914400"/>
-            <a:ext cx="4388760" cy="807120"/>
+            <a:ext cx="4388400" cy="806760"/>
           </a:xfrm>
           <a:prstGeom prst="rect">
             <a:avLst/>
@@ -15786,7 +15652,7 @@
         <p:spPr>
           <a:xfrm>
             <a:off x="7316640" y="3218040"/>
-            <a:ext cx="912600" cy="256320"/>
+            <a:ext cx="912240" cy="255960"/>
           </a:xfrm>
           <a:prstGeom prst="rect">
             <a:avLst/>
@@ -15835,7 +15701,7 @@
         <p:spPr>
           <a:xfrm>
             <a:off x="6949440" y="5595480"/>
-            <a:ext cx="912600" cy="256320"/>
+            <a:ext cx="912240" cy="255960"/>
           </a:xfrm>
           <a:prstGeom prst="rect">
             <a:avLst/>
@@ -15888,7 +15754,7 @@
         <p:spPr>
           <a:xfrm>
             <a:off x="4378320" y="3657600"/>
-            <a:ext cx="4765320" cy="1919880"/>
+            <a:ext cx="4764960" cy="1919520"/>
           </a:xfrm>
           <a:prstGeom prst="rect">
             <a:avLst/>
@@ -15956,7 +15822,7 @@
         <p:spPr>
           <a:xfrm>
             <a:off x="365760" y="274320"/>
-            <a:ext cx="8318160" cy="816120"/>
+            <a:ext cx="8317800" cy="815760"/>
           </a:xfrm>
           <a:prstGeom prst="rect">
             <a:avLst/>
@@ -16005,7 +15871,7 @@
         <p:spPr>
           <a:xfrm>
             <a:off x="457200" y="1005840"/>
-            <a:ext cx="8135280" cy="4406040"/>
+            <a:ext cx="8134920" cy="4405680"/>
           </a:xfrm>
           <a:prstGeom prst="rect">
             <a:avLst/>
@@ -16024,7 +15890,7 @@
         <p:txBody>
           <a:bodyPr lIns="90000" rIns="90000" tIns="45000" bIns="45000"/>
           <a:p>
-            <a:pPr marL="216000" indent="-213120">
+            <a:pPr marL="216000" indent="-212760">
               <a:lnSpc>
                 <a:spcPct val="100000"/>
               </a:lnSpc>
@@ -16092,7 +15958,7 @@
             </a:endParaRPr>
           </a:p>
           <a:p>
-            <a:pPr marL="216000" indent="-213120">
+            <a:pPr marL="216000" indent="-212760">
               <a:lnSpc>
                 <a:spcPct val="100000"/>
               </a:lnSpc>
@@ -16124,7 +15990,7 @@
             </a:endParaRPr>
           </a:p>
           <a:p>
-            <a:pPr marL="216000" indent="-213120">
+            <a:pPr marL="216000" indent="-212760">
               <a:lnSpc>
                 <a:spcPct val="100000"/>
               </a:lnSpc>
@@ -16358,7 +16224,7 @@
         <p:spPr>
           <a:xfrm>
             <a:off x="4755240" y="2651760"/>
-            <a:ext cx="1004760" cy="273240"/>
+            <a:ext cx="1004400" cy="272880"/>
           </a:xfrm>
           <a:prstGeom prst="rect">
             <a:avLst/>
@@ -16407,7 +16273,7 @@
         <p:spPr>
           <a:xfrm>
             <a:off x="4846320" y="1249200"/>
-            <a:ext cx="912600" cy="256320"/>
+            <a:ext cx="912240" cy="255960"/>
           </a:xfrm>
           <a:prstGeom prst="rect">
             <a:avLst/>
@@ -16456,7 +16322,7 @@
         <p:spPr>
           <a:xfrm>
             <a:off x="6675120" y="4663800"/>
-            <a:ext cx="1004760" cy="273240"/>
+            <a:ext cx="1004400" cy="272880"/>
           </a:xfrm>
           <a:prstGeom prst="rect">
             <a:avLst/>
@@ -16509,7 +16375,7 @@
         <p:spPr>
           <a:xfrm>
             <a:off x="5577840" y="837000"/>
-            <a:ext cx="3130920" cy="1082520"/>
+            <a:ext cx="3130560" cy="1082160"/>
           </a:xfrm>
           <a:prstGeom prst="rect">
             <a:avLst/>
@@ -16532,7 +16398,7 @@
         <p:spPr>
           <a:xfrm>
             <a:off x="5669280" y="1915920"/>
-            <a:ext cx="2833920" cy="1466640"/>
+            <a:ext cx="2833560" cy="1466280"/>
           </a:xfrm>
           <a:prstGeom prst="rect">
             <a:avLst/>
@@ -16555,7 +16421,7 @@
         <p:spPr>
           <a:xfrm>
             <a:off x="5261040" y="3383280"/>
-            <a:ext cx="3790800" cy="1277640"/>
+            <a:ext cx="3790440" cy="1277280"/>
           </a:xfrm>
           <a:prstGeom prst="rect">
             <a:avLst/>
@@ -16578,7 +16444,7 @@
         <p:spPr>
           <a:xfrm>
             <a:off x="383400" y="4887000"/>
-            <a:ext cx="3913560" cy="873000"/>
+            <a:ext cx="3913200" cy="872640"/>
           </a:xfrm>
           <a:prstGeom prst="rect">
             <a:avLst/>
@@ -16597,7 +16463,7 @@
         <p:spPr>
           <a:xfrm>
             <a:off x="1371960" y="5760720"/>
-            <a:ext cx="1004760" cy="273240"/>
+            <a:ext cx="1004400" cy="272880"/>
           </a:xfrm>
           <a:prstGeom prst="rect">
             <a:avLst/>
@@ -16650,7 +16516,7 @@
         <p:spPr>
           <a:xfrm>
             <a:off x="4926960" y="4937760"/>
-            <a:ext cx="3759120" cy="884520"/>
+            <a:ext cx="3758760" cy="884160"/>
           </a:xfrm>
           <a:prstGeom prst="rect">
             <a:avLst/>
@@ -16669,7 +16535,7 @@
         <p:spPr>
           <a:xfrm>
             <a:off x="5852160" y="5761080"/>
-            <a:ext cx="1004760" cy="273240"/>
+            <a:ext cx="1004400" cy="272880"/>
           </a:xfrm>
           <a:prstGeom prst="rect">
             <a:avLst/>
@@ -16767,7 +16633,7 @@
         <p:spPr>
           <a:xfrm>
             <a:off x="365760" y="274320"/>
-            <a:ext cx="6397920" cy="451800"/>
+            <a:ext cx="6397560" cy="451440"/>
           </a:xfrm>
           <a:prstGeom prst="rect">
             <a:avLst/>
@@ -16816,7 +16682,7 @@
         <p:spPr>
           <a:xfrm>
             <a:off x="457200" y="1005840"/>
-            <a:ext cx="8135280" cy="4008240"/>
+            <a:ext cx="8134920" cy="4007880"/>
           </a:xfrm>
           <a:prstGeom prst="rect">
             <a:avLst/>
@@ -16835,7 +16701,7 @@
         <p:txBody>
           <a:bodyPr lIns="90000" rIns="90000" tIns="45000" bIns="45000"/>
           <a:p>
-            <a:pPr marL="216000" indent="-213120">
+            <a:pPr marL="216000" indent="-212760">
               <a:lnSpc>
                 <a:spcPct val="100000"/>
               </a:lnSpc>
@@ -16883,7 +16749,7 @@
             </a:endParaRPr>
           </a:p>
           <a:p>
-            <a:pPr marL="216000" indent="-213120">
+            <a:pPr marL="216000" indent="-212760">
               <a:lnSpc>
                 <a:spcPct val="100000"/>
               </a:lnSpc>
@@ -16931,7 +16797,7 @@
             </a:endParaRPr>
           </a:p>
           <a:p>
-            <a:pPr marL="216000" indent="-213120">
+            <a:pPr marL="216000" indent="-212760">
               <a:lnSpc>
                 <a:spcPct val="100000"/>
               </a:lnSpc>
@@ -16979,7 +16845,7 @@
             </a:endParaRPr>
           </a:p>
           <a:p>
-            <a:pPr marL="216000" indent="-213120">
+            <a:pPr marL="216000" indent="-212760">
               <a:lnSpc>
                 <a:spcPct val="100000"/>
               </a:lnSpc>
@@ -17090,7 +16956,7 @@
         <p:spPr>
           <a:xfrm>
             <a:off x="365760" y="274320"/>
-            <a:ext cx="8318160" cy="816120"/>
+            <a:ext cx="8317800" cy="815760"/>
           </a:xfrm>
           <a:prstGeom prst="rect">
             <a:avLst/>
@@ -17139,7 +17005,7 @@
         <p:spPr>
           <a:xfrm>
             <a:off x="457200" y="1005840"/>
-            <a:ext cx="8135280" cy="4406040"/>
+            <a:ext cx="8134920" cy="4405680"/>
           </a:xfrm>
           <a:prstGeom prst="rect">
             <a:avLst/>
@@ -17158,7 +17024,7 @@
         <p:txBody>
           <a:bodyPr lIns="90000" rIns="90000" tIns="45000" bIns="45000"/>
           <a:p>
-            <a:pPr marL="216000" indent="-213120">
+            <a:pPr marL="216000" indent="-212760">
               <a:lnSpc>
                 <a:spcPct val="100000"/>
               </a:lnSpc>
@@ -17226,7 +17092,7 @@
             </a:endParaRPr>
           </a:p>
           <a:p>
-            <a:pPr marL="216000" indent="-213120">
+            <a:pPr marL="216000" indent="-212760">
               <a:lnSpc>
                 <a:spcPct val="100000"/>
               </a:lnSpc>
@@ -17258,7 +17124,7 @@
             </a:endParaRPr>
           </a:p>
           <a:p>
-            <a:pPr marL="216000" indent="-213120">
+            <a:pPr marL="216000" indent="-212760">
               <a:lnSpc>
                 <a:spcPct val="100000"/>
               </a:lnSpc>
@@ -17498,7 +17364,7 @@
         <p:spPr>
           <a:xfrm>
             <a:off x="6217920" y="2560320"/>
-            <a:ext cx="1004760" cy="273240"/>
+            <a:ext cx="1004400" cy="272880"/>
           </a:xfrm>
           <a:prstGeom prst="rect">
             <a:avLst/>
@@ -17547,7 +17413,7 @@
         <p:spPr>
           <a:xfrm>
             <a:off x="4846320" y="1249200"/>
-            <a:ext cx="912600" cy="256320"/>
+            <a:ext cx="912240" cy="255960"/>
           </a:xfrm>
           <a:prstGeom prst="rect">
             <a:avLst/>
@@ -17596,7 +17462,7 @@
         <p:spPr>
           <a:xfrm>
             <a:off x="6675120" y="4206600"/>
-            <a:ext cx="1004760" cy="273240"/>
+            <a:ext cx="1004400" cy="272880"/>
           </a:xfrm>
           <a:prstGeom prst="rect">
             <a:avLst/>
@@ -17649,7 +17515,7 @@
         <p:spPr>
           <a:xfrm>
             <a:off x="5578200" y="837360"/>
-            <a:ext cx="3130920" cy="1082520"/>
+            <a:ext cx="3130560" cy="1082160"/>
           </a:xfrm>
           <a:prstGeom prst="rect">
             <a:avLst/>
@@ -17672,7 +17538,7 @@
         <p:spPr>
           <a:xfrm>
             <a:off x="4480560" y="1920240"/>
-            <a:ext cx="4582800" cy="658080"/>
+            <a:ext cx="4582440" cy="657720"/>
           </a:xfrm>
           <a:prstGeom prst="rect">
             <a:avLst/>
@@ -17695,7 +17561,7 @@
         <p:spPr>
           <a:xfrm>
             <a:off x="5303520" y="3008520"/>
-            <a:ext cx="3776400" cy="1197000"/>
+            <a:ext cx="3776040" cy="1196640"/>
           </a:xfrm>
           <a:prstGeom prst="rect">
             <a:avLst/>
@@ -17718,7 +17584,7 @@
         <p:spPr>
           <a:xfrm>
             <a:off x="5303520" y="4550760"/>
-            <a:ext cx="4022640" cy="934920"/>
+            <a:ext cx="4022280" cy="934560"/>
           </a:xfrm>
           <a:prstGeom prst="rect">
             <a:avLst/>
@@ -17737,7 +17603,7 @@
         <p:spPr>
           <a:xfrm>
             <a:off x="6675480" y="5577840"/>
-            <a:ext cx="1004760" cy="273240"/>
+            <a:ext cx="1004400" cy="272880"/>
           </a:xfrm>
           <a:prstGeom prst="rect">
             <a:avLst/>
@@ -17835,7 +17701,7 @@
         <p:spPr>
           <a:xfrm>
             <a:off x="365760" y="274320"/>
-            <a:ext cx="8318160" cy="816120"/>
+            <a:ext cx="8317800" cy="815760"/>
           </a:xfrm>
           <a:prstGeom prst="rect">
             <a:avLst/>
@@ -17888,7 +17754,7 @@
         <p:spPr>
           <a:xfrm>
             <a:off x="5118480" y="4572000"/>
-            <a:ext cx="3933360" cy="913680"/>
+            <a:ext cx="3933000" cy="913320"/>
           </a:xfrm>
           <a:prstGeom prst="rect">
             <a:avLst/>
@@ -17907,7 +17773,7 @@
         <p:spPr>
           <a:xfrm>
             <a:off x="457200" y="1005840"/>
-            <a:ext cx="8135280" cy="4406040"/>
+            <a:ext cx="8134920" cy="4405680"/>
           </a:xfrm>
           <a:prstGeom prst="rect">
             <a:avLst/>
@@ -17982,7 +17848,7 @@
             </a:endParaRPr>
           </a:p>
           <a:p>
-            <a:pPr marL="216000" indent="-213120">
+            <a:pPr marL="216000" indent="-212760">
               <a:lnSpc>
                 <a:spcPct val="100000"/>
               </a:lnSpc>
@@ -18014,7 +17880,7 @@
             </a:endParaRPr>
           </a:p>
           <a:p>
-            <a:pPr marL="216000" indent="-213120">
+            <a:pPr marL="216000" indent="-212760">
               <a:lnSpc>
                 <a:spcPct val="100000"/>
               </a:lnSpc>
@@ -18254,7 +18120,7 @@
         <p:spPr>
           <a:xfrm>
             <a:off x="6217920" y="2560320"/>
-            <a:ext cx="1004760" cy="273240"/>
+            <a:ext cx="1004400" cy="272880"/>
           </a:xfrm>
           <a:prstGeom prst="rect">
             <a:avLst/>
@@ -18303,7 +18169,7 @@
         <p:spPr>
           <a:xfrm>
             <a:off x="4846320" y="1249200"/>
-            <a:ext cx="912600" cy="256320"/>
+            <a:ext cx="912240" cy="255960"/>
           </a:xfrm>
           <a:prstGeom prst="rect">
             <a:avLst/>
@@ -18352,7 +18218,7 @@
         <p:spPr>
           <a:xfrm>
             <a:off x="6675120" y="4206600"/>
-            <a:ext cx="1004760" cy="273240"/>
+            <a:ext cx="1004400" cy="272880"/>
           </a:xfrm>
           <a:prstGeom prst="rect">
             <a:avLst/>
@@ -18405,7 +18271,7 @@
         <p:spPr>
           <a:xfrm>
             <a:off x="5578200" y="837360"/>
-            <a:ext cx="3130920" cy="1082520"/>
+            <a:ext cx="3130560" cy="1082160"/>
           </a:xfrm>
           <a:prstGeom prst="rect">
             <a:avLst/>
@@ -18424,7 +18290,7 @@
         <p:spPr>
           <a:xfrm>
             <a:off x="6675480" y="5577840"/>
-            <a:ext cx="1004760" cy="273240"/>
+            <a:ext cx="1004400" cy="272880"/>
           </a:xfrm>
           <a:prstGeom prst="rect">
             <a:avLst/>
@@ -18477,7 +18343,7 @@
         <p:spPr>
           <a:xfrm>
             <a:off x="4389120" y="1920240"/>
-            <a:ext cx="4754160" cy="558720"/>
+            <a:ext cx="4753800" cy="558360"/>
           </a:xfrm>
           <a:prstGeom prst="rect">
             <a:avLst/>
@@ -18500,7 +18366,7 @@
         <p:spPr>
           <a:xfrm>
             <a:off x="5577840" y="2837520"/>
-            <a:ext cx="3291120" cy="1368000"/>
+            <a:ext cx="3290760" cy="1367640"/>
           </a:xfrm>
           <a:prstGeom prst="rect">
             <a:avLst/>
@@ -18568,7 +18434,7 @@
         <p:spPr>
           <a:xfrm>
             <a:off x="365760" y="274320"/>
-            <a:ext cx="6397920" cy="451800"/>
+            <a:ext cx="6397560" cy="451440"/>
           </a:xfrm>
           <a:prstGeom prst="rect">
             <a:avLst/>
@@ -18627,7 +18493,7 @@
         <p:spPr>
           <a:xfrm>
             <a:off x="642960" y="1010520"/>
-            <a:ext cx="8135280" cy="5664600"/>
+            <a:ext cx="8134920" cy="5664240"/>
           </a:xfrm>
           <a:prstGeom prst="rect">
             <a:avLst/>
@@ -18646,7 +18512,7 @@
         <p:txBody>
           <a:bodyPr lIns="90000" rIns="90000" tIns="45000" bIns="45000"/>
           <a:p>
-            <a:pPr marL="216000" indent="-213120">
+            <a:pPr marL="216000" indent="-212760">
               <a:lnSpc>
                 <a:spcPct val="100000"/>
               </a:lnSpc>
@@ -18764,7 +18630,10 @@
             </a:endParaRPr>
           </a:p>
           <a:p>
-            <a:pPr marL="216000" indent="-216000">
+            <a:pPr marL="216000" indent="-215640">
+              <a:lnSpc>
+                <a:spcPct val="100000"/>
+              </a:lnSpc>
               <a:buClr>
                 <a:srgbClr val="000000"/>
               </a:buClr>
@@ -18787,7 +18656,10 @@
             </a:endParaRPr>
           </a:p>
           <a:p>
-            <a:pPr marL="216000" indent="-216000">
+            <a:pPr marL="216000" indent="-215640">
+              <a:lnSpc>
+                <a:spcPct val="100000"/>
+              </a:lnSpc>
               <a:buClr>
                 <a:srgbClr val="000000"/>
               </a:buClr>
@@ -18810,7 +18682,10 @@
             </a:endParaRPr>
           </a:p>
           <a:p>
-            <a:pPr marL="216000" indent="-216000">
+            <a:pPr marL="216000" indent="-215640">
+              <a:lnSpc>
+                <a:spcPct val="100000"/>
+              </a:lnSpc>
               <a:buClr>
                 <a:srgbClr val="000000"/>
               </a:buClr>
@@ -18833,7 +18708,10 @@
             </a:endParaRPr>
           </a:p>
           <a:p>
-            <a:pPr marL="216000" indent="-216000">
+            <a:pPr marL="216000" indent="-215640">
+              <a:lnSpc>
+                <a:spcPct val="100000"/>
+              </a:lnSpc>
               <a:buClr>
                 <a:srgbClr val="000000"/>
               </a:buClr>
@@ -18866,7 +18744,10 @@
             </a:endParaRPr>
           </a:p>
           <a:p>
-            <a:pPr marL="216000" indent="-216000">
+            <a:pPr marL="216000" indent="-215640">
+              <a:lnSpc>
+                <a:spcPct val="100000"/>
+              </a:lnSpc>
               <a:buClr>
                 <a:srgbClr val="000000"/>
               </a:buClr>
@@ -18889,7 +18770,10 @@
             </a:endParaRPr>
           </a:p>
           <a:p>
-            <a:pPr marL="216000" indent="-216000">
+            <a:pPr marL="216000" indent="-215640">
+              <a:lnSpc>
+                <a:spcPct val="100000"/>
+              </a:lnSpc>
               <a:buClr>
                 <a:srgbClr val="000000"/>
               </a:buClr>
@@ -18922,7 +18806,10 @@
             </a:endParaRPr>
           </a:p>
           <a:p>
-            <a:pPr marL="216000" indent="-216000">
+            <a:pPr marL="216000" indent="-215640">
+              <a:lnSpc>
+                <a:spcPct val="100000"/>
+              </a:lnSpc>
               <a:buClr>
                 <a:srgbClr val="000000"/>
               </a:buClr>
@@ -18945,7 +18832,10 @@
             </a:endParaRPr>
           </a:p>
           <a:p>
-            <a:pPr marL="216000" indent="-216000">
+            <a:pPr marL="216000" indent="-215640">
+              <a:lnSpc>
+                <a:spcPct val="100000"/>
+              </a:lnSpc>
               <a:buClr>
                 <a:srgbClr val="000000"/>
               </a:buClr>
@@ -19011,7 +18901,6 @@
             </a:r>
             <a:endParaRPr b="0" lang="en-US" sz="1400" spc="-1" strike="noStrike">
               <a:latin typeface="Arial"/>
-              <a:ea typeface="Noto Sans CJK SC Regular"/>
             </a:endParaRPr>
           </a:p>
           <a:p>
@@ -19038,11 +18927,10 @@
             </a:r>
             <a:endParaRPr b="0" lang="en-US" sz="1400" spc="-1" strike="noStrike">
               <a:latin typeface="Arial"/>
-              <a:ea typeface="Noto Sans CJK SC Regular"/>
-            </a:endParaRPr>
-          </a:p>
-          <a:p>
-            <a:pPr marL="216000" indent="-213120">
+            </a:endParaRPr>
+          </a:p>
+          <a:p>
+            <a:pPr marL="216000" indent="-212760">
               <a:lnSpc>
                 <a:spcPct val="100000"/>
               </a:lnSpc>
@@ -19074,7 +18962,7 @@
             </a:endParaRPr>
           </a:p>
           <a:p>
-            <a:pPr lvl="2" marL="648000" indent="-213120">
+            <a:pPr lvl="2" marL="648000" indent="-212760">
               <a:lnSpc>
                 <a:spcPct val="100000"/>
               </a:lnSpc>
@@ -19106,7 +18994,7 @@
             </a:endParaRPr>
           </a:p>
           <a:p>
-            <a:pPr lvl="2" marL="648000" indent="-213120">
+            <a:pPr lvl="2" marL="648000" indent="-212760">
               <a:lnSpc>
                 <a:spcPct val="100000"/>
               </a:lnSpc>
@@ -19207,7 +19095,7 @@
         <p:spPr>
           <a:xfrm>
             <a:off x="365760" y="274320"/>
-            <a:ext cx="6397920" cy="451800"/>
+            <a:ext cx="6397560" cy="451440"/>
           </a:xfrm>
           <a:prstGeom prst="rect">
             <a:avLst/>
@@ -19266,7 +19154,7 @@
         <p:spPr>
           <a:xfrm>
             <a:off x="642960" y="1010520"/>
-            <a:ext cx="8135280" cy="5664600"/>
+            <a:ext cx="8134920" cy="5664240"/>
           </a:xfrm>
           <a:prstGeom prst="rect">
             <a:avLst/>
@@ -19285,7 +19173,7 @@
         <p:txBody>
           <a:bodyPr lIns="90000" rIns="90000" tIns="45000" bIns="45000"/>
           <a:p>
-            <a:pPr marL="216000" indent="-213120">
+            <a:pPr marL="216000" indent="-212760">
               <a:lnSpc>
                 <a:spcPct val="100000"/>
               </a:lnSpc>
@@ -19362,24 +19250,17 @@
                 <a:latin typeface="Times New Roman"/>
                 <a:ea typeface="DejaVu Sans"/>
               </a:rPr>
-              <a:t>True Negative: ==0,   </a:t>
-            </a:r>
-            <a:r>
-              <a:rPr b="1" lang="en-US" sz="1400" spc="-1" strike="noStrike">
-                <a:solidFill>
-                  <a:srgbClr val="000000"/>
-                </a:solidFill>
-                <a:latin typeface="Times New Roman"/>
-                <a:ea typeface="DejaVu Sans"/>
-              </a:rPr>
-              <a:t>!=0 expected with special cases, </a:t>
+              <a:t>True Negative: ==0,   !=0 expected with special cases, </a:t>
             </a:r>
             <a:endParaRPr b="0" lang="en-US" sz="1400" spc="-1" strike="noStrike">
               <a:latin typeface="Arial"/>
             </a:endParaRPr>
           </a:p>
           <a:p>
-            <a:pPr marL="216000" indent="-216000">
+            <a:pPr marL="216000" indent="-215640">
+              <a:lnSpc>
+                <a:spcPct val="100000"/>
+              </a:lnSpc>
               <a:buClr>
                 <a:srgbClr val="000000"/>
               </a:buClr>
@@ -19402,7 +19283,10 @@
             </a:endParaRPr>
           </a:p>
           <a:p>
-            <a:pPr marL="216000" indent="-216000">
+            <a:pPr marL="216000" indent="-215640">
+              <a:lnSpc>
+                <a:spcPct val="100000"/>
+              </a:lnSpc>
               <a:buClr>
                 <a:srgbClr val="000000"/>
               </a:buClr>
@@ -19425,7 +19309,10 @@
             </a:endParaRPr>
           </a:p>
           <a:p>
-            <a:pPr marL="216000" indent="-216000">
+            <a:pPr marL="216000" indent="-215640">
+              <a:lnSpc>
+                <a:spcPct val="100000"/>
+              </a:lnSpc>
               <a:buClr>
                 <a:srgbClr val="000000"/>
               </a:buClr>
@@ -19448,7 +19335,10 @@
             </a:endParaRPr>
           </a:p>
           <a:p>
-            <a:pPr marL="216000" indent="-216000">
+            <a:pPr marL="216000" indent="-215640">
+              <a:lnSpc>
+                <a:spcPct val="100000"/>
+              </a:lnSpc>
               <a:buClr>
                 <a:srgbClr val="000000"/>
               </a:buClr>
@@ -19471,7 +19361,10 @@
             </a:endParaRPr>
           </a:p>
           <a:p>
-            <a:pPr marL="216000" indent="-216000">
+            <a:pPr marL="216000" indent="-215640">
+              <a:lnSpc>
+                <a:spcPct val="100000"/>
+              </a:lnSpc>
               <a:buClr>
                 <a:srgbClr val="000000"/>
               </a:buClr>
@@ -19494,7 +19387,10 @@
             </a:endParaRPr>
           </a:p>
           <a:p>
-            <a:pPr marL="216000" indent="-216000">
+            <a:pPr marL="216000" indent="-215640">
+              <a:lnSpc>
+                <a:spcPct val="100000"/>
+              </a:lnSpc>
               <a:buClr>
                 <a:srgbClr val="000000"/>
               </a:buClr>
@@ -19517,7 +19413,10 @@
             </a:endParaRPr>
           </a:p>
           <a:p>
-            <a:pPr marL="216000" indent="-216000">
+            <a:pPr marL="216000" indent="-215640">
+              <a:lnSpc>
+                <a:spcPct val="100000"/>
+              </a:lnSpc>
               <a:buClr>
                 <a:srgbClr val="000000"/>
               </a:buClr>
@@ -19540,7 +19439,10 @@
             </a:endParaRPr>
           </a:p>
           <a:p>
-            <a:pPr marL="216000" indent="-216000">
+            <a:pPr marL="216000" indent="-215640">
+              <a:lnSpc>
+                <a:spcPct val="100000"/>
+              </a:lnSpc>
               <a:buClr>
                 <a:srgbClr val="000000"/>
               </a:buClr>
@@ -19563,7 +19465,10 @@
             </a:endParaRPr>
           </a:p>
           <a:p>
-            <a:pPr marL="216000" indent="-216000">
+            <a:pPr marL="216000" indent="-215640">
+              <a:lnSpc>
+                <a:spcPct val="100000"/>
+              </a:lnSpc>
               <a:buClr>
                 <a:srgbClr val="000000"/>
               </a:buClr>
@@ -19586,7 +19491,10 @@
             </a:endParaRPr>
           </a:p>
           <a:p>
-            <a:pPr marL="216000" indent="-216000">
+            <a:pPr marL="216000" indent="-215640">
+              <a:lnSpc>
+                <a:spcPct val="100000"/>
+              </a:lnSpc>
               <a:buClr>
                 <a:srgbClr val="000000"/>
               </a:buClr>
@@ -19609,7 +19517,10 @@
             </a:endParaRPr>
           </a:p>
           <a:p>
-            <a:pPr marL="216000" indent="-216000">
+            <a:pPr marL="216000" indent="-215640">
+              <a:lnSpc>
+                <a:spcPct val="100000"/>
+              </a:lnSpc>
               <a:buClr>
                 <a:srgbClr val="000000"/>
               </a:buClr>
@@ -19675,7 +19586,6 @@
             </a:r>
             <a:endParaRPr b="0" lang="en-US" sz="1400" spc="-1" strike="noStrike">
               <a:latin typeface="Arial"/>
-              <a:ea typeface="Noto Sans CJK SC Regular"/>
             </a:endParaRPr>
           </a:p>
           <a:p>
@@ -19702,11 +19612,10 @@
             </a:r>
             <a:endParaRPr b="0" lang="en-US" sz="1400" spc="-1" strike="noStrike">
               <a:latin typeface="Arial"/>
-              <a:ea typeface="Noto Sans CJK SC Regular"/>
-            </a:endParaRPr>
-          </a:p>
-          <a:p>
-            <a:pPr marL="216000" indent="-213120">
+            </a:endParaRPr>
+          </a:p>
+          <a:p>
+            <a:pPr marL="216000" indent="-212760">
               <a:lnSpc>
                 <a:spcPct val="100000"/>
               </a:lnSpc>
@@ -19738,7 +19647,7 @@
             </a:endParaRPr>
           </a:p>
           <a:p>
-            <a:pPr lvl="2" marL="648000" indent="-213120">
+            <a:pPr lvl="2" marL="648000" indent="-212760">
               <a:lnSpc>
                 <a:spcPct val="100000"/>
               </a:lnSpc>
@@ -19770,7 +19679,7 @@
             </a:endParaRPr>
           </a:p>
           <a:p>
-            <a:pPr lvl="2" marL="648000" indent="-213120">
+            <a:pPr lvl="2" marL="648000" indent="-212760">
               <a:lnSpc>
                 <a:spcPct val="100000"/>
               </a:lnSpc>
@@ -19871,7 +19780,7 @@
         <p:spPr>
           <a:xfrm>
             <a:off x="365760" y="274320"/>
-            <a:ext cx="6397920" cy="451800"/>
+            <a:ext cx="6397560" cy="451440"/>
           </a:xfrm>
           <a:prstGeom prst="rect">
             <a:avLst/>
@@ -19920,7 +19829,7 @@
         <p:spPr>
           <a:xfrm>
             <a:off x="457200" y="1005840"/>
-            <a:ext cx="8135280" cy="5664600"/>
+            <a:ext cx="8134920" cy="5664240"/>
           </a:xfrm>
           <a:prstGeom prst="rect">
             <a:avLst/>
@@ -19939,7 +19848,7 @@
         <p:txBody>
           <a:bodyPr lIns="90000" rIns="90000" tIns="45000" bIns="45000"/>
           <a:p>
-            <a:pPr marL="216000" indent="-213120">
+            <a:pPr marL="216000" indent="-212760">
               <a:lnSpc>
                 <a:spcPct val="100000"/>
               </a:lnSpc>
@@ -19964,55 +19873,14 @@
                 <a:latin typeface="Times New Roman"/>
                 <a:ea typeface="DejaVu Sans"/>
               </a:rPr>
-              <a:t>Inductive miner as rediscovery has </a:t>
-            </a:r>
-            <a:r>
-              <a:rPr b="1" lang="en-US" sz="1600" spc="-1" strike="noStrike">
-                <a:solidFill>
-                  <a:srgbClr val="000000"/>
-                </a:solidFill>
-                <a:latin typeface="Times New Roman"/>
-                <a:ea typeface="DejaVu Sans"/>
-              </a:rPr>
-              <a:t>good recall [fitness]</a:t>
-            </a:r>
-            <a:r>
-              <a:rPr b="1" lang="en-US" sz="1600" spc="-1" strike="noStrike">
-                <a:solidFill>
-                  <a:srgbClr val="000000"/>
-                </a:solidFill>
-                <a:latin typeface="Times New Roman"/>
-                <a:ea typeface="DejaVu Sans"/>
-              </a:rPr>
-              <a:t> , </a:t>
-            </a:r>
-            <a:r>
-              <a:rPr b="1" lang="en-US" sz="1600" spc="-1" strike="noStrike">
-                <a:solidFill>
-                  <a:srgbClr val="000000"/>
-                </a:solidFill>
-                <a:latin typeface="Times New Roman"/>
-                <a:ea typeface="DejaVu Sans"/>
-              </a:rPr>
-              <a:t>better precision</a:t>
-            </a:r>
-            <a:r>
-              <a:rPr b="1" lang="en-US" sz="1600" spc="-1" strike="noStrike">
-                <a:solidFill>
-                  <a:srgbClr val="000000"/>
-                </a:solidFill>
-                <a:latin typeface="Times New Roman"/>
-                <a:ea typeface="DejaVu Sans"/>
-              </a:rPr>
-              <a:t> than repair model technique. But in some cases, it generates a model which is much different with existing ones. [but only users can decide if the new generated model is needed or not.]</a:t>
+              <a:t>Inductive miner as rediscovery has good recall [fitness] , better precision than repair model technique. But in some cases, it generates a model which is much different with existing ones. [but only users can decide if the new generated model is needed or not.]</a:t>
             </a:r>
             <a:endParaRPr b="0" lang="en-US" sz="1600" spc="-1" strike="noStrike">
               <a:latin typeface="Arial"/>
-              <a:ea typeface="Noto Sans CJK SC Regular"/>
-            </a:endParaRPr>
-          </a:p>
-          <a:p>
-            <a:pPr marL="216000" indent="-213120">
+            </a:endParaRPr>
+          </a:p>
+          <a:p>
+            <a:pPr marL="216000" indent="-212760">
               <a:lnSpc>
                 <a:spcPct val="100000"/>
               </a:lnSpc>
@@ -20037,55 +19905,14 @@
                 <a:latin typeface="Times New Roman"/>
                 <a:ea typeface="DejaVu Sans"/>
               </a:rPr>
-              <a:t>Repair model has also </a:t>
-            </a:r>
-            <a:r>
-              <a:rPr b="1" lang="en-US" sz="1600" spc="-1" strike="noStrike">
-                <a:solidFill>
-                  <a:srgbClr val="000000"/>
-                </a:solidFill>
-                <a:latin typeface="Times New Roman"/>
-                <a:ea typeface="DejaVu Sans"/>
-              </a:rPr>
-              <a:t>good recall [fitness]</a:t>
-            </a:r>
-            <a:r>
-              <a:rPr b="1" lang="en-US" sz="1600" spc="-1" strike="noStrike">
-                <a:solidFill>
-                  <a:srgbClr val="000000"/>
-                </a:solidFill>
-                <a:latin typeface="Times New Roman"/>
-                <a:ea typeface="DejaVu Sans"/>
-              </a:rPr>
-              <a:t>, but mostly</a:t>
-            </a:r>
-            <a:r>
-              <a:rPr b="1" lang="en-US" sz="1600" spc="-1" strike="noStrike">
-                <a:solidFill>
-                  <a:srgbClr val="000000"/>
-                </a:solidFill>
-                <a:latin typeface="Times New Roman"/>
-                <a:ea typeface="DejaVu Sans"/>
-              </a:rPr>
-              <a:t> less precision</a:t>
-            </a:r>
-            <a:r>
-              <a:rPr b="1" lang="en-US" sz="1600" spc="-1" strike="noStrike">
-                <a:solidFill>
-                  <a:srgbClr val="000000"/>
-                </a:solidFill>
-                <a:latin typeface="Times New Roman"/>
-                <a:ea typeface="DejaVu Sans"/>
-              </a:rPr>
-              <a:t> by adding loop, subprocesses and silent transitions.  In some cases, it can’t see the global changes in the model and change some branches in a local but complex way to create fit model. </a:t>
+              <a:t>Repair model has also good recall [fitness], but mostly less precision by adding loop, subprocesses and silent transitions.  In some cases, it can’t see the global changes in the model and change some branches in a local but complex way to create fit model. </a:t>
             </a:r>
             <a:endParaRPr b="0" lang="en-US" sz="1600" spc="-1" strike="noStrike">
               <a:latin typeface="Arial"/>
-              <a:ea typeface="Noto Sans CJK SC Regular"/>
-            </a:endParaRPr>
-          </a:p>
-          <a:p>
-            <a:pPr marL="216000" indent="-213120">
+            </a:endParaRPr>
+          </a:p>
+          <a:p>
+            <a:pPr marL="216000" indent="-212760">
               <a:lnSpc>
                 <a:spcPct val="100000"/>
               </a:lnSpc>
@@ -20114,11 +19941,10 @@
             </a:r>
             <a:endParaRPr b="0" lang="en-US" sz="1600" spc="-1" strike="noStrike">
               <a:latin typeface="Arial"/>
-              <a:ea typeface="Noto Sans CJK SC Regular"/>
-            </a:endParaRPr>
-          </a:p>
-          <a:p>
-            <a:pPr marL="216000" indent="-213120">
+            </a:endParaRPr>
+          </a:p>
+          <a:p>
+            <a:pPr marL="216000" indent="-212760">
               <a:lnSpc>
                 <a:spcPct val="100000"/>
               </a:lnSpc>
@@ -20143,55 +19969,14 @@
                 <a:latin typeface="Times New Roman"/>
                 <a:ea typeface="DejaVu Sans"/>
               </a:rPr>
-              <a:t>With overlapped data, they have </a:t>
-            </a:r>
-            <a:r>
-              <a:rPr b="1" lang="en-US" sz="1600" spc="-1" strike="noStrike">
-                <a:solidFill>
-                  <a:srgbClr val="000000"/>
-                </a:solidFill>
-                <a:latin typeface="Times New Roman"/>
-                <a:ea typeface="DejaVu Sans"/>
-              </a:rPr>
-              <a:t>less precision</a:t>
-            </a:r>
-            <a:r>
-              <a:rPr b="1" lang="en-US" sz="1600" spc="-1" strike="noStrike">
-                <a:solidFill>
-                  <a:srgbClr val="000000"/>
-                </a:solidFill>
-                <a:latin typeface="Times New Roman"/>
-                <a:ea typeface="DejaVu Sans"/>
-              </a:rPr>
-              <a:t>, </a:t>
-            </a:r>
-            <a:r>
-              <a:rPr b="1" lang="en-US" sz="1600" spc="-1" strike="noStrike">
-                <a:solidFill>
-                  <a:srgbClr val="000000"/>
-                </a:solidFill>
-                <a:latin typeface="Times New Roman"/>
-                <a:ea typeface="DejaVu Sans"/>
-              </a:rPr>
-              <a:t>can’t see the distribution</a:t>
-            </a:r>
-            <a:r>
-              <a:rPr b="1" lang="en-US" sz="1600" spc="-1" strike="noStrike">
-                <a:solidFill>
-                  <a:srgbClr val="000000"/>
-                </a:solidFill>
-                <a:latin typeface="Times New Roman"/>
-                <a:ea typeface="DejaVu Sans"/>
-              </a:rPr>
-              <a:t> of overlapped data</a:t>
+              <a:t>With overlapped data, they have less precision, can’t see the distribution of overlapped data</a:t>
             </a:r>
             <a:endParaRPr b="0" lang="en-US" sz="1600" spc="-1" strike="noStrike">
               <a:latin typeface="Arial"/>
-              <a:ea typeface="Noto Sans CJK SC Regular"/>
-            </a:endParaRPr>
-          </a:p>
-          <a:p>
-            <a:pPr marL="216000" indent="-213120">
+            </a:endParaRPr>
+          </a:p>
+          <a:p>
+            <a:pPr marL="216000" indent="-212760">
               <a:lnSpc>
                 <a:spcPct val="100000"/>
               </a:lnSpc>
@@ -20216,35 +20001,30 @@
                 <a:latin typeface="Times New Roman"/>
                 <a:ea typeface="DejaVu Sans"/>
               </a:rPr>
-              <a:t>With noise in data, repair model is </a:t>
-            </a:r>
-            <a:r>
-              <a:rPr b="1" lang="en-US" sz="1600" spc="-1" strike="noStrike">
-                <a:solidFill>
-                  <a:srgbClr val="000000"/>
-                </a:solidFill>
-                <a:latin typeface="Times New Roman"/>
-                <a:ea typeface="DejaVu Sans"/>
-              </a:rPr>
-              <a:t>more sensible</a:t>
-            </a:r>
-            <a:r>
-              <a:rPr b="1" lang="en-US" sz="1600" spc="-1" strike="noStrike">
-                <a:solidFill>
-                  <a:srgbClr val="000000"/>
-                </a:solidFill>
-                <a:latin typeface="Times New Roman"/>
-                <a:ea typeface="DejaVu Sans"/>
-              </a:rPr>
-              <a:t> with noise than inductive miner</a:t>
+              <a:t>With noise in data, repair model is more sensible with noise than inductive miner</a:t>
             </a:r>
             <a:endParaRPr b="0" lang="en-US" sz="1600" spc="-1" strike="noStrike">
               <a:latin typeface="Arial"/>
-              <a:ea typeface="Noto Sans CJK SC Regular"/>
-            </a:endParaRPr>
-          </a:p>
-          <a:p>
-            <a:pPr marL="216000" indent="-213120">
+            </a:endParaRPr>
+          </a:p>
+          <a:p>
+            <a:pPr>
+              <a:lnSpc>
+                <a:spcPct val="100000"/>
+              </a:lnSpc>
+              <a:spcBef>
+                <a:spcPts val="907"/>
+              </a:spcBef>
+              <a:spcAft>
+                <a:spcPts val="312"/>
+              </a:spcAft>
+            </a:pPr>
+            <a:endParaRPr b="0" lang="en-US" sz="1600" spc="-1" strike="noStrike">
+              <a:latin typeface="Arial"/>
+            </a:endParaRPr>
+          </a:p>
+          <a:p>
+            <a:pPr marL="216000" indent="-212760">
               <a:lnSpc>
                 <a:spcPct val="100000"/>
               </a:lnSpc>
@@ -20261,53 +20041,28 @@
               <a:buFont typeface="Wingdings" charset="2"/>
               <a:buChar char=""/>
             </a:pPr>
+            <a:r>
+              <a:rPr b="1" lang="en-US" sz="1600" spc="-1" strike="noStrike">
+                <a:solidFill>
+                  <a:srgbClr val="000000"/>
+                </a:solidFill>
+                <a:latin typeface="Times New Roman"/>
+                <a:ea typeface="DejaVu Sans"/>
+              </a:rPr>
+              <a:t>Without considering negative information, the generated model from both techniques tends to have less precision.</a:t>
+            </a:r>
             <a:endParaRPr b="0" lang="en-US" sz="1600" spc="-1" strike="noStrike">
               <a:latin typeface="Arial"/>
-              <a:ea typeface="Noto Sans CJK SC Regular"/>
-            </a:endParaRPr>
-          </a:p>
-          <a:p>
-            <a:pPr marL="216000" indent="-213120">
-              <a:lnSpc>
-                <a:spcPct val="100000"/>
-              </a:lnSpc>
-              <a:spcBef>
-                <a:spcPts val="907"/>
-              </a:spcBef>
-              <a:spcAft>
-                <a:spcPts val="312"/>
-              </a:spcAft>
-              <a:buClr>
-                <a:srgbClr val="000000"/>
-              </a:buClr>
-              <a:buSzPct val="45000"/>
-              <a:buFont typeface="Wingdings" charset="2"/>
-              <a:buChar char=""/>
-            </a:pPr>
-            <a:r>
-              <a:rPr b="1" lang="en-US" sz="1600" spc="-1" strike="noStrike">
-                <a:solidFill>
-                  <a:srgbClr val="000000"/>
-                </a:solidFill>
-                <a:latin typeface="Times New Roman"/>
-                <a:ea typeface="DejaVu Sans"/>
-              </a:rPr>
-              <a:t>Without considering negative information, the generated model from both techniques tends to have less precision.</a:t>
-            </a:r>
+            </a:endParaRPr>
+          </a:p>
+          <a:p>
+            <a:pPr>
+              <a:lnSpc>
+                <a:spcPct val="100000"/>
+              </a:lnSpc>
+            </a:pPr>
             <a:endParaRPr b="0" lang="en-US" sz="1600" spc="-1" strike="noStrike">
               <a:latin typeface="Arial"/>
-              <a:ea typeface="Noto Sans CJK SC Regular"/>
-            </a:endParaRPr>
-          </a:p>
-          <a:p>
-            <a:pPr>
-              <a:lnSpc>
-                <a:spcPct val="100000"/>
-              </a:lnSpc>
-            </a:pPr>
-            <a:endParaRPr b="0" lang="en-US" sz="1600" spc="-1" strike="noStrike">
-              <a:latin typeface="Arial"/>
-              <a:ea typeface="Noto Sans CJK SC Regular"/>
             </a:endParaRPr>
           </a:p>
         </p:txBody>
@@ -20374,7 +20129,7 @@
         <p:spPr>
           <a:xfrm>
             <a:off x="1720800" y="1877760"/>
-            <a:ext cx="7423200" cy="1688400"/>
+            <a:ext cx="7422840" cy="1688040"/>
           </a:xfrm>
           <a:prstGeom prst="rect">
             <a:avLst/>
@@ -20393,7 +20148,7 @@
         <p:spPr>
           <a:xfrm>
             <a:off x="365760" y="274320"/>
-            <a:ext cx="8318160" cy="816120"/>
+            <a:ext cx="8317800" cy="815760"/>
           </a:xfrm>
           <a:prstGeom prst="rect">
             <a:avLst/>
@@ -20442,7 +20197,7 @@
         <p:spPr>
           <a:xfrm>
             <a:off x="457200" y="1005840"/>
-            <a:ext cx="8135280" cy="3644640"/>
+            <a:ext cx="8134920" cy="3644280"/>
           </a:xfrm>
           <a:prstGeom prst="rect">
             <a:avLst/>
@@ -20461,7 +20216,7 @@
         <p:txBody>
           <a:bodyPr lIns="90000" rIns="90000" tIns="45000" bIns="45000"/>
           <a:p>
-            <a:pPr marL="216000" indent="-213120">
+            <a:pPr marL="216000" indent="-212760">
               <a:lnSpc>
                 <a:spcPct val="100000"/>
               </a:lnSpc>
@@ -20493,7 +20248,7 @@
             </a:endParaRPr>
           </a:p>
           <a:p>
-            <a:pPr marL="216000" indent="-213120">
+            <a:pPr marL="216000" indent="-212760">
               <a:lnSpc>
                 <a:spcPct val="100000"/>
               </a:lnSpc>
@@ -20522,11 +20277,10 @@
             </a:r>
             <a:endParaRPr b="0" lang="en-US" sz="1500" spc="-1" strike="noStrike">
               <a:latin typeface="Arial"/>
-              <a:ea typeface="Noto Sans CJK SC Regular"/>
-            </a:endParaRPr>
-          </a:p>
-          <a:p>
-            <a:pPr marL="216000" indent="-213120">
+            </a:endParaRPr>
+          </a:p>
+          <a:p>
+            <a:pPr marL="216000" indent="-212760">
               <a:lnSpc>
                 <a:spcPct val="100000"/>
               </a:lnSpc>
@@ -20555,7 +20309,6 @@
             </a:r>
             <a:endParaRPr b="0" lang="en-US" sz="1500" spc="-1" strike="noStrike">
               <a:latin typeface="Arial"/>
-              <a:ea typeface="Noto Sans CJK SC Regular"/>
             </a:endParaRPr>
           </a:p>
           <a:p>
@@ -20576,7 +20329,6 @@
             </a:r>
             <a:endParaRPr b="0" lang="en-US" sz="1300" spc="-1" strike="noStrike">
               <a:latin typeface="Arial"/>
-              <a:ea typeface="Noto Sans CJK SC Regular"/>
             </a:endParaRPr>
           </a:p>
           <a:p>
@@ -20597,12 +20349,19 @@
             </a:r>
             <a:endParaRPr b="0" lang="en-US" sz="1300" spc="-1" strike="noStrike">
               <a:latin typeface="Arial"/>
-              <a:ea typeface="Noto Sans CJK SC Regular"/>
-            </a:endParaRPr>
-          </a:p>
-          <a:p>
+            </a:endParaRPr>
+          </a:p>
+          <a:p>
+            <a:pPr>
+              <a:lnSpc>
+                <a:spcPct val="100000"/>
+              </a:lnSpc>
+            </a:pPr>
             <a:r>
               <a:rPr b="0" lang="en-US" sz="1050" spc="-1" strike="noStrike">
+                <a:solidFill>
+                  <a:srgbClr val="000000"/>
+                </a:solidFill>
                 <a:latin typeface="Arial"/>
                 <a:ea typeface="Noto Sans CJK SC Regular"/>
               </a:rPr>
@@ -20613,8 +20372,16 @@
             </a:endParaRPr>
           </a:p>
           <a:p>
+            <a:pPr>
+              <a:lnSpc>
+                <a:spcPct val="100000"/>
+              </a:lnSpc>
+            </a:pPr>
             <a:r>
               <a:rPr b="0" lang="en-US" sz="1050" spc="-1" strike="noStrike">
+                <a:solidFill>
+                  <a:srgbClr val="000000"/>
+                </a:solidFill>
                 <a:latin typeface="Arial"/>
                 <a:ea typeface="Noto Sans CJK SC Regular"/>
               </a:rPr>
@@ -20625,8 +20392,16 @@
             </a:endParaRPr>
           </a:p>
           <a:p>
+            <a:pPr>
+              <a:lnSpc>
+                <a:spcPct val="100000"/>
+              </a:lnSpc>
+            </a:pPr>
             <a:r>
               <a:rPr b="0" lang="en-US" sz="1050" spc="-1" strike="noStrike">
+                <a:solidFill>
+                  <a:srgbClr val="000000"/>
+                </a:solidFill>
                 <a:latin typeface="Arial"/>
                 <a:ea typeface="Noto Sans CJK SC Regular"/>
               </a:rPr>
@@ -20637,8 +20412,16 @@
             </a:endParaRPr>
           </a:p>
           <a:p>
+            <a:pPr>
+              <a:lnSpc>
+                <a:spcPct val="100000"/>
+              </a:lnSpc>
+            </a:pPr>
             <a:r>
               <a:rPr b="0" lang="en-US" sz="1050" spc="-1" strike="noStrike">
+                <a:solidFill>
+                  <a:srgbClr val="000000"/>
+                </a:solidFill>
                 <a:latin typeface="Arial"/>
                 <a:ea typeface="Noto Sans CJK SC Regular"/>
               </a:rPr>
@@ -20649,7 +20432,10 @@
             </a:endParaRPr>
           </a:p>
           <a:p>
-            <a:pPr marL="216000" indent="-213120">
+            <a:pPr marL="216000" indent="-212760">
+              <a:lnSpc>
+                <a:spcPct val="100000"/>
+              </a:lnSpc>
               <a:spcBef>
                 <a:spcPts val="624"/>
               </a:spcBef>
@@ -20665,6 +20451,9 @@
             </a:pPr>
             <a:r>
               <a:rPr b="1" lang="en-US" sz="1300" spc="-1" strike="noStrike">
+                <a:solidFill>
+                  <a:srgbClr val="000000"/>
+                </a:solidFill>
                 <a:latin typeface="TiMES New Romans"/>
                 <a:ea typeface="Noto Sans CJK SC Regular"/>
               </a:rPr>
@@ -20675,19 +20464,16 @@
             </a:endParaRPr>
           </a:p>
           <a:p>
-            <a:pPr marL="216000" indent="-213120">
+            <a:pPr>
+              <a:lnSpc>
+                <a:spcPct val="100000"/>
+              </a:lnSpc>
               <a:spcBef>
                 <a:spcPts val="624"/>
               </a:spcBef>
               <a:spcAft>
                 <a:spcPts val="28"/>
               </a:spcAft>
-              <a:buClr>
-                <a:srgbClr val="000000"/>
-              </a:buClr>
-              <a:buSzPct val="45000"/>
-              <a:buFont typeface="Wingdings" charset="2"/>
-              <a:buChar char=""/>
             </a:pPr>
             <a:endParaRPr b="0" lang="en-US" sz="1300" spc="-1" strike="noStrike">
               <a:latin typeface="Arial"/>
@@ -20711,7 +20497,6 @@
             </a:r>
             <a:endParaRPr b="0" lang="en-US" sz="1500" spc="-1" strike="noStrike">
               <a:latin typeface="Arial"/>
-              <a:ea typeface="Noto Sans CJK SC Regular"/>
             </a:endParaRPr>
           </a:p>
           <a:p>
@@ -20731,7 +20516,23 @@
             </a:endParaRPr>
           </a:p>
           <a:p>
-            <a:pPr marL="216000" indent="-213120">
+            <a:pPr>
+              <a:lnSpc>
+                <a:spcPct val="100000"/>
+              </a:lnSpc>
+              <a:spcBef>
+                <a:spcPts val="1191"/>
+              </a:spcBef>
+              <a:spcAft>
+                <a:spcPts val="595"/>
+              </a:spcAft>
+            </a:pPr>
+            <a:endParaRPr b="0" lang="en-US" sz="1500" spc="-1" strike="noStrike">
+              <a:latin typeface="Arial"/>
+            </a:endParaRPr>
+          </a:p>
+          <a:p>
+            <a:pPr marL="216000" indent="-212760">
               <a:lnSpc>
                 <a:spcPct val="100000"/>
               </a:lnSpc>
@@ -20748,12 +20549,22 @@
               <a:buFont typeface="Wingdings" charset="2"/>
               <a:buChar char=""/>
             </a:pPr>
-            <a:endParaRPr b="0" lang="en-US" sz="1500" spc="-1" strike="noStrike">
-              <a:latin typeface="Arial"/>
-            </a:endParaRPr>
-          </a:p>
-          <a:p>
-            <a:pPr marL="216000" indent="-213120">
+            <a:r>
+              <a:rPr b="1" lang="en-US" sz="2400" spc="-1" strike="noStrike">
+                <a:solidFill>
+                  <a:srgbClr val="000000"/>
+                </a:solidFill>
+                <a:latin typeface="Times New Roman"/>
+                <a:ea typeface="DejaVu Sans"/>
+              </a:rPr>
+              <a:t>Case 2:</a:t>
+            </a:r>
+            <a:endParaRPr b="0" lang="en-US" sz="2400" spc="-1" strike="noStrike">
+              <a:latin typeface="Arial"/>
+            </a:endParaRPr>
+          </a:p>
+          <a:p>
+            <a:pPr>
               <a:lnSpc>
                 <a:spcPct val="100000"/>
               </a:lnSpc>
@@ -20763,44 +20574,6 @@
               <a:spcAft>
                 <a:spcPts val="595"/>
               </a:spcAft>
-              <a:buClr>
-                <a:srgbClr val="000000"/>
-              </a:buClr>
-              <a:buSzPct val="45000"/>
-              <a:buFont typeface="Wingdings" charset="2"/>
-              <a:buChar char=""/>
-            </a:pPr>
-            <a:r>
-              <a:rPr b="1" lang="en-US" sz="2400" spc="-1" strike="noStrike">
-                <a:solidFill>
-                  <a:srgbClr val="000000"/>
-                </a:solidFill>
-                <a:latin typeface="Times New Roman"/>
-                <a:ea typeface="DejaVu Sans"/>
-              </a:rPr>
-              <a:t>Case 2:</a:t>
-            </a:r>
-            <a:endParaRPr b="0" lang="en-US" sz="2400" spc="-1" strike="noStrike">
-              <a:latin typeface="Arial"/>
-            </a:endParaRPr>
-          </a:p>
-          <a:p>
-            <a:pPr marL="216000" indent="-213120">
-              <a:lnSpc>
-                <a:spcPct val="100000"/>
-              </a:lnSpc>
-              <a:spcBef>
-                <a:spcPts val="1191"/>
-              </a:spcBef>
-              <a:spcAft>
-                <a:spcPts val="595"/>
-              </a:spcAft>
-              <a:buClr>
-                <a:srgbClr val="000000"/>
-              </a:buClr>
-              <a:buSzPct val="45000"/>
-              <a:buFont typeface="Wingdings" charset="2"/>
-              <a:buChar char=""/>
             </a:pPr>
             <a:endParaRPr b="0" lang="en-US" sz="2400" spc="-1" strike="noStrike">
               <a:latin typeface="Arial"/>
@@ -20902,7 +20675,7 @@
         <p:spPr>
           <a:xfrm>
             <a:off x="365760" y="274320"/>
-            <a:ext cx="6397920" cy="451800"/>
+            <a:ext cx="6397560" cy="451440"/>
           </a:xfrm>
           <a:prstGeom prst="rect">
             <a:avLst/>
@@ -20951,7 +20724,7 @@
         <p:spPr>
           <a:xfrm>
             <a:off x="457200" y="1005840"/>
-            <a:ext cx="8135280" cy="4487040"/>
+            <a:ext cx="8134920" cy="4486680"/>
           </a:xfrm>
           <a:prstGeom prst="rect">
             <a:avLst/>
@@ -20970,7 +20743,7 @@
         <p:txBody>
           <a:bodyPr lIns="90000" rIns="90000" tIns="45000" bIns="45000"/>
           <a:p>
-            <a:pPr marL="216000" indent="-213120">
+            <a:pPr marL="216000" indent="-212760">
               <a:lnSpc>
                 <a:spcPct val="100000"/>
               </a:lnSpc>
@@ -21002,7 +20775,7 @@
             </a:endParaRPr>
           </a:p>
           <a:p>
-            <a:pPr lvl="2" marL="648000" indent="-213120">
+            <a:pPr lvl="2" marL="648000" indent="-212760">
               <a:lnSpc>
                 <a:spcPct val="100000"/>
               </a:lnSpc>
@@ -21034,7 +20807,7 @@
             </a:endParaRPr>
           </a:p>
           <a:p>
-            <a:pPr lvl="2" marL="648000" indent="-213120">
+            <a:pPr lvl="2" marL="648000" indent="-212760">
               <a:lnSpc>
                 <a:spcPct val="100000"/>
               </a:lnSpc>
@@ -21092,7 +20865,7 @@
             </a:endParaRPr>
           </a:p>
           <a:p>
-            <a:pPr marL="216000" indent="-213120">
+            <a:pPr marL="216000" indent="-212760">
               <a:lnSpc>
                 <a:spcPct val="100000"/>
               </a:lnSpc>
@@ -21124,7 +20897,7 @@
             </a:endParaRPr>
           </a:p>
           <a:p>
-            <a:pPr lvl="2" marL="648000" indent="-213120">
+            <a:pPr lvl="2" marL="648000" indent="-212760">
               <a:lnSpc>
                 <a:spcPct val="100000"/>
               </a:lnSpc>
@@ -21156,7 +20929,7 @@
             </a:endParaRPr>
           </a:p>
           <a:p>
-            <a:pPr lvl="2" marL="648000" indent="-213120">
+            <a:pPr lvl="2" marL="648000" indent="-212760">
               <a:lnSpc>
                 <a:spcPct val="100000"/>
               </a:lnSpc>
@@ -21204,7 +20977,7 @@
             </a:endParaRPr>
           </a:p>
           <a:p>
-            <a:pPr marL="216000" indent="-213120">
+            <a:pPr marL="216000" indent="-212760">
               <a:lnSpc>
                 <a:spcPct val="100000"/>
               </a:lnSpc>
@@ -21319,7 +21092,7 @@
         <p:spPr>
           <a:xfrm>
             <a:off x="1188720" y="1139400"/>
-            <a:ext cx="7411680" cy="5033880"/>
+            <a:ext cx="7411320" cy="5033520"/>
           </a:xfrm>
           <a:prstGeom prst="rect">
             <a:avLst/>
@@ -21338,7 +21111,7 @@
         <p:spPr>
           <a:xfrm>
             <a:off x="457200" y="457200"/>
-            <a:ext cx="6398640" cy="303120"/>
+            <a:ext cx="6398280" cy="302760"/>
           </a:xfrm>
           <a:prstGeom prst="rect">
             <a:avLst/>
@@ -21436,7 +21209,7 @@
         <p:spPr>
           <a:xfrm>
             <a:off x="457200" y="457200"/>
-            <a:ext cx="6398640" cy="303120"/>
+            <a:ext cx="6398280" cy="302760"/>
           </a:xfrm>
           <a:prstGeom prst="rect">
             <a:avLst/>
@@ -21489,7 +21262,7 @@
         <p:spPr>
           <a:xfrm>
             <a:off x="333000" y="901800"/>
-            <a:ext cx="7803000" cy="5862600"/>
+            <a:ext cx="7802640" cy="5862240"/>
           </a:xfrm>
           <a:prstGeom prst="rect">
             <a:avLst/>
@@ -21561,7 +21334,7 @@
         <p:spPr>
           <a:xfrm>
             <a:off x="640080" y="1188720"/>
-            <a:ext cx="4626720" cy="2255040"/>
+            <a:ext cx="4626360" cy="2254680"/>
           </a:xfrm>
           <a:prstGeom prst="rect">
             <a:avLst/>
@@ -21629,7 +21402,7 @@
         <p:spPr>
           <a:xfrm>
             <a:off x="365760" y="274320"/>
-            <a:ext cx="6397920" cy="451800"/>
+            <a:ext cx="6397560" cy="451440"/>
           </a:xfrm>
           <a:prstGeom prst="rect">
             <a:avLst/>
@@ -21678,7 +21451,7 @@
         <p:spPr>
           <a:xfrm>
             <a:off x="182880" y="1005840"/>
-            <a:ext cx="8135280" cy="3213720"/>
+            <a:ext cx="8134920" cy="3213360"/>
           </a:xfrm>
           <a:prstGeom prst="rect">
             <a:avLst/>
@@ -21697,7 +21470,7 @@
         <p:txBody>
           <a:bodyPr lIns="90000" rIns="90000" tIns="45000" bIns="45000" anchor="ctr"/>
           <a:p>
-            <a:pPr marL="216000" indent="-213120">
+            <a:pPr marL="216000" indent="-212760">
               <a:lnSpc>
                 <a:spcPct val="100000"/>
               </a:lnSpc>
@@ -21729,7 +21502,7 @@
             </a:endParaRPr>
           </a:p>
           <a:p>
-            <a:pPr lvl="2" marL="648000" indent="-213120">
+            <a:pPr lvl="2" marL="648000" indent="-212760">
               <a:lnSpc>
                 <a:spcPct val="100000"/>
               </a:lnSpc>
@@ -21761,7 +21534,7 @@
             </a:endParaRPr>
           </a:p>
           <a:p>
-            <a:pPr lvl="2" marL="648000" indent="-213120">
+            <a:pPr lvl="2" marL="648000" indent="-212760">
               <a:lnSpc>
                 <a:spcPct val="100000"/>
               </a:lnSpc>
@@ -21793,7 +21566,7 @@
             </a:endParaRPr>
           </a:p>
           <a:p>
-            <a:pPr marL="216000" indent="-213120">
+            <a:pPr marL="216000" indent="-212760">
               <a:lnSpc>
                 <a:spcPct val="100000"/>
               </a:lnSpc>
@@ -21825,7 +21598,7 @@
             </a:endParaRPr>
           </a:p>
           <a:p>
-            <a:pPr lvl="2" marL="648000" indent="-213120">
+            <a:pPr lvl="2" marL="648000" indent="-212760">
               <a:lnSpc>
                 <a:spcPct val="100000"/>
               </a:lnSpc>
@@ -21891,7 +21664,7 @@
         <p:spPr>
           <a:xfrm>
             <a:off x="4114800" y="2926080"/>
-            <a:ext cx="4660560" cy="2738520"/>
+            <a:ext cx="4660200" cy="2738160"/>
           </a:xfrm>
           <a:prstGeom prst="rect">
             <a:avLst/>
@@ -21959,7 +21732,7 @@
         <p:spPr>
           <a:xfrm>
             <a:off x="365760" y="1544760"/>
-            <a:ext cx="8563320" cy="281160"/>
+            <a:ext cx="8562960" cy="280800"/>
           </a:xfrm>
           <a:prstGeom prst="rect">
             <a:avLst/>
@@ -22077,7 +21850,7 @@
         <p:spPr>
           <a:xfrm>
             <a:off x="365760" y="274320"/>
-            <a:ext cx="6397920" cy="451800"/>
+            <a:ext cx="6397560" cy="451440"/>
           </a:xfrm>
           <a:prstGeom prst="rect">
             <a:avLst/>
@@ -22126,7 +21899,7 @@
         <p:spPr>
           <a:xfrm>
             <a:off x="457200" y="1005840"/>
-            <a:ext cx="8135280" cy="5664600"/>
+            <a:ext cx="8134920" cy="5664240"/>
           </a:xfrm>
           <a:prstGeom prst="rect">
             <a:avLst/>
@@ -22145,7 +21918,7 @@
         <p:txBody>
           <a:bodyPr lIns="90000" rIns="90000" tIns="45000" bIns="45000"/>
           <a:p>
-            <a:pPr marL="216000" indent="-213120">
+            <a:pPr marL="216000" indent="-212760">
               <a:lnSpc>
                 <a:spcPct val="100000"/>
               </a:lnSpc>
@@ -22177,7 +21950,7 @@
             </a:endParaRPr>
           </a:p>
           <a:p>
-            <a:pPr lvl="2" marL="648000" indent="-213120">
+            <a:pPr lvl="2" marL="648000" indent="-212760">
               <a:lnSpc>
                 <a:spcPct val="100000"/>
               </a:lnSpc>
@@ -22219,7 +21992,7 @@
             </a:endParaRPr>
           </a:p>
           <a:p>
-            <a:pPr lvl="2" marL="648000" indent="-213120">
+            <a:pPr lvl="2" marL="648000" indent="-212760">
               <a:lnSpc>
                 <a:spcPct val="100000"/>
               </a:lnSpc>
@@ -22261,7 +22034,7 @@
             </a:endParaRPr>
           </a:p>
           <a:p>
-            <a:pPr marL="216000" indent="-213120">
+            <a:pPr marL="216000" indent="-212760">
               <a:lnSpc>
                 <a:spcPct val="100000"/>
               </a:lnSpc>
@@ -22293,7 +22066,7 @@
             </a:endParaRPr>
           </a:p>
           <a:p>
-            <a:pPr lvl="2" marL="648000" indent="-213120">
+            <a:pPr lvl="2" marL="648000" indent="-212760">
               <a:lnSpc>
                 <a:spcPct val="100000"/>
               </a:lnSpc>
@@ -22325,7 +22098,7 @@
             </a:endParaRPr>
           </a:p>
           <a:p>
-            <a:pPr lvl="2" marL="648000" indent="-213120">
+            <a:pPr lvl="2" marL="648000" indent="-212760">
               <a:lnSpc>
                 <a:spcPct val="100000"/>
               </a:lnSpc>
@@ -22357,7 +22130,7 @@
             </a:endParaRPr>
           </a:p>
           <a:p>
-            <a:pPr lvl="2" marL="648000" indent="-213120">
+            <a:pPr lvl="2" marL="648000" indent="-212760">
               <a:lnSpc>
                 <a:spcPct val="100000"/>
               </a:lnSpc>
@@ -22389,7 +22162,7 @@
             </a:endParaRPr>
           </a:p>
           <a:p>
-            <a:pPr marL="216000" indent="-213120">
+            <a:pPr marL="216000" indent="-212760">
               <a:lnSpc>
                 <a:spcPct val="100000"/>
               </a:lnSpc>
@@ -22421,7 +22194,7 @@
             </a:endParaRPr>
           </a:p>
           <a:p>
-            <a:pPr lvl="2" marL="648000" indent="-213120">
+            <a:pPr lvl="2" marL="648000" indent="-212760">
               <a:lnSpc>
                 <a:spcPct val="100000"/>
               </a:lnSpc>
@@ -22453,7 +22226,7 @@
             </a:endParaRPr>
           </a:p>
           <a:p>
-            <a:pPr lvl="2" marL="648000" indent="-213120">
+            <a:pPr lvl="2" marL="648000" indent="-212760">
               <a:lnSpc>
                 <a:spcPct val="100000"/>
               </a:lnSpc>
@@ -22485,7 +22258,7 @@
             </a:endParaRPr>
           </a:p>
           <a:p>
-            <a:pPr lvl="2" marL="648000" indent="-213120">
+            <a:pPr lvl="2" marL="648000" indent="-212760">
               <a:lnSpc>
                 <a:spcPct val="100000"/>
               </a:lnSpc>
@@ -22600,7 +22373,7 @@
         <p:spPr>
           <a:xfrm>
             <a:off x="4207680" y="5303520"/>
-            <a:ext cx="2741760" cy="1464840"/>
+            <a:ext cx="2741400" cy="1464480"/>
           </a:xfrm>
           <a:prstGeom prst="rect">
             <a:avLst/>
@@ -22619,7 +22392,7 @@
         <p:spPr>
           <a:xfrm>
             <a:off x="365760" y="274320"/>
-            <a:ext cx="8318160" cy="816120"/>
+            <a:ext cx="8317800" cy="815760"/>
           </a:xfrm>
           <a:prstGeom prst="rect">
             <a:avLst/>
@@ -22672,7 +22445,7 @@
         <p:spPr>
           <a:xfrm>
             <a:off x="4206240" y="3088440"/>
-            <a:ext cx="4937040" cy="934200"/>
+            <a:ext cx="4936680" cy="933840"/>
           </a:xfrm>
           <a:prstGeom prst="rect">
             <a:avLst/>
@@ -22691,7 +22464,7 @@
         <p:spPr>
           <a:xfrm>
             <a:off x="457200" y="1005840"/>
-            <a:ext cx="8135280" cy="4406040"/>
+            <a:ext cx="8134920" cy="4405680"/>
           </a:xfrm>
           <a:prstGeom prst="rect">
             <a:avLst/>
@@ -22710,7 +22483,7 @@
         <p:txBody>
           <a:bodyPr lIns="90000" rIns="90000" tIns="45000" bIns="45000"/>
           <a:p>
-            <a:pPr marL="216000" indent="-213120">
+            <a:pPr marL="216000" indent="-212760">
               <a:lnSpc>
                 <a:spcPct val="100000"/>
               </a:lnSpc>
@@ -22782,7 +22555,7 @@
             </a:endParaRPr>
           </a:p>
           <a:p>
-            <a:pPr marL="216000" indent="-213120">
+            <a:pPr marL="216000" indent="-212760">
               <a:lnSpc>
                 <a:spcPct val="100000"/>
               </a:lnSpc>
@@ -22814,7 +22587,7 @@
             </a:endParaRPr>
           </a:p>
           <a:p>
-            <a:pPr marL="216000" indent="-213120">
+            <a:pPr marL="216000" indent="-212760">
               <a:lnSpc>
                 <a:spcPct val="100000"/>
               </a:lnSpc>
@@ -22846,7 +22619,7 @@
             </a:endParaRPr>
           </a:p>
           <a:p>
-            <a:pPr marL="216000" indent="-213120">
+            <a:pPr marL="216000" indent="-212760">
               <a:lnSpc>
                 <a:spcPct val="100000"/>
               </a:lnSpc>
@@ -23030,7 +22803,7 @@
             </a:endParaRPr>
           </a:p>
           <a:p>
-            <a:pPr marL="216000" indent="-213120">
+            <a:pPr marL="216000" indent="-212760">
               <a:lnSpc>
                 <a:spcPct val="100000"/>
               </a:lnSpc>
@@ -23062,7 +22835,7 @@
             </a:endParaRPr>
           </a:p>
           <a:p>
-            <a:pPr marL="216000" indent="-213120">
+            <a:pPr marL="216000" indent="-212760">
               <a:lnSpc>
                 <a:spcPct val="100000"/>
               </a:lnSpc>
@@ -23124,7 +22897,7 @@
             </a:endParaRPr>
           </a:p>
           <a:p>
-            <a:pPr marL="216000" indent="-213120">
+            <a:pPr marL="216000" indent="-212760">
               <a:lnSpc>
                 <a:spcPct val="100000"/>
               </a:lnSpc>
@@ -23156,7 +22929,7 @@
             </a:endParaRPr>
           </a:p>
           <a:p>
-            <a:pPr marL="216000" indent="-213120">
+            <a:pPr marL="216000" indent="-212760">
               <a:lnSpc>
                 <a:spcPct val="100000"/>
               </a:lnSpc>
@@ -23224,7 +22997,7 @@
             </a:endParaRPr>
           </a:p>
           <a:p>
-            <a:pPr marL="216000" indent="-213120">
+            <a:pPr marL="216000" indent="-212760">
               <a:lnSpc>
                 <a:spcPct val="100000"/>
               </a:lnSpc>
@@ -23285,17 +23058,7 @@
                 <a:latin typeface="Times New Roman"/>
                 <a:ea typeface="DejaVu Sans"/>
               </a:rPr>
-              <a:t>**add events by self-loop  :: </a:t>
-            </a:r>
-            <a:r>
-              <a:rPr b="1" lang="en-US" sz="1300" spc="-1" strike="noStrike">
-                <a:solidFill>
-                  <a:srgbClr val="000000"/>
-                </a:solidFill>
-                <a:latin typeface="Times New Roman"/>
-                <a:ea typeface="DejaVu Sans"/>
-              </a:rPr>
-              <a:t>R1.17</a:t>
+              <a:t>**add events by self-loop  :: R1.17</a:t>
             </a:r>
             <a:endParaRPr b="0" lang="en-US" sz="1300" spc="-1" strike="noStrike">
               <a:latin typeface="Arial"/>
@@ -23352,7 +23115,7 @@
         <p:spPr>
           <a:xfrm>
             <a:off x="5670360" y="1005840"/>
-            <a:ext cx="3197520" cy="864720"/>
+            <a:ext cx="3197160" cy="864360"/>
           </a:xfrm>
           <a:prstGeom prst="rect">
             <a:avLst/>
@@ -23375,7 +23138,7 @@
         <p:spPr>
           <a:xfrm>
             <a:off x="5852160" y="1872360"/>
-            <a:ext cx="2832840" cy="412920"/>
+            <a:ext cx="2832480" cy="412560"/>
           </a:xfrm>
           <a:prstGeom prst="rect">
             <a:avLst/>
@@ -23398,7 +23161,7 @@
         <p:spPr>
           <a:xfrm>
             <a:off x="5943600" y="2468880"/>
-            <a:ext cx="3198600" cy="456480"/>
+            <a:ext cx="3198240" cy="456120"/>
           </a:xfrm>
           <a:prstGeom prst="rect">
             <a:avLst/>
@@ -23417,7 +23180,7 @@
         <p:spPr>
           <a:xfrm>
             <a:off x="5029200" y="2560320"/>
-            <a:ext cx="1369800" cy="518400"/>
+            <a:ext cx="1369440" cy="518040"/>
           </a:xfrm>
           <a:prstGeom prst="rect">
             <a:avLst/>
@@ -23466,7 +23229,7 @@
         <p:spPr>
           <a:xfrm>
             <a:off x="4938840" y="1920240"/>
-            <a:ext cx="1095480" cy="518400"/>
+            <a:ext cx="1095120" cy="518040"/>
           </a:xfrm>
           <a:prstGeom prst="rect">
             <a:avLst/>
@@ -23515,7 +23278,7 @@
         <p:spPr>
           <a:xfrm>
             <a:off x="4846320" y="1249200"/>
-            <a:ext cx="912600" cy="256320"/>
+            <a:ext cx="912240" cy="255960"/>
           </a:xfrm>
           <a:prstGeom prst="rect">
             <a:avLst/>
@@ -23564,7 +23327,7 @@
         <p:spPr>
           <a:xfrm>
             <a:off x="6492240" y="3870000"/>
-            <a:ext cx="1369800" cy="335520"/>
+            <a:ext cx="1369440" cy="335160"/>
           </a:xfrm>
           <a:prstGeom prst="rect">
             <a:avLst/>
@@ -23613,7 +23376,7 @@
         <p:spPr>
           <a:xfrm>
             <a:off x="3200400" y="5973120"/>
-            <a:ext cx="1369800" cy="335520"/>
+            <a:ext cx="1369440" cy="335160"/>
           </a:xfrm>
           <a:prstGeom prst="rect">
             <a:avLst/>
@@ -23666,7 +23429,7 @@
         <p:spPr>
           <a:xfrm>
             <a:off x="5669280" y="4206240"/>
-            <a:ext cx="3367080" cy="1096560"/>
+            <a:ext cx="3366720" cy="1096200"/>
           </a:xfrm>
           <a:prstGeom prst="rect">
             <a:avLst/>
@@ -23685,7 +23448,7 @@
         <p:spPr>
           <a:xfrm>
             <a:off x="6949440" y="5303520"/>
-            <a:ext cx="1369800" cy="335520"/>
+            <a:ext cx="1369440" cy="335160"/>
           </a:xfrm>
           <a:prstGeom prst="rect">
             <a:avLst/>
@@ -23783,7 +23546,7 @@
         <p:spPr>
           <a:xfrm>
             <a:off x="365760" y="274320"/>
-            <a:ext cx="8318160" cy="816120"/>
+            <a:ext cx="8317800" cy="815760"/>
           </a:xfrm>
           <a:prstGeom prst="rect">
             <a:avLst/>
@@ -23832,7 +23595,7 @@
         <p:spPr>
           <a:xfrm>
             <a:off x="457200" y="1005840"/>
-            <a:ext cx="8135280" cy="4406040"/>
+            <a:ext cx="8134920" cy="4405680"/>
           </a:xfrm>
           <a:prstGeom prst="rect">
             <a:avLst/>
@@ -23851,7 +23614,7 @@
         <p:txBody>
           <a:bodyPr lIns="90000" rIns="90000" tIns="45000" bIns="45000"/>
           <a:p>
-            <a:pPr marL="216000" indent="-213120">
+            <a:pPr marL="216000" indent="-212760">
               <a:lnSpc>
                 <a:spcPct val="100000"/>
               </a:lnSpc>
@@ -23919,7 +23682,7 @@
             </a:endParaRPr>
           </a:p>
           <a:p>
-            <a:pPr marL="216000" indent="-213120">
+            <a:pPr marL="216000" indent="-212760">
               <a:lnSpc>
                 <a:spcPct val="100000"/>
               </a:lnSpc>
@@ -23951,7 +23714,7 @@
             </a:endParaRPr>
           </a:p>
           <a:p>
-            <a:pPr marL="216000" indent="-213120">
+            <a:pPr marL="216000" indent="-212760">
               <a:lnSpc>
                 <a:spcPct val="100000"/>
               </a:lnSpc>
@@ -24195,7 +23958,7 @@
         <p:spPr>
           <a:xfrm>
             <a:off x="5670360" y="1005840"/>
-            <a:ext cx="3197520" cy="864720"/>
+            <a:ext cx="3197160" cy="864360"/>
           </a:xfrm>
           <a:prstGeom prst="rect">
             <a:avLst/>
@@ -24214,7 +23977,7 @@
         <p:spPr>
           <a:xfrm>
             <a:off x="6217920" y="2560320"/>
-            <a:ext cx="1004760" cy="273240"/>
+            <a:ext cx="1004400" cy="272880"/>
           </a:xfrm>
           <a:prstGeom prst="rect">
             <a:avLst/>
@@ -24263,7 +24026,7 @@
         <p:spPr>
           <a:xfrm>
             <a:off x="4846320" y="1249200"/>
-            <a:ext cx="912600" cy="256320"/>
+            <a:ext cx="912240" cy="255960"/>
           </a:xfrm>
           <a:prstGeom prst="rect">
             <a:avLst/>
@@ -24316,7 +24079,7 @@
         <p:spPr>
           <a:xfrm>
             <a:off x="4566240" y="2061000"/>
-            <a:ext cx="4210920" cy="498240"/>
+            <a:ext cx="4210560" cy="497880"/>
           </a:xfrm>
           <a:prstGeom prst="rect">
             <a:avLst/>
@@ -24339,7 +24102,7 @@
         <p:spPr>
           <a:xfrm>
             <a:off x="5572080" y="3566160"/>
-            <a:ext cx="3479040" cy="987840"/>
+            <a:ext cx="3478680" cy="987480"/>
           </a:xfrm>
           <a:prstGeom prst="rect">
             <a:avLst/>
@@ -24358,7 +24121,7 @@
         <p:spPr>
           <a:xfrm>
             <a:off x="6583680" y="4663440"/>
-            <a:ext cx="1004760" cy="273240"/>
+            <a:ext cx="1004400" cy="272880"/>
           </a:xfrm>
           <a:prstGeom prst="rect">
             <a:avLst/>
@@ -24456,7 +24219,7 @@
         <p:spPr>
           <a:xfrm>
             <a:off x="365760" y="274320"/>
-            <a:ext cx="8318160" cy="816120"/>
+            <a:ext cx="8317800" cy="815760"/>
           </a:xfrm>
           <a:prstGeom prst="rect">
             <a:avLst/>
@@ -24505,7 +24268,7 @@
         <p:spPr>
           <a:xfrm>
             <a:off x="457200" y="1005840"/>
-            <a:ext cx="8135280" cy="4406040"/>
+            <a:ext cx="8134920" cy="4405680"/>
           </a:xfrm>
           <a:prstGeom prst="rect">
             <a:avLst/>
@@ -24524,7 +24287,7 @@
         <p:txBody>
           <a:bodyPr lIns="90000" rIns="90000" tIns="45000" bIns="45000"/>
           <a:p>
-            <a:pPr marL="216000" indent="-213120">
+            <a:pPr marL="216000" indent="-212760">
               <a:lnSpc>
                 <a:spcPct val="100000"/>
               </a:lnSpc>
@@ -24576,7 +24339,7 @@
             </a:endParaRPr>
           </a:p>
           <a:p>
-            <a:pPr marL="216000" indent="-213120">
+            <a:pPr marL="216000" indent="-212760">
               <a:lnSpc>
                 <a:spcPct val="100000"/>
               </a:lnSpc>
@@ -24608,7 +24371,7 @@
             </a:endParaRPr>
           </a:p>
           <a:p>
-            <a:pPr marL="216000" indent="-213120">
+            <a:pPr marL="216000" indent="-212760">
               <a:lnSpc>
                 <a:spcPct val="100000"/>
               </a:lnSpc>
@@ -24640,7 +24403,7 @@
             </a:endParaRPr>
           </a:p>
           <a:p>
-            <a:pPr marL="216000" indent="-213120">
+            <a:pPr marL="216000" indent="-212760">
               <a:lnSpc>
                 <a:spcPct val="100000"/>
               </a:lnSpc>
@@ -24720,7 +24483,7 @@
             </a:endParaRPr>
           </a:p>
           <a:p>
-            <a:pPr marL="216000" indent="-213120">
+            <a:pPr marL="216000" indent="-212760">
               <a:lnSpc>
                 <a:spcPct val="100000"/>
               </a:lnSpc>
@@ -24762,7 +24525,7 @@
             </a:endParaRPr>
           </a:p>
           <a:p>
-            <a:pPr marL="216000" indent="-213120">
+            <a:pPr marL="216000" indent="-212760">
               <a:lnSpc>
                 <a:spcPct val="100000"/>
               </a:lnSpc>
@@ -24794,7 +24557,7 @@
             </a:endParaRPr>
           </a:p>
           <a:p>
-            <a:pPr marL="216000" indent="-213120">
+            <a:pPr marL="216000" indent="-212760">
               <a:lnSpc>
                 <a:spcPct val="100000"/>
               </a:lnSpc>
@@ -24826,7 +24589,7 @@
             </a:endParaRPr>
           </a:p>
           <a:p>
-            <a:pPr marL="216000" indent="-213120">
+            <a:pPr marL="216000" indent="-212760">
               <a:lnSpc>
                 <a:spcPct val="100000"/>
               </a:lnSpc>
@@ -24934,7 +24697,7 @@
         <p:spPr>
           <a:xfrm>
             <a:off x="5670360" y="1005840"/>
-            <a:ext cx="3197520" cy="864720"/>
+            <a:ext cx="3197160" cy="864360"/>
           </a:xfrm>
           <a:prstGeom prst="rect">
             <a:avLst/>
@@ -24953,7 +24716,7 @@
         <p:spPr>
           <a:xfrm>
             <a:off x="6309360" y="3320280"/>
-            <a:ext cx="1369800" cy="518400"/>
+            <a:ext cx="1369440" cy="518040"/>
           </a:xfrm>
           <a:prstGeom prst="rect">
             <a:avLst/>
@@ -25002,7 +24765,7 @@
         <p:spPr>
           <a:xfrm>
             <a:off x="4937760" y="1948680"/>
-            <a:ext cx="1095480" cy="518400"/>
+            <a:ext cx="1095120" cy="518040"/>
           </a:xfrm>
           <a:prstGeom prst="rect">
             <a:avLst/>
@@ -25051,7 +24814,7 @@
         <p:spPr>
           <a:xfrm>
             <a:off x="4846320" y="1249200"/>
-            <a:ext cx="912600" cy="256320"/>
+            <a:ext cx="912240" cy="255960"/>
           </a:xfrm>
           <a:prstGeom prst="rect">
             <a:avLst/>
@@ -25100,7 +24863,7 @@
         <p:spPr>
           <a:xfrm>
             <a:off x="6675120" y="5606280"/>
-            <a:ext cx="1369800" cy="335520"/>
+            <a:ext cx="1369440" cy="335160"/>
           </a:xfrm>
           <a:prstGeom prst="rect">
             <a:avLst/>
@@ -25153,7 +24916,7 @@
         <p:spPr>
           <a:xfrm>
             <a:off x="5852160" y="1872360"/>
-            <a:ext cx="3472920" cy="457200"/>
+            <a:ext cx="3472560" cy="456840"/>
           </a:xfrm>
           <a:prstGeom prst="rect">
             <a:avLst/>
@@ -25176,7 +24939,7 @@
         <p:spPr>
           <a:xfrm>
             <a:off x="4748760" y="2740680"/>
-            <a:ext cx="4393440" cy="457920"/>
+            <a:ext cx="4393080" cy="457560"/>
           </a:xfrm>
           <a:prstGeom prst="rect">
             <a:avLst/>
@@ -25199,7 +24962,7 @@
         <p:spPr>
           <a:xfrm>
             <a:off x="5394960" y="3781440"/>
-            <a:ext cx="3589560" cy="788760"/>
+            <a:ext cx="3589200" cy="788400"/>
           </a:xfrm>
           <a:prstGeom prst="rect">
             <a:avLst/>
@@ -25222,7 +24985,7 @@
         <p:spPr>
           <a:xfrm>
             <a:off x="5388840" y="4846320"/>
-            <a:ext cx="4119120" cy="776880"/>
+            <a:ext cx="4118760" cy="776520"/>
           </a:xfrm>
           <a:prstGeom prst="rect">
             <a:avLst/>
@@ -25241,7 +25004,7 @@
         <p:spPr>
           <a:xfrm>
             <a:off x="6492240" y="4600440"/>
-            <a:ext cx="1369800" cy="335520"/>
+            <a:ext cx="1369440" cy="335160"/>
           </a:xfrm>
           <a:prstGeom prst="rect">
             <a:avLst/>
@@ -25339,7 +25102,7 @@
         <p:spPr>
           <a:xfrm>
             <a:off x="365760" y="274320"/>
-            <a:ext cx="8318160" cy="816120"/>
+            <a:ext cx="8317800" cy="815760"/>
           </a:xfrm>
           <a:prstGeom prst="rect">
             <a:avLst/>
@@ -25392,7 +25155,7 @@
         <p:spPr>
           <a:xfrm>
             <a:off x="735480" y="4846320"/>
-            <a:ext cx="5664240" cy="1096200"/>
+            <a:ext cx="5663880" cy="1095840"/>
           </a:xfrm>
           <a:prstGeom prst="rect">
             <a:avLst/>
@@ -25411,7 +25174,7 @@
         <p:spPr>
           <a:xfrm>
             <a:off x="457200" y="1005840"/>
-            <a:ext cx="8135280" cy="4406040"/>
+            <a:ext cx="8134920" cy="4405680"/>
           </a:xfrm>
           <a:prstGeom prst="rect">
             <a:avLst/>
@@ -25496,7 +25259,7 @@
             </a:endParaRPr>
           </a:p>
           <a:p>
-            <a:pPr marL="216000" indent="-213120">
+            <a:pPr marL="216000" indent="-212760">
               <a:lnSpc>
                 <a:spcPct val="100000"/>
               </a:lnSpc>
@@ -25528,7 +25291,7 @@
             </a:endParaRPr>
           </a:p>
           <a:p>
-            <a:pPr marL="216000" indent="-213120">
+            <a:pPr marL="216000" indent="-212760">
               <a:lnSpc>
                 <a:spcPct val="100000"/>
               </a:lnSpc>
@@ -25812,7 +25575,7 @@
         <p:spPr>
           <a:xfrm>
             <a:off x="5852160" y="1872360"/>
-            <a:ext cx="2832840" cy="660240"/>
+            <a:ext cx="2832480" cy="659880"/>
           </a:xfrm>
           <a:prstGeom prst="rect">
             <a:avLst/>
@@ -25831,7 +25594,7 @@
         <p:spPr>
           <a:xfrm>
             <a:off x="6309360" y="3474720"/>
-            <a:ext cx="1369800" cy="273240"/>
+            <a:ext cx="1369440" cy="272880"/>
           </a:xfrm>
           <a:prstGeom prst="rect">
             <a:avLst/>
@@ -25880,7 +25643,7 @@
         <p:spPr>
           <a:xfrm>
             <a:off x="4937760" y="2103120"/>
-            <a:ext cx="1095480" cy="518400"/>
+            <a:ext cx="1095120" cy="518040"/>
           </a:xfrm>
           <a:prstGeom prst="rect">
             <a:avLst/>
@@ -25929,7 +25692,7 @@
         <p:spPr>
           <a:xfrm>
             <a:off x="4846320" y="1249200"/>
-            <a:ext cx="912600" cy="256320"/>
+            <a:ext cx="912240" cy="255960"/>
           </a:xfrm>
           <a:prstGeom prst="rect">
             <a:avLst/>
@@ -25982,7 +25745,7 @@
         <p:spPr>
           <a:xfrm>
             <a:off x="4840920" y="2560320"/>
-            <a:ext cx="3844800" cy="860040"/>
+            <a:ext cx="3844440" cy="859680"/>
           </a:xfrm>
           <a:prstGeom prst="rect">
             <a:avLst/>
@@ -26005,7 +25768,7 @@
         <p:spPr>
           <a:xfrm>
             <a:off x="4848120" y="3749040"/>
-            <a:ext cx="3654720" cy="779040"/>
+            <a:ext cx="3654360" cy="778680"/>
           </a:xfrm>
           <a:prstGeom prst="rect">
             <a:avLst/>
@@ -26024,7 +25787,7 @@
         <p:spPr>
           <a:xfrm>
             <a:off x="6583680" y="4480560"/>
-            <a:ext cx="1369800" cy="273240"/>
+            <a:ext cx="1369440" cy="272880"/>
           </a:xfrm>
           <a:prstGeom prst="rect">
             <a:avLst/>
@@ -26073,7 +25836,7 @@
         <p:spPr>
           <a:xfrm>
             <a:off x="6767280" y="5138640"/>
-            <a:ext cx="1369800" cy="273240"/>
+            <a:ext cx="1369440" cy="272880"/>
           </a:xfrm>
           <a:prstGeom prst="rect">
             <a:avLst/>
@@ -26126,7 +25889,7 @@
         <p:spPr>
           <a:xfrm>
             <a:off x="5461920" y="947520"/>
-            <a:ext cx="3589560" cy="788760"/>
+            <a:ext cx="3589200" cy="788400"/>
           </a:xfrm>
           <a:prstGeom prst="rect">
             <a:avLst/>
@@ -26194,7 +25957,7 @@
         <p:spPr>
           <a:xfrm>
             <a:off x="365760" y="274320"/>
-            <a:ext cx="8318160" cy="816120"/>
+            <a:ext cx="8317800" cy="815760"/>
           </a:xfrm>
           <a:prstGeom prst="rect">
             <a:avLst/>
@@ -26243,7 +26006,7 @@
         <p:spPr>
           <a:xfrm>
             <a:off x="457200" y="1005840"/>
-            <a:ext cx="8135280" cy="4406040"/>
+            <a:ext cx="8134920" cy="4405680"/>
           </a:xfrm>
           <a:prstGeom prst="rect">
             <a:avLst/>
@@ -26756,7 +26519,7 @@
         <p:spPr>
           <a:xfrm>
             <a:off x="6675840" y="5412960"/>
-            <a:ext cx="1369800" cy="273240"/>
+            <a:ext cx="1369440" cy="272880"/>
           </a:xfrm>
           <a:prstGeom prst="rect">
             <a:avLst/>
@@ -26809,7 +26572,7 @@
         <p:spPr>
           <a:xfrm>
             <a:off x="4297680" y="3108960"/>
-            <a:ext cx="4838760" cy="1279800"/>
+            <a:ext cx="4838400" cy="1279440"/>
           </a:xfrm>
           <a:prstGeom prst="rect">
             <a:avLst/>
@@ -26828,7 +26591,7 @@
         <p:spPr>
           <a:xfrm>
             <a:off x="6492240" y="2926080"/>
-            <a:ext cx="1095480" cy="273240"/>
+            <a:ext cx="1095120" cy="272880"/>
           </a:xfrm>
           <a:prstGeom prst="rect">
             <a:avLst/>
@@ -26881,7 +26644,7 @@
         <p:spPr>
           <a:xfrm>
             <a:off x="5553360" y="914400"/>
-            <a:ext cx="3589560" cy="788760"/>
+            <a:ext cx="3589200" cy="788400"/>
           </a:xfrm>
           <a:prstGeom prst="rect">
             <a:avLst/>
@@ -26900,7 +26663,7 @@
         <p:spPr>
           <a:xfrm>
             <a:off x="5486400" y="1506600"/>
-            <a:ext cx="912600" cy="256320"/>
+            <a:ext cx="912240" cy="255960"/>
           </a:xfrm>
           <a:prstGeom prst="rect">
             <a:avLst/>
@@ -26949,7 +26712,7 @@
         <p:spPr>
           <a:xfrm>
             <a:off x="6950160" y="4206240"/>
-            <a:ext cx="1369800" cy="273240"/>
+            <a:ext cx="1369440" cy="272880"/>
           </a:xfrm>
           <a:prstGeom prst="rect">
             <a:avLst/>
@@ -26998,7 +26761,7 @@
         <p:spPr>
           <a:xfrm>
             <a:off x="3657600" y="5669280"/>
-            <a:ext cx="1369800" cy="273240"/>
+            <a:ext cx="1369440" cy="272880"/>
           </a:xfrm>
           <a:prstGeom prst="rect">
             <a:avLst/>
@@ -27051,7 +26814,7 @@
         <p:spPr>
           <a:xfrm>
             <a:off x="5486400" y="1977840"/>
-            <a:ext cx="3644640" cy="947160"/>
+            <a:ext cx="3644280" cy="946800"/>
           </a:xfrm>
           <a:prstGeom prst="rect">
             <a:avLst/>
@@ -27074,7 +26837,7 @@
         <p:spPr>
           <a:xfrm>
             <a:off x="4846320" y="4492440"/>
-            <a:ext cx="4254840" cy="535680"/>
+            <a:ext cx="4254480" cy="535320"/>
           </a:xfrm>
           <a:prstGeom prst="rect">
             <a:avLst/>
@@ -27097,7 +26860,7 @@
         <p:spPr>
           <a:xfrm>
             <a:off x="4572000" y="5262120"/>
-            <a:ext cx="4564440" cy="771840"/>
+            <a:ext cx="4564080" cy="771480"/>
           </a:xfrm>
           <a:prstGeom prst="rect">
             <a:avLst/>
@@ -27116,7 +26879,7 @@
         <p:spPr>
           <a:xfrm>
             <a:off x="5944320" y="4937760"/>
-            <a:ext cx="1369800" cy="273240"/>
+            <a:ext cx="1369440" cy="272880"/>
           </a:xfrm>
           <a:prstGeom prst="rect">
             <a:avLst/>

</xml_diff>

<commit_message>
fix bugs in isTokenMissing part and add the new documents
</commit_message>
<xml_diff>
--- a/official_report/MasterThesis_Report_02_BaseLine.pptx
+++ b/official_report/MasterThesis_Report_02_BaseLine.pptx
@@ -4076,7 +4076,7 @@
         <p:spPr>
           <a:xfrm>
             <a:off x="7203960" y="6043680"/>
-            <a:ext cx="1775880" cy="810720"/>
+            <a:ext cx="1775520" cy="810360"/>
           </a:xfrm>
           <a:prstGeom prst="rect">
             <a:avLst/>
@@ -4095,7 +4095,7 @@
         <p:spPr>
           <a:xfrm>
             <a:off x="1123920" y="6227640"/>
-            <a:ext cx="4247640" cy="626760"/>
+            <a:ext cx="4247280" cy="626400"/>
           </a:xfrm>
           <a:prstGeom prst="rect">
             <a:avLst/>
@@ -4220,7 +4220,7 @@
         <p:spPr>
           <a:xfrm>
             <a:off x="-2245320" y="5412240"/>
-            <a:ext cx="2029680" cy="1457640"/>
+            <a:ext cx="2029320" cy="1457280"/>
           </a:xfrm>
           <a:prstGeom prst="rect">
             <a:avLst/>
@@ -4289,7 +4289,7 @@
         <p:spPr>
           <a:xfrm>
             <a:off x="-2246400" y="506520"/>
-            <a:ext cx="2063160" cy="4655520"/>
+            <a:ext cx="2062800" cy="4655160"/>
           </a:xfrm>
           <a:prstGeom prst="rect">
             <a:avLst/>
@@ -4468,7 +4468,7 @@
         <p:spPr>
           <a:xfrm>
             <a:off x="9231480" y="506520"/>
-            <a:ext cx="2063160" cy="4960080"/>
+            <a:ext cx="2062800" cy="4959720"/>
           </a:xfrm>
           <a:prstGeom prst="rect">
             <a:avLst/>
@@ -4547,7 +4547,7 @@
             </a:endParaRPr>
           </a:p>
           <a:p>
-            <a:pPr marL="228600" indent="-225000">
+            <a:pPr marL="228600" indent="-224640">
               <a:lnSpc>
                 <a:spcPct val="100000"/>
               </a:lnSpc>
@@ -4602,7 +4602,7 @@
             </a:endParaRPr>
           </a:p>
           <a:p>
-            <a:pPr marL="228600" indent="-225000">
+            <a:pPr marL="228600" indent="-224640">
               <a:lnSpc>
                 <a:spcPct val="100000"/>
               </a:lnSpc>
@@ -4667,7 +4667,7 @@
             </a:endParaRPr>
           </a:p>
           <a:p>
-            <a:pPr marL="228600" indent="-225000">
+            <a:pPr marL="228600" indent="-224640">
               <a:lnSpc>
                 <a:spcPct val="100000"/>
               </a:lnSpc>
@@ -4692,7 +4692,7 @@
             </a:endParaRPr>
           </a:p>
           <a:p>
-            <a:pPr marL="228600" indent="-225000">
+            <a:pPr marL="228600" indent="-224640">
               <a:lnSpc>
                 <a:spcPct val="100000"/>
               </a:lnSpc>
@@ -4777,7 +4777,7 @@
             </a:endParaRPr>
           </a:p>
           <a:p>
-            <a:pPr marL="228600" indent="-225000">
+            <a:pPr marL="228600" indent="-224640">
               <a:lnSpc>
                 <a:spcPct val="100000"/>
               </a:lnSpc>
@@ -4802,7 +4802,7 @@
             </a:endParaRPr>
           </a:p>
           <a:p>
-            <a:pPr marL="228600" indent="-225000">
+            <a:pPr marL="228600" indent="-224640">
               <a:lnSpc>
                 <a:spcPct val="100000"/>
               </a:lnSpc>
@@ -4857,7 +4857,7 @@
             </a:endParaRPr>
           </a:p>
           <a:p>
-            <a:pPr marL="228600" indent="-225000">
+            <a:pPr marL="228600" indent="-224640">
               <a:lnSpc>
                 <a:spcPct val="100000"/>
               </a:lnSpc>
@@ -4912,7 +4912,7 @@
         <p:spPr>
           <a:xfrm>
             <a:off x="0" y="0"/>
-            <a:ext cx="9140400" cy="2309400"/>
+            <a:ext cx="9140040" cy="2309040"/>
           </a:xfrm>
           <a:prstGeom prst="rect">
             <a:avLst/>
@@ -4944,7 +4944,7 @@
         <p:spPr>
           <a:xfrm>
             <a:off x="7203960" y="6043680"/>
-            <a:ext cx="1775880" cy="810720"/>
+            <a:ext cx="1775520" cy="810360"/>
           </a:xfrm>
           <a:prstGeom prst="rect">
             <a:avLst/>
@@ -4963,7 +4963,7 @@
         <p:spPr>
           <a:xfrm>
             <a:off x="-1820880" y="531720"/>
-            <a:ext cx="1638000" cy="1304640"/>
+            <a:ext cx="1637640" cy="1304280"/>
           </a:xfrm>
           <a:prstGeom prst="rect">
             <a:avLst/>
@@ -5002,7 +5002,7 @@
             </a:endParaRPr>
           </a:p>
           <a:p>
-            <a:pPr marL="171360" indent="-167760">
+            <a:pPr marL="171360" indent="-167400">
               <a:lnSpc>
                 <a:spcPct val="100000"/>
               </a:lnSpc>
@@ -5027,7 +5027,7 @@
             </a:endParaRPr>
           </a:p>
           <a:p>
-            <a:pPr marL="171360" indent="-167760">
+            <a:pPr marL="171360" indent="-167400">
               <a:lnSpc>
                 <a:spcPct val="100000"/>
               </a:lnSpc>
@@ -5414,7 +5414,7 @@
         <p:spPr>
           <a:xfrm>
             <a:off x="5229720" y="5943600"/>
-            <a:ext cx="3911040" cy="911160"/>
+            <a:ext cx="3910680" cy="910800"/>
           </a:xfrm>
           <a:prstGeom prst="rect">
             <a:avLst/>
@@ -5432,8 +5432,8 @@
         </p:nvSpPr>
         <p:spPr>
           <a:xfrm rot="21598800">
-            <a:off x="1188720" y="6037560"/>
-            <a:ext cx="2739960" cy="453960"/>
+            <a:off x="1188720" y="6037200"/>
+            <a:ext cx="2739600" cy="453600"/>
           </a:xfrm>
           <a:prstGeom prst="rect">
             <a:avLst/>
@@ -5578,7 +5578,7 @@
         <p:spPr>
           <a:xfrm>
             <a:off x="-2245320" y="5412240"/>
-            <a:ext cx="2029680" cy="1457640"/>
+            <a:ext cx="2029320" cy="1457280"/>
           </a:xfrm>
           <a:prstGeom prst="rect">
             <a:avLst/>
@@ -5647,7 +5647,7 @@
         <p:spPr>
           <a:xfrm>
             <a:off x="-2246400" y="506520"/>
-            <a:ext cx="2063160" cy="4655520"/>
+            <a:ext cx="2062800" cy="4655160"/>
           </a:xfrm>
           <a:prstGeom prst="rect">
             <a:avLst/>
@@ -5826,7 +5826,7 @@
         <p:spPr>
           <a:xfrm>
             <a:off x="9231480" y="506520"/>
-            <a:ext cx="2063160" cy="4960080"/>
+            <a:ext cx="2062800" cy="4959720"/>
           </a:xfrm>
           <a:prstGeom prst="rect">
             <a:avLst/>
@@ -5905,7 +5905,7 @@
             </a:endParaRPr>
           </a:p>
           <a:p>
-            <a:pPr marL="228600" indent="-225000">
+            <a:pPr marL="228600" indent="-224640">
               <a:lnSpc>
                 <a:spcPct val="100000"/>
               </a:lnSpc>
@@ -5960,7 +5960,7 @@
             </a:endParaRPr>
           </a:p>
           <a:p>
-            <a:pPr marL="228600" indent="-225000">
+            <a:pPr marL="228600" indent="-224640">
               <a:lnSpc>
                 <a:spcPct val="100000"/>
               </a:lnSpc>
@@ -6025,7 +6025,7 @@
             </a:endParaRPr>
           </a:p>
           <a:p>
-            <a:pPr marL="228600" indent="-225000">
+            <a:pPr marL="228600" indent="-224640">
               <a:lnSpc>
                 <a:spcPct val="100000"/>
               </a:lnSpc>
@@ -6050,7 +6050,7 @@
             </a:endParaRPr>
           </a:p>
           <a:p>
-            <a:pPr marL="228600" indent="-225000">
+            <a:pPr marL="228600" indent="-224640">
               <a:lnSpc>
                 <a:spcPct val="100000"/>
               </a:lnSpc>
@@ -6135,7 +6135,7 @@
             </a:endParaRPr>
           </a:p>
           <a:p>
-            <a:pPr marL="228600" indent="-225000">
+            <a:pPr marL="228600" indent="-224640">
               <a:lnSpc>
                 <a:spcPct val="100000"/>
               </a:lnSpc>
@@ -6160,7 +6160,7 @@
             </a:endParaRPr>
           </a:p>
           <a:p>
-            <a:pPr marL="228600" indent="-225000">
+            <a:pPr marL="228600" indent="-224640">
               <a:lnSpc>
                 <a:spcPct val="100000"/>
               </a:lnSpc>
@@ -6215,7 +6215,7 @@
             </a:endParaRPr>
           </a:p>
           <a:p>
-            <a:pPr marL="228600" indent="-225000">
+            <a:pPr marL="228600" indent="-224640">
               <a:lnSpc>
                 <a:spcPct val="100000"/>
               </a:lnSpc>
@@ -6532,7 +6532,7 @@
         <p:spPr>
           <a:xfrm>
             <a:off x="7203960" y="6043680"/>
-            <a:ext cx="1775880" cy="810720"/>
+            <a:ext cx="1775520" cy="810360"/>
           </a:xfrm>
           <a:prstGeom prst="rect">
             <a:avLst/>
@@ -6551,7 +6551,7 @@
         <p:spPr>
           <a:xfrm>
             <a:off x="1123920" y="6227640"/>
-            <a:ext cx="4247640" cy="626760"/>
+            <a:ext cx="4247280" cy="626400"/>
           </a:xfrm>
           <a:prstGeom prst="rect">
             <a:avLst/>
@@ -6676,7 +6676,7 @@
         <p:spPr>
           <a:xfrm>
             <a:off x="-2245320" y="5412240"/>
-            <a:ext cx="2029680" cy="1457640"/>
+            <a:ext cx="2029320" cy="1457280"/>
           </a:xfrm>
           <a:prstGeom prst="rect">
             <a:avLst/>
@@ -6745,7 +6745,7 @@
         <p:spPr>
           <a:xfrm>
             <a:off x="-2246400" y="506520"/>
-            <a:ext cx="2063160" cy="4655520"/>
+            <a:ext cx="2062800" cy="4655160"/>
           </a:xfrm>
           <a:prstGeom prst="rect">
             <a:avLst/>
@@ -6924,7 +6924,7 @@
         <p:spPr>
           <a:xfrm>
             <a:off x="9231480" y="506520"/>
-            <a:ext cx="2063160" cy="4960080"/>
+            <a:ext cx="2062800" cy="4959720"/>
           </a:xfrm>
           <a:prstGeom prst="rect">
             <a:avLst/>
@@ -7003,7 +7003,7 @@
             </a:endParaRPr>
           </a:p>
           <a:p>
-            <a:pPr marL="228600" indent="-225000">
+            <a:pPr marL="228600" indent="-224640">
               <a:lnSpc>
                 <a:spcPct val="100000"/>
               </a:lnSpc>
@@ -7058,7 +7058,7 @@
             </a:endParaRPr>
           </a:p>
           <a:p>
-            <a:pPr marL="228600" indent="-225000">
+            <a:pPr marL="228600" indent="-224640">
               <a:lnSpc>
                 <a:spcPct val="100000"/>
               </a:lnSpc>
@@ -7123,7 +7123,7 @@
             </a:endParaRPr>
           </a:p>
           <a:p>
-            <a:pPr marL="228600" indent="-225000">
+            <a:pPr marL="228600" indent="-224640">
               <a:lnSpc>
                 <a:spcPct val="100000"/>
               </a:lnSpc>
@@ -7148,7 +7148,7 @@
             </a:endParaRPr>
           </a:p>
           <a:p>
-            <a:pPr marL="228600" indent="-225000">
+            <a:pPr marL="228600" indent="-224640">
               <a:lnSpc>
                 <a:spcPct val="100000"/>
               </a:lnSpc>
@@ -7233,7 +7233,7 @@
             </a:endParaRPr>
           </a:p>
           <a:p>
-            <a:pPr marL="228600" indent="-225000">
+            <a:pPr marL="228600" indent="-224640">
               <a:lnSpc>
                 <a:spcPct val="100000"/>
               </a:lnSpc>
@@ -7258,7 +7258,7 @@
             </a:endParaRPr>
           </a:p>
           <a:p>
-            <a:pPr marL="228600" indent="-225000">
+            <a:pPr marL="228600" indent="-224640">
               <a:lnSpc>
                 <a:spcPct val="100000"/>
               </a:lnSpc>
@@ -7313,7 +7313,7 @@
             </a:endParaRPr>
           </a:p>
           <a:p>
-            <a:pPr marL="228600" indent="-225000">
+            <a:pPr marL="228600" indent="-224640">
               <a:lnSpc>
                 <a:spcPct val="100000"/>
               </a:lnSpc>
@@ -7368,7 +7368,7 @@
         <p:spPr>
           <a:xfrm>
             <a:off x="0" y="0"/>
-            <a:ext cx="9140400" cy="2309400"/>
+            <a:ext cx="9140040" cy="2309040"/>
           </a:xfrm>
           <a:prstGeom prst="rect">
             <a:avLst/>
@@ -7400,7 +7400,7 @@
         <p:spPr>
           <a:xfrm>
             <a:off x="7203960" y="6043680"/>
-            <a:ext cx="1775880" cy="810720"/>
+            <a:ext cx="1775520" cy="810360"/>
           </a:xfrm>
           <a:prstGeom prst="rect">
             <a:avLst/>
@@ -7419,7 +7419,7 @@
         <p:spPr>
           <a:xfrm>
             <a:off x="-1820880" y="531720"/>
-            <a:ext cx="1638000" cy="1304640"/>
+            <a:ext cx="1637640" cy="1304280"/>
           </a:xfrm>
           <a:prstGeom prst="rect">
             <a:avLst/>
@@ -7458,7 +7458,7 @@
             </a:endParaRPr>
           </a:p>
           <a:p>
-            <a:pPr marL="171360" indent="-167760">
+            <a:pPr marL="171360" indent="-167400">
               <a:lnSpc>
                 <a:spcPct val="100000"/>
               </a:lnSpc>
@@ -7483,7 +7483,7 @@
             </a:endParaRPr>
           </a:p>
           <a:p>
-            <a:pPr marL="171360" indent="-167760">
+            <a:pPr marL="171360" indent="-167400">
               <a:lnSpc>
                 <a:spcPct val="100000"/>
               </a:lnSpc>
@@ -7859,7 +7859,7 @@
         <p:spPr>
           <a:xfrm>
             <a:off x="300600" y="2761920"/>
-            <a:ext cx="8565840" cy="801000"/>
+            <a:ext cx="8565480" cy="800640"/>
           </a:xfrm>
           <a:prstGeom prst="rect">
             <a:avLst/>
@@ -7944,7 +7944,7 @@
         <p:spPr>
           <a:xfrm>
             <a:off x="457200" y="3474720"/>
-            <a:ext cx="8317800" cy="2282400"/>
+            <a:ext cx="8317440" cy="2282040"/>
           </a:xfrm>
           <a:prstGeom prst="rect">
             <a:avLst/>
@@ -8131,7 +8131,7 @@
         <p:spPr>
           <a:xfrm>
             <a:off x="5478840" y="6054480"/>
-            <a:ext cx="3374640" cy="799920"/>
+            <a:ext cx="3374280" cy="799560"/>
           </a:xfrm>
           <a:prstGeom prst="rect">
             <a:avLst/>
@@ -8203,7 +8203,7 @@
         <p:spPr>
           <a:xfrm>
             <a:off x="3931920" y="3108960"/>
-            <a:ext cx="5213520" cy="1004400"/>
+            <a:ext cx="5213160" cy="1004040"/>
           </a:xfrm>
           <a:prstGeom prst="rect">
             <a:avLst/>
@@ -8222,7 +8222,7 @@
         <p:spPr>
           <a:xfrm>
             <a:off x="365760" y="274320"/>
-            <a:ext cx="8317800" cy="815760"/>
+            <a:ext cx="8317440" cy="815400"/>
           </a:xfrm>
           <a:prstGeom prst="rect">
             <a:avLst/>
@@ -8271,7 +8271,7 @@
         <p:spPr>
           <a:xfrm>
             <a:off x="457200" y="1005840"/>
-            <a:ext cx="8134920" cy="4405680"/>
+            <a:ext cx="8134560" cy="4405320"/>
           </a:xfrm>
           <a:prstGeom prst="rect">
             <a:avLst/>
@@ -8730,7 +8730,7 @@
         <p:spPr>
           <a:xfrm>
             <a:off x="6858000" y="2834640"/>
-            <a:ext cx="1095120" cy="272880"/>
+            <a:ext cx="1094760" cy="272520"/>
           </a:xfrm>
           <a:prstGeom prst="rect">
             <a:avLst/>
@@ -8779,7 +8779,7 @@
         <p:spPr>
           <a:xfrm>
             <a:off x="4846320" y="1249200"/>
-            <a:ext cx="912240" cy="255960"/>
+            <a:ext cx="911880" cy="255600"/>
           </a:xfrm>
           <a:prstGeom prst="rect">
             <a:avLst/>
@@ -8828,7 +8828,7 @@
         <p:spPr>
           <a:xfrm>
             <a:off x="6950160" y="3931920"/>
-            <a:ext cx="1369440" cy="272880"/>
+            <a:ext cx="1369080" cy="272520"/>
           </a:xfrm>
           <a:prstGeom prst="rect">
             <a:avLst/>
@@ -8877,7 +8877,7 @@
         <p:spPr>
           <a:xfrm>
             <a:off x="3932640" y="5669280"/>
-            <a:ext cx="1369440" cy="272880"/>
+            <a:ext cx="1369080" cy="272520"/>
           </a:xfrm>
           <a:prstGeom prst="rect">
             <a:avLst/>
@@ -8926,7 +8926,7 @@
         <p:spPr>
           <a:xfrm>
             <a:off x="5944320" y="4937760"/>
-            <a:ext cx="1369440" cy="272880"/>
+            <a:ext cx="1369080" cy="272520"/>
           </a:xfrm>
           <a:prstGeom prst="rect">
             <a:avLst/>
@@ -8979,7 +8979,7 @@
         <p:spPr>
           <a:xfrm>
             <a:off x="4663440" y="1828800"/>
-            <a:ext cx="4479120" cy="1004400"/>
+            <a:ext cx="4478760" cy="1004040"/>
           </a:xfrm>
           <a:prstGeom prst="rect">
             <a:avLst/>
@@ -9002,7 +9002,7 @@
         <p:spPr>
           <a:xfrm>
             <a:off x="5394960" y="4241520"/>
-            <a:ext cx="3843360" cy="786240"/>
+            <a:ext cx="3843000" cy="785880"/>
           </a:xfrm>
           <a:prstGeom prst="rect">
             <a:avLst/>
@@ -9025,7 +9025,7 @@
         <p:spPr>
           <a:xfrm>
             <a:off x="4739040" y="5212080"/>
-            <a:ext cx="4488480" cy="912960"/>
+            <a:ext cx="4488120" cy="912600"/>
           </a:xfrm>
           <a:prstGeom prst="rect">
             <a:avLst/>
@@ -9048,7 +9048,7 @@
         <p:spPr>
           <a:xfrm>
             <a:off x="5486400" y="947520"/>
-            <a:ext cx="3589200" cy="788400"/>
+            <a:ext cx="3588840" cy="788040"/>
           </a:xfrm>
           <a:prstGeom prst="rect">
             <a:avLst/>
@@ -9116,7 +9116,7 @@
         <p:spPr>
           <a:xfrm>
             <a:off x="365760" y="274320"/>
-            <a:ext cx="8317800" cy="815760"/>
+            <a:ext cx="8317440" cy="815400"/>
           </a:xfrm>
           <a:prstGeom prst="rect">
             <a:avLst/>
@@ -9165,7 +9165,7 @@
         <p:spPr>
           <a:xfrm>
             <a:off x="457200" y="1005840"/>
-            <a:ext cx="8134920" cy="4405680"/>
+            <a:ext cx="8134560" cy="4405320"/>
           </a:xfrm>
           <a:prstGeom prst="rect">
             <a:avLst/>
@@ -9220,7 +9220,7 @@
             </a:endParaRPr>
           </a:p>
           <a:p>
-            <a:pPr marL="216000" indent="-212760">
+            <a:pPr marL="216000" indent="-212400">
               <a:lnSpc>
                 <a:spcPct val="100000"/>
               </a:lnSpc>
@@ -9252,7 +9252,7 @@
             </a:endParaRPr>
           </a:p>
           <a:p>
-            <a:pPr marL="216000" indent="-212760">
+            <a:pPr marL="216000" indent="-212400">
               <a:lnSpc>
                 <a:spcPct val="100000"/>
               </a:lnSpc>
@@ -9284,7 +9284,7 @@
             </a:endParaRPr>
           </a:p>
           <a:p>
-            <a:pPr marL="216000" indent="-212760">
+            <a:pPr marL="216000" indent="-212400">
               <a:lnSpc>
                 <a:spcPct val="100000"/>
               </a:lnSpc>
@@ -9316,7 +9316,7 @@
             </a:endParaRPr>
           </a:p>
           <a:p>
-            <a:pPr marL="216000" indent="-212760">
+            <a:pPr marL="216000" indent="-212400">
               <a:lnSpc>
                 <a:spcPct val="100000"/>
               </a:lnSpc>
@@ -9416,7 +9416,7 @@
             </a:endParaRPr>
           </a:p>
           <a:p>
-            <a:pPr marL="216000" indent="-212760">
+            <a:pPr marL="216000" indent="-212400">
               <a:lnSpc>
                 <a:spcPct val="100000"/>
               </a:lnSpc>
@@ -9448,7 +9448,7 @@
             </a:endParaRPr>
           </a:p>
           <a:p>
-            <a:pPr marL="216000" indent="-212760">
+            <a:pPr marL="216000" indent="-212400">
               <a:lnSpc>
                 <a:spcPct val="100000"/>
               </a:lnSpc>
@@ -9480,7 +9480,7 @@
             </a:endParaRPr>
           </a:p>
           <a:p>
-            <a:pPr marL="216000" indent="-212760">
+            <a:pPr marL="216000" indent="-212400">
               <a:lnSpc>
                 <a:spcPct val="100000"/>
               </a:lnSpc>
@@ -9558,7 +9558,7 @@
         <p:spPr>
           <a:xfrm>
             <a:off x="4846320" y="1249200"/>
-            <a:ext cx="912240" cy="255960"/>
+            <a:ext cx="911880" cy="255600"/>
           </a:xfrm>
           <a:prstGeom prst="rect">
             <a:avLst/>
@@ -9611,7 +9611,7 @@
         <p:spPr>
           <a:xfrm>
             <a:off x="5303520" y="1958040"/>
-            <a:ext cx="2924640" cy="1332360"/>
+            <a:ext cx="2924280" cy="1332000"/>
           </a:xfrm>
           <a:prstGeom prst="rect">
             <a:avLst/>
@@ -9630,7 +9630,7 @@
         <p:spPr>
           <a:xfrm>
             <a:off x="7040880" y="3108960"/>
-            <a:ext cx="1369440" cy="335160"/>
+            <a:ext cx="1369080" cy="334800"/>
           </a:xfrm>
           <a:prstGeom prst="rect">
             <a:avLst/>
@@ -9683,7 +9683,7 @@
         <p:spPr>
           <a:xfrm>
             <a:off x="5119560" y="3839400"/>
-            <a:ext cx="3472560" cy="456840"/>
+            <a:ext cx="3472200" cy="456480"/>
           </a:xfrm>
           <a:prstGeom prst="rect">
             <a:avLst/>
@@ -9706,7 +9706,7 @@
         <p:spPr>
           <a:xfrm>
             <a:off x="4663440" y="4935960"/>
-            <a:ext cx="4393080" cy="457560"/>
+            <a:ext cx="4392720" cy="457200"/>
           </a:xfrm>
           <a:prstGeom prst="rect">
             <a:avLst/>
@@ -9725,7 +9725,7 @@
         <p:spPr>
           <a:xfrm>
             <a:off x="6217920" y="4297680"/>
-            <a:ext cx="1095120" cy="244440"/>
+            <a:ext cx="1094760" cy="244080"/>
           </a:xfrm>
           <a:prstGeom prst="rect">
             <a:avLst/>
@@ -9774,7 +9774,7 @@
         <p:spPr>
           <a:xfrm>
             <a:off x="6492960" y="5394960"/>
-            <a:ext cx="1095120" cy="244440"/>
+            <a:ext cx="1094760" cy="244080"/>
           </a:xfrm>
           <a:prstGeom prst="rect">
             <a:avLst/>
@@ -9827,7 +9827,7 @@
         <p:spPr>
           <a:xfrm>
             <a:off x="5461920" y="1038960"/>
-            <a:ext cx="3589200" cy="788400"/>
+            <a:ext cx="3588840" cy="788040"/>
           </a:xfrm>
           <a:prstGeom prst="rect">
             <a:avLst/>
@@ -9895,7 +9895,7 @@
         <p:spPr>
           <a:xfrm>
             <a:off x="365760" y="274320"/>
-            <a:ext cx="8317800" cy="815760"/>
+            <a:ext cx="8317440" cy="815400"/>
           </a:xfrm>
           <a:prstGeom prst="rect">
             <a:avLst/>
@@ -9944,7 +9944,7 @@
         <p:spPr>
           <a:xfrm>
             <a:off x="457200" y="822960"/>
-            <a:ext cx="8134920" cy="4405680"/>
+            <a:ext cx="8134560" cy="4405320"/>
           </a:xfrm>
           <a:prstGeom prst="rect">
             <a:avLst/>
@@ -9963,7 +9963,7 @@
         <p:txBody>
           <a:bodyPr lIns="90000" rIns="90000" tIns="45000" bIns="45000"/>
           <a:p>
-            <a:pPr marL="216000" indent="-212760">
+            <a:pPr marL="216000" indent="-212400">
               <a:lnSpc>
                 <a:spcPct val="100000"/>
               </a:lnSpc>
@@ -10015,7 +10015,7 @@
             </a:endParaRPr>
           </a:p>
           <a:p>
-            <a:pPr marL="216000" indent="-212760">
+            <a:pPr marL="216000" indent="-212400">
               <a:lnSpc>
                 <a:spcPct val="100000"/>
               </a:lnSpc>
@@ -10047,7 +10047,7 @@
             </a:endParaRPr>
           </a:p>
           <a:p>
-            <a:pPr marL="216000" indent="-214560">
+            <a:pPr marL="216000" indent="-214200">
               <a:lnSpc>
                 <a:spcPct val="100000"/>
               </a:lnSpc>
@@ -10133,7 +10133,7 @@
             </a:endParaRPr>
           </a:p>
           <a:p>
-            <a:pPr marL="216000" indent="-212760">
+            <a:pPr marL="216000" indent="-212400">
               <a:lnSpc>
                 <a:spcPct val="100000"/>
               </a:lnSpc>
@@ -10165,7 +10165,7 @@
             </a:endParaRPr>
           </a:p>
           <a:p>
-            <a:pPr marL="216000" indent="-212760">
+            <a:pPr marL="216000" indent="-212400">
               <a:lnSpc>
                 <a:spcPct val="100000"/>
               </a:lnSpc>
@@ -10471,7 +10471,7 @@
         <p:spPr>
           <a:xfrm>
             <a:off x="5120640" y="1371600"/>
-            <a:ext cx="912240" cy="255960"/>
+            <a:ext cx="911880" cy="255600"/>
           </a:xfrm>
           <a:prstGeom prst="rect">
             <a:avLst/>
@@ -10524,7 +10524,7 @@
         <p:spPr>
           <a:xfrm>
             <a:off x="5187600" y="1953360"/>
-            <a:ext cx="3589200" cy="788400"/>
+            <a:ext cx="3588840" cy="788040"/>
           </a:xfrm>
           <a:prstGeom prst="rect">
             <a:avLst/>
@@ -10547,7 +10547,7 @@
         <p:spPr>
           <a:xfrm>
             <a:off x="5463720" y="3840480"/>
-            <a:ext cx="3497040" cy="1645560"/>
+            <a:ext cx="3496680" cy="1645200"/>
           </a:xfrm>
           <a:prstGeom prst="rect">
             <a:avLst/>
@@ -10566,7 +10566,7 @@
         <p:spPr>
           <a:xfrm>
             <a:off x="5852160" y="5504400"/>
-            <a:ext cx="912240" cy="255960"/>
+            <a:ext cx="911880" cy="255600"/>
           </a:xfrm>
           <a:prstGeom prst="rect">
             <a:avLst/>
@@ -10668,7 +10668,7 @@
         <p:spPr>
           <a:xfrm>
             <a:off x="4389120" y="3108960"/>
-            <a:ext cx="4432680" cy="1186560"/>
+            <a:ext cx="4432320" cy="1186200"/>
           </a:xfrm>
           <a:prstGeom prst="rect">
             <a:avLst/>
@@ -10691,7 +10691,7 @@
         <p:spPr>
           <a:xfrm>
             <a:off x="4389120" y="1828800"/>
-            <a:ext cx="4425480" cy="913680"/>
+            <a:ext cx="4425120" cy="913320"/>
           </a:xfrm>
           <a:prstGeom prst="rect">
             <a:avLst/>
@@ -10710,7 +10710,7 @@
         <p:spPr>
           <a:xfrm>
             <a:off x="365760" y="274320"/>
-            <a:ext cx="8317800" cy="815760"/>
+            <a:ext cx="8317440" cy="815400"/>
           </a:xfrm>
           <a:prstGeom prst="rect">
             <a:avLst/>
@@ -10759,7 +10759,7 @@
         <p:spPr>
           <a:xfrm>
             <a:off x="457200" y="1005840"/>
-            <a:ext cx="8134920" cy="4405680"/>
+            <a:ext cx="8134560" cy="4405320"/>
           </a:xfrm>
           <a:prstGeom prst="rect">
             <a:avLst/>
@@ -10778,7 +10778,7 @@
         <p:txBody>
           <a:bodyPr lIns="90000" rIns="90000" tIns="45000" bIns="45000"/>
           <a:p>
-            <a:pPr marL="216000" indent="-212760">
+            <a:pPr marL="216000" indent="-212400">
               <a:lnSpc>
                 <a:spcPct val="100000"/>
               </a:lnSpc>
@@ -10856,7 +10856,7 @@
             </a:endParaRPr>
           </a:p>
           <a:p>
-            <a:pPr marL="216000" indent="-212760">
+            <a:pPr marL="216000" indent="-212400">
               <a:lnSpc>
                 <a:spcPct val="100000"/>
               </a:lnSpc>
@@ -10898,7 +10898,7 @@
             </a:endParaRPr>
           </a:p>
           <a:p>
-            <a:pPr marL="216000" indent="-212760">
+            <a:pPr marL="216000" indent="-212400">
               <a:lnSpc>
                 <a:spcPct val="100000"/>
               </a:lnSpc>
@@ -10933,14 +10933,14 @@
                 <a:latin typeface="Times New Roman"/>
                 <a:ea typeface="DejaVu Sans"/>
               </a:rPr>
-              <a:t>50&lt;A,B,B,C&gt;, 5050&lt;A,B,B,B,C&gt;  </a:t>
+              <a:t>50&lt;A,B,B,C&gt;, 50&lt;A,B,B,B,C&gt;  </a:t>
             </a:r>
             <a:endParaRPr b="0" lang="en-US" sz="1300" spc="-1" strike="noStrike">
               <a:latin typeface="Arial"/>
             </a:endParaRPr>
           </a:p>
           <a:p>
-            <a:pPr marL="216000" indent="-212760">
+            <a:pPr marL="216000" indent="-212400">
               <a:lnSpc>
                 <a:spcPct val="100000"/>
               </a:lnSpc>
@@ -10972,7 +10972,7 @@
             </a:endParaRPr>
           </a:p>
           <a:p>
-            <a:pPr marL="216000" indent="-212760">
+            <a:pPr marL="216000" indent="-212400">
               <a:lnSpc>
                 <a:spcPct val="100000"/>
               </a:lnSpc>
@@ -11004,7 +11004,7 @@
             </a:endParaRPr>
           </a:p>
           <a:p>
-            <a:pPr marL="216000" indent="-212760">
+            <a:pPr marL="216000" indent="-212400">
               <a:lnSpc>
                 <a:spcPct val="100000"/>
               </a:lnSpc>
@@ -11268,7 +11268,7 @@
         <p:spPr>
           <a:xfrm>
             <a:off x="5852160" y="4144680"/>
-            <a:ext cx="1369440" cy="518040"/>
+            <a:ext cx="1369080" cy="517680"/>
           </a:xfrm>
           <a:prstGeom prst="rect">
             <a:avLst/>
@@ -11317,7 +11317,7 @@
         <p:spPr>
           <a:xfrm>
             <a:off x="5669280" y="2744640"/>
-            <a:ext cx="1095120" cy="455040"/>
+            <a:ext cx="1094760" cy="454680"/>
           </a:xfrm>
           <a:prstGeom prst="rect">
             <a:avLst/>
@@ -11366,7 +11366,7 @@
         <p:spPr>
           <a:xfrm>
             <a:off x="5943600" y="1479240"/>
-            <a:ext cx="912240" cy="255960"/>
+            <a:ext cx="911880" cy="255600"/>
           </a:xfrm>
           <a:prstGeom prst="rect">
             <a:avLst/>
@@ -11419,7 +11419,7 @@
         <p:spPr>
           <a:xfrm>
             <a:off x="4390560" y="1126800"/>
-            <a:ext cx="4661280" cy="426960"/>
+            <a:ext cx="4660920" cy="426600"/>
           </a:xfrm>
           <a:prstGeom prst="rect">
             <a:avLst/>
@@ -11442,7 +11442,7 @@
         <p:spPr>
           <a:xfrm>
             <a:off x="5120640" y="4663440"/>
-            <a:ext cx="3648600" cy="1012320"/>
+            <a:ext cx="3648240" cy="1011960"/>
           </a:xfrm>
           <a:prstGeom prst="rect">
             <a:avLst/>
@@ -11461,7 +11461,7 @@
         <p:spPr>
           <a:xfrm>
             <a:off x="6036480" y="5676480"/>
-            <a:ext cx="912240" cy="255960"/>
+            <a:ext cx="911880" cy="255600"/>
           </a:xfrm>
           <a:prstGeom prst="rect">
             <a:avLst/>
@@ -11563,7 +11563,7 @@
         <p:spPr>
           <a:xfrm>
             <a:off x="4390560" y="914400"/>
-            <a:ext cx="4661280" cy="426960"/>
+            <a:ext cx="4660920" cy="426600"/>
           </a:xfrm>
           <a:prstGeom prst="rect">
             <a:avLst/>
@@ -11573,39 +11573,16 @@
           </a:ln>
         </p:spPr>
       </p:pic>
-      <p:pic>
-        <p:nvPicPr>
-          <p:cNvPr id="249" name="" descr=""/>
-          <p:cNvPicPr/>
-          <p:nvPr/>
-        </p:nvPicPr>
-        <p:blipFill>
-          <a:blip r:embed="rId2"/>
-          <a:stretch/>
-        </p:blipFill>
-        <p:spPr>
-          <a:xfrm>
-            <a:off x="4663440" y="5244120"/>
-            <a:ext cx="4296960" cy="607320"/>
-          </a:xfrm>
-          <a:prstGeom prst="rect">
-            <a:avLst/>
-          </a:prstGeom>
-          <a:ln>
-            <a:noFill/>
-          </a:ln>
-        </p:spPr>
-      </p:pic>
       <p:sp>
         <p:nvSpPr>
-          <p:cNvPr id="250" name="CustomShape 1"/>
+          <p:cNvPr id="249" name="CustomShape 1"/>
           <p:cNvSpPr/>
           <p:nvPr/>
         </p:nvSpPr>
         <p:spPr>
           <a:xfrm>
             <a:off x="365760" y="274320"/>
-            <a:ext cx="8317800" cy="815760"/>
+            <a:ext cx="8317440" cy="815400"/>
           </a:xfrm>
           <a:prstGeom prst="rect">
             <a:avLst/>
@@ -11647,14 +11624,14 @@
       </p:sp>
       <p:sp>
         <p:nvSpPr>
-          <p:cNvPr id="251" name="CustomShape 2"/>
+          <p:cNvPr id="250" name="CustomShape 2"/>
           <p:cNvSpPr/>
           <p:nvPr/>
         </p:nvSpPr>
         <p:spPr>
           <a:xfrm>
             <a:off x="457200" y="1005840"/>
-            <a:ext cx="8134920" cy="4405680"/>
+            <a:ext cx="8134560" cy="4405320"/>
           </a:xfrm>
           <a:prstGeom prst="rect">
             <a:avLst/>
@@ -11891,7 +11868,7 @@
             </a:endParaRPr>
           </a:p>
           <a:p>
-            <a:pPr marL="216000" indent="-212760">
+            <a:pPr marL="216000" indent="-212400">
               <a:lnSpc>
                 <a:spcPct val="100000"/>
               </a:lnSpc>
@@ -11933,7 +11910,7 @@
             </a:endParaRPr>
           </a:p>
           <a:p>
-            <a:pPr marL="216000" indent="-212760">
+            <a:pPr marL="216000" indent="-212400">
               <a:lnSpc>
                 <a:spcPct val="100000"/>
               </a:lnSpc>
@@ -11988,7 +11965,7 @@
                 <a:latin typeface="Times New Roman"/>
                 <a:ea typeface="DejaVu Sans"/>
               </a:rPr>
-              <a:t>Pos: 50&lt;A,C&gt; </a:t>
+              <a:t>Pos: 50&lt;A&gt; </a:t>
             </a:r>
             <a:endParaRPr b="0" lang="en-US" sz="1300" spc="-1" strike="noStrike">
               <a:latin typeface="Arial"/>
@@ -12025,7 +12002,7 @@
             </a:endParaRPr>
           </a:p>
           <a:p>
-            <a:pPr marL="216000" indent="-212760">
+            <a:pPr marL="216000" indent="-212400">
               <a:lnSpc>
                 <a:spcPct val="100000"/>
               </a:lnSpc>
@@ -12057,7 +12034,7 @@
             </a:endParaRPr>
           </a:p>
           <a:p>
-            <a:pPr marL="216000" indent="-212760">
+            <a:pPr marL="216000" indent="-212400">
               <a:lnSpc>
                 <a:spcPct val="100000"/>
               </a:lnSpc>
@@ -12089,7 +12066,7 @@
             </a:endParaRPr>
           </a:p>
           <a:p>
-            <a:pPr marL="216000" indent="-212760">
+            <a:pPr marL="216000" indent="-212400">
               <a:lnSpc>
                 <a:spcPct val="100000"/>
               </a:lnSpc>
@@ -12176,14 +12153,14 @@
       </p:sp>
       <p:sp>
         <p:nvSpPr>
-          <p:cNvPr id="252" name="CustomShape 3"/>
+          <p:cNvPr id="251" name="CustomShape 3"/>
           <p:cNvSpPr/>
           <p:nvPr/>
         </p:nvSpPr>
         <p:spPr>
           <a:xfrm>
             <a:off x="6036480" y="1389240"/>
-            <a:ext cx="912240" cy="255960"/>
+            <a:ext cx="911880" cy="255600"/>
           </a:xfrm>
           <a:prstGeom prst="rect">
             <a:avLst/>
@@ -12225,18 +12202,18 @@
       </p:sp>
       <p:pic>
         <p:nvPicPr>
-          <p:cNvPr id="253" name="" descr=""/>
+          <p:cNvPr id="252" name="" descr=""/>
           <p:cNvPicPr/>
           <p:nvPr/>
         </p:nvPicPr>
         <p:blipFill>
-          <a:blip r:embed="rId3"/>
+          <a:blip r:embed="rId2"/>
           <a:stretch/>
         </p:blipFill>
         <p:spPr>
           <a:xfrm>
             <a:off x="4297680" y="4389120"/>
-            <a:ext cx="4564080" cy="720360"/>
+            <a:ext cx="4563720" cy="720000"/>
           </a:xfrm>
           <a:prstGeom prst="rect">
             <a:avLst/>
@@ -12248,14 +12225,14 @@
       </p:pic>
       <p:sp>
         <p:nvSpPr>
-          <p:cNvPr id="254" name="CustomShape 4"/>
+          <p:cNvPr id="253" name="CustomShape 4"/>
           <p:cNvSpPr/>
           <p:nvPr/>
         </p:nvSpPr>
         <p:spPr>
           <a:xfrm>
             <a:off x="6217920" y="5046840"/>
-            <a:ext cx="912240" cy="255960"/>
+            <a:ext cx="911880" cy="255600"/>
           </a:xfrm>
           <a:prstGeom prst="rect">
             <a:avLst/>
@@ -12297,14 +12274,14 @@
       </p:sp>
       <p:sp>
         <p:nvSpPr>
-          <p:cNvPr id="255" name="CustomShape 5"/>
+          <p:cNvPr id="254" name="CustomShape 5"/>
           <p:cNvSpPr/>
           <p:nvPr/>
         </p:nvSpPr>
         <p:spPr>
           <a:xfrm>
             <a:off x="6583680" y="5760720"/>
-            <a:ext cx="912240" cy="255960"/>
+            <a:ext cx="911880" cy="255600"/>
           </a:xfrm>
           <a:prstGeom prst="rect">
             <a:avLst/>
@@ -12344,6 +12321,29 @@
           </a:p>
         </p:txBody>
       </p:sp>
+      <p:pic>
+        <p:nvPicPr>
+          <p:cNvPr id="255" name="" descr=""/>
+          <p:cNvPicPr/>
+          <p:nvPr/>
+        </p:nvPicPr>
+        <p:blipFill>
+          <a:blip r:embed="rId3"/>
+          <a:stretch/>
+        </p:blipFill>
+        <p:spPr>
+          <a:xfrm>
+            <a:off x="4663440" y="1645920"/>
+            <a:ext cx="4431240" cy="974160"/>
+          </a:xfrm>
+          <a:prstGeom prst="rect">
+            <a:avLst/>
+          </a:prstGeom>
+          <a:ln>
+            <a:noFill/>
+          </a:ln>
+        </p:spPr>
+      </p:pic>
       <p:pic>
         <p:nvPicPr>
           <p:cNvPr id="256" name="" descr=""/>
@@ -12356,8 +12356,8 @@
         </p:blipFill>
         <p:spPr>
           <a:xfrm>
-            <a:off x="4663440" y="1645920"/>
-            <a:ext cx="4431600" cy="974520"/>
+            <a:off x="3522960" y="2847600"/>
+            <a:ext cx="5619960" cy="991800"/>
           </a:xfrm>
           <a:prstGeom prst="rect">
             <a:avLst/>
@@ -12367,39 +12367,16 @@
           </a:ln>
         </p:spPr>
       </p:pic>
-      <p:pic>
-        <p:nvPicPr>
-          <p:cNvPr id="257" name="" descr=""/>
-          <p:cNvPicPr/>
-          <p:nvPr/>
-        </p:nvPicPr>
-        <p:blipFill>
-          <a:blip r:embed="rId5"/>
-          <a:stretch/>
-        </p:blipFill>
-        <p:spPr>
-          <a:xfrm>
-            <a:off x="3522960" y="2847600"/>
-            <a:ext cx="5620320" cy="992160"/>
-          </a:xfrm>
-          <a:prstGeom prst="rect">
-            <a:avLst/>
-          </a:prstGeom>
-          <a:ln>
-            <a:noFill/>
-          </a:ln>
-        </p:spPr>
-      </p:pic>
       <p:sp>
         <p:nvSpPr>
-          <p:cNvPr id="258" name="CustomShape 6"/>
+          <p:cNvPr id="257" name="CustomShape 6"/>
           <p:cNvSpPr/>
           <p:nvPr/>
         </p:nvSpPr>
         <p:spPr>
           <a:xfrm>
             <a:off x="6126480" y="2560320"/>
-            <a:ext cx="912240" cy="255960"/>
+            <a:ext cx="911880" cy="255600"/>
           </a:xfrm>
           <a:prstGeom prst="rect">
             <a:avLst/>
@@ -12441,14 +12418,14 @@
       </p:sp>
       <p:sp>
         <p:nvSpPr>
-          <p:cNvPr id="259" name="CustomShape 7"/>
+          <p:cNvPr id="258" name="CustomShape 7"/>
           <p:cNvSpPr/>
           <p:nvPr/>
         </p:nvSpPr>
         <p:spPr>
           <a:xfrm>
             <a:off x="6766560" y="3766680"/>
-            <a:ext cx="912240" cy="255960"/>
+            <a:ext cx="911880" cy="255600"/>
           </a:xfrm>
           <a:prstGeom prst="rect">
             <a:avLst/>
@@ -12488,6 +12465,29 @@
           </a:p>
         </p:txBody>
       </p:sp>
+      <p:pic>
+        <p:nvPicPr>
+          <p:cNvPr id="259" name="" descr=""/>
+          <p:cNvPicPr/>
+          <p:nvPr/>
+        </p:nvPicPr>
+        <p:blipFill>
+          <a:blip r:embed="rId5"/>
+          <a:stretch/>
+        </p:blipFill>
+        <p:spPr>
+          <a:xfrm>
+            <a:off x="6075720" y="5303520"/>
+            <a:ext cx="2336760" cy="457200"/>
+          </a:xfrm>
+          <a:prstGeom prst="rect">
+            <a:avLst/>
+          </a:prstGeom>
+          <a:ln>
+            <a:noFill/>
+          </a:ln>
+        </p:spPr>
+      </p:pic>
     </p:spTree>
   </p:cSld>
   <p:timing>
@@ -12550,7 +12550,7 @@
         <p:spPr>
           <a:xfrm>
             <a:off x="4393800" y="2595600"/>
-            <a:ext cx="4198320" cy="878400"/>
+            <a:ext cx="4197960" cy="878040"/>
           </a:xfrm>
           <a:prstGeom prst="rect">
             <a:avLst/>
@@ -12569,7 +12569,7 @@
         <p:spPr>
           <a:xfrm>
             <a:off x="365760" y="274320"/>
-            <a:ext cx="8317800" cy="815760"/>
+            <a:ext cx="8317440" cy="815400"/>
           </a:xfrm>
           <a:prstGeom prst="rect">
             <a:avLst/>
@@ -12618,7 +12618,7 @@
         <p:spPr>
           <a:xfrm>
             <a:off x="457200" y="1005840"/>
-            <a:ext cx="8134920" cy="4405680"/>
+            <a:ext cx="8134560" cy="4405320"/>
           </a:xfrm>
           <a:prstGeom prst="rect">
             <a:avLst/>
@@ -12827,7 +12827,7 @@
             </a:endParaRPr>
           </a:p>
           <a:p>
-            <a:pPr marL="216000" indent="-212760">
+            <a:pPr marL="216000" indent="-212400">
               <a:lnSpc>
                 <a:spcPct val="100000"/>
               </a:lnSpc>
@@ -12879,7 +12879,7 @@
             </a:endParaRPr>
           </a:p>
           <a:p>
-            <a:pPr marL="216000" indent="-212760">
+            <a:pPr marL="216000" indent="-212400">
               <a:lnSpc>
                 <a:spcPct val="100000"/>
               </a:lnSpc>
@@ -12981,7 +12981,7 @@
             </a:endParaRPr>
           </a:p>
           <a:p>
-            <a:pPr marL="216000" indent="-212760">
+            <a:pPr marL="216000" indent="-212400">
               <a:lnSpc>
                 <a:spcPct val="100000"/>
               </a:lnSpc>
@@ -13013,7 +13013,7 @@
             </a:endParaRPr>
           </a:p>
           <a:p>
-            <a:pPr marL="216000" indent="-212760">
+            <a:pPr marL="216000" indent="-212400">
               <a:lnSpc>
                 <a:spcPct val="100000"/>
               </a:lnSpc>
@@ -13123,7 +13123,7 @@
         <p:spPr>
           <a:xfrm>
             <a:off x="6035040" y="3566160"/>
-            <a:ext cx="1369440" cy="364320"/>
+            <a:ext cx="1369080" cy="363960"/>
           </a:xfrm>
           <a:prstGeom prst="rect">
             <a:avLst/>
@@ -13172,7 +13172,7 @@
         <p:spPr>
           <a:xfrm>
             <a:off x="6127200" y="2377440"/>
-            <a:ext cx="912240" cy="255960"/>
+            <a:ext cx="911880" cy="255600"/>
           </a:xfrm>
           <a:prstGeom prst="rect">
             <a:avLst/>
@@ -13225,7 +13225,7 @@
         <p:spPr>
           <a:xfrm>
             <a:off x="4389120" y="1564200"/>
-            <a:ext cx="4564080" cy="720360"/>
+            <a:ext cx="4563720" cy="720000"/>
           </a:xfrm>
           <a:prstGeom prst="rect">
             <a:avLst/>
@@ -13248,7 +13248,7 @@
         <p:spPr>
           <a:xfrm>
             <a:off x="4389120" y="3931920"/>
-            <a:ext cx="4472640" cy="905760"/>
+            <a:ext cx="4472280" cy="905400"/>
           </a:xfrm>
           <a:prstGeom prst="rect">
             <a:avLst/>
@@ -13271,7 +13271,7 @@
         <p:spPr>
           <a:xfrm>
             <a:off x="4121280" y="5050080"/>
-            <a:ext cx="4655520" cy="800640"/>
+            <a:ext cx="4655160" cy="800280"/>
           </a:xfrm>
           <a:prstGeom prst="rect">
             <a:avLst/>
@@ -13290,7 +13290,7 @@
         <p:spPr>
           <a:xfrm>
             <a:off x="5943600" y="4754880"/>
-            <a:ext cx="1369440" cy="364320"/>
+            <a:ext cx="1369080" cy="363960"/>
           </a:xfrm>
           <a:prstGeom prst="rect">
             <a:avLst/>
@@ -13339,7 +13339,7 @@
         <p:spPr>
           <a:xfrm>
             <a:off x="6309360" y="5760720"/>
-            <a:ext cx="1369440" cy="364320"/>
+            <a:ext cx="1369080" cy="363960"/>
           </a:xfrm>
           <a:prstGeom prst="rect">
             <a:avLst/>
@@ -13441,7 +13441,7 @@
         <p:spPr>
           <a:xfrm>
             <a:off x="4663440" y="1836720"/>
-            <a:ext cx="4479120" cy="687240"/>
+            <a:ext cx="4478760" cy="686880"/>
           </a:xfrm>
           <a:prstGeom prst="rect">
             <a:avLst/>
@@ -13460,7 +13460,7 @@
         <p:spPr>
           <a:xfrm>
             <a:off x="365760" y="274320"/>
-            <a:ext cx="8317800" cy="815760"/>
+            <a:ext cx="8317440" cy="815400"/>
           </a:xfrm>
           <a:prstGeom prst="rect">
             <a:avLst/>
@@ -13509,7 +13509,7 @@
         <p:spPr>
           <a:xfrm>
             <a:off x="457200" y="1005840"/>
-            <a:ext cx="8134920" cy="4405680"/>
+            <a:ext cx="8134560" cy="4405320"/>
           </a:xfrm>
           <a:prstGeom prst="rect">
             <a:avLst/>
@@ -13564,7 +13564,7 @@
             </a:endParaRPr>
           </a:p>
           <a:p>
-            <a:pPr marL="216000" indent="-212760">
+            <a:pPr marL="216000" indent="-212400">
               <a:lnSpc>
                 <a:spcPct val="100000"/>
               </a:lnSpc>
@@ -13619,14 +13619,14 @@
                 <a:latin typeface="Times New Roman"/>
                 <a:ea typeface="DejaVu Sans"/>
               </a:rPr>
-              <a:t>Pos: 50 &lt;A,C&gt;, 50 &lt;A,B,D C&gt;, 50&lt;A,B,D,B,D,C&gt;</a:t>
+              <a:t>Pos: 50 &lt;A,C&gt;, 50 &lt;A,B,D,C&gt;, 50&lt;A,B,D,B,D,C&gt;</a:t>
             </a:r>
             <a:endParaRPr b="0" lang="en-US" sz="1300" spc="-1" strike="noStrike">
               <a:latin typeface="Arial"/>
             </a:endParaRPr>
           </a:p>
           <a:p>
-            <a:pPr marL="216000" indent="-212760">
+            <a:pPr marL="216000" indent="-212400">
               <a:lnSpc>
                 <a:spcPct val="100000"/>
               </a:lnSpc>
@@ -13658,7 +13658,7 @@
             </a:endParaRPr>
           </a:p>
           <a:p>
-            <a:pPr marL="216000" indent="-212760">
+            <a:pPr marL="216000" indent="-212400">
               <a:lnSpc>
                 <a:spcPct val="100000"/>
               </a:lnSpc>
@@ -13761,24 +13761,14 @@
                 <a:latin typeface="Times New Roman"/>
                 <a:ea typeface="DejaVu Sans"/>
               </a:rPr>
-              <a:t>Data: </a:t>
-            </a:r>
-            <a:r>
-              <a:rPr b="1" lang="en-US" sz="1300" spc="-1" strike="noStrike">
-                <a:solidFill>
-                  <a:srgbClr val="000000"/>
-                </a:solidFill>
-                <a:latin typeface="Times New Roman"/>
-                <a:ea typeface="DejaVu Sans"/>
-              </a:rPr>
-              <a:t>existing model M3.2</a:t>
+              <a:t>Data: existing model M3.2</a:t>
             </a:r>
             <a:endParaRPr b="0" lang="en-US" sz="1300" spc="-1" strike="noStrike">
               <a:latin typeface="Arial"/>
             </a:endParaRPr>
           </a:p>
           <a:p>
-            <a:pPr marL="216000" indent="-212760">
+            <a:pPr marL="216000" indent="-212400">
               <a:lnSpc>
                 <a:spcPct val="100000"/>
               </a:lnSpc>
@@ -13814,7 +13804,7 @@
             </a:endParaRPr>
           </a:p>
           <a:p>
-            <a:pPr marL="216000" indent="-212760">
+            <a:pPr marL="216000" indent="-212400">
               <a:lnSpc>
                 <a:spcPct val="100000"/>
               </a:lnSpc>
@@ -13833,7 +13823,7 @@
                 <a:latin typeface="Times New Roman"/>
                 <a:ea typeface="DejaVu Sans"/>
               </a:rPr>
-              <a:t>      </a:t>
+              <a:t>       </a:t>
             </a:r>
             <a:r>
               <a:rPr b="1" lang="en-US" sz="1300" spc="-1" strike="noStrike">
@@ -13850,7 +13840,7 @@
             </a:endParaRPr>
           </a:p>
           <a:p>
-            <a:pPr marL="216000" indent="-212760">
+            <a:pPr marL="216000" indent="-212400">
               <a:lnSpc>
                 <a:spcPct val="100000"/>
               </a:lnSpc>
@@ -13882,7 +13872,7 @@
             </a:endParaRPr>
           </a:p>
           <a:p>
-            <a:pPr marL="216000" indent="-212760">
+            <a:pPr marL="216000" indent="-212400">
               <a:lnSpc>
                 <a:spcPct val="100000"/>
               </a:lnSpc>
@@ -13976,7 +13966,7 @@
         <p:spPr>
           <a:xfrm>
             <a:off x="6217920" y="2525400"/>
-            <a:ext cx="1369440" cy="518040"/>
+            <a:ext cx="1369080" cy="517680"/>
           </a:xfrm>
           <a:prstGeom prst="rect">
             <a:avLst/>
@@ -14029,7 +14019,7 @@
         <p:spPr>
           <a:xfrm>
             <a:off x="5584680" y="822960"/>
-            <a:ext cx="3648600" cy="1012320"/>
+            <a:ext cx="3648240" cy="1011960"/>
           </a:xfrm>
           <a:prstGeom prst="rect">
             <a:avLst/>
@@ -14048,7 +14038,7 @@
         <p:spPr>
           <a:xfrm>
             <a:off x="4846320" y="1249200"/>
-            <a:ext cx="912240" cy="255960"/>
+            <a:ext cx="911880" cy="255600"/>
           </a:xfrm>
           <a:prstGeom prst="rect">
             <a:avLst/>
@@ -14101,7 +14091,7 @@
         <p:spPr>
           <a:xfrm>
             <a:off x="5650920" y="2834640"/>
-            <a:ext cx="3400920" cy="943920"/>
+            <a:ext cx="3400560" cy="943560"/>
           </a:xfrm>
           <a:prstGeom prst="rect">
             <a:avLst/>
@@ -14120,7 +14110,7 @@
         <p:spPr>
           <a:xfrm>
             <a:off x="6583680" y="3779280"/>
-            <a:ext cx="1369440" cy="335160"/>
+            <a:ext cx="1369080" cy="334800"/>
           </a:xfrm>
           <a:prstGeom prst="rect">
             <a:avLst/>
@@ -14173,7 +14163,7 @@
         <p:spPr>
           <a:xfrm>
             <a:off x="4754880" y="4664160"/>
-            <a:ext cx="4391640" cy="821520"/>
+            <a:ext cx="4391280" cy="821160"/>
           </a:xfrm>
           <a:prstGeom prst="rect">
             <a:avLst/>
@@ -14192,7 +14182,7 @@
         <p:spPr>
           <a:xfrm>
             <a:off x="6676560" y="5485680"/>
-            <a:ext cx="1369440" cy="335160"/>
+            <a:ext cx="1369080" cy="334800"/>
           </a:xfrm>
           <a:prstGeom prst="rect">
             <a:avLst/>
@@ -14290,7 +14280,7 @@
         <p:spPr>
           <a:xfrm>
             <a:off x="365760" y="274320"/>
-            <a:ext cx="8317800" cy="815760"/>
+            <a:ext cx="8317440" cy="815400"/>
           </a:xfrm>
           <a:prstGeom prst="rect">
             <a:avLst/>
@@ -14339,7 +14329,7 @@
         <p:spPr>
           <a:xfrm>
             <a:off x="457200" y="1005840"/>
-            <a:ext cx="8134920" cy="4405680"/>
+            <a:ext cx="8134560" cy="4405320"/>
           </a:xfrm>
           <a:prstGeom prst="rect">
             <a:avLst/>
@@ -14394,7 +14384,7 @@
             </a:endParaRPr>
           </a:p>
           <a:p>
-            <a:pPr marL="216000" indent="-212760">
+            <a:pPr marL="216000" indent="-212400">
               <a:lnSpc>
                 <a:spcPct val="100000"/>
               </a:lnSpc>
@@ -14486,7 +14476,7 @@
             </a:endParaRPr>
           </a:p>
           <a:p>
-            <a:pPr marL="216000" indent="-212760">
+            <a:pPr marL="216000" indent="-212400">
               <a:lnSpc>
                 <a:spcPct val="100000"/>
               </a:lnSpc>
@@ -14518,7 +14508,7 @@
             </a:endParaRPr>
           </a:p>
           <a:p>
-            <a:pPr marL="216000" indent="-212760">
+            <a:pPr marL="216000" indent="-212400">
               <a:lnSpc>
                 <a:spcPct val="100000"/>
               </a:lnSpc>
@@ -14660,7 +14650,7 @@
         <p:spPr>
           <a:xfrm>
             <a:off x="6035040" y="3566160"/>
-            <a:ext cx="1369440" cy="364320"/>
+            <a:ext cx="1369080" cy="363960"/>
           </a:xfrm>
           <a:prstGeom prst="rect">
             <a:avLst/>
@@ -14709,7 +14699,7 @@
         <p:spPr>
           <a:xfrm>
             <a:off x="6127200" y="2377440"/>
-            <a:ext cx="912240" cy="255960"/>
+            <a:ext cx="911880" cy="255600"/>
           </a:xfrm>
           <a:prstGeom prst="rect">
             <a:avLst/>
@@ -14762,7 +14752,7 @@
         <p:spPr>
           <a:xfrm>
             <a:off x="4389120" y="1564200"/>
-            <a:ext cx="4564080" cy="720360"/>
+            <a:ext cx="4563720" cy="720000"/>
           </a:xfrm>
           <a:prstGeom prst="rect">
             <a:avLst/>
@@ -14785,7 +14775,7 @@
         <p:spPr>
           <a:xfrm>
             <a:off x="3505680" y="2656440"/>
-            <a:ext cx="5454720" cy="817560"/>
+            <a:ext cx="5454360" cy="817200"/>
           </a:xfrm>
           <a:prstGeom prst="rect">
             <a:avLst/>
@@ -14808,7 +14798,7 @@
         <p:spPr>
           <a:xfrm>
             <a:off x="4480560" y="3968640"/>
-            <a:ext cx="4570920" cy="1242720"/>
+            <a:ext cx="4570560" cy="1242360"/>
           </a:xfrm>
           <a:prstGeom prst="rect">
             <a:avLst/>
@@ -14827,7 +14817,7 @@
         <p:spPr>
           <a:xfrm>
             <a:off x="6309360" y="5304240"/>
-            <a:ext cx="1369440" cy="364320"/>
+            <a:ext cx="1369080" cy="363960"/>
           </a:xfrm>
           <a:prstGeom prst="rect">
             <a:avLst/>
@@ -14929,7 +14919,7 @@
         <p:spPr>
           <a:xfrm>
             <a:off x="4439880" y="2013120"/>
-            <a:ext cx="4703400" cy="1278720"/>
+            <a:ext cx="4703040" cy="1278360"/>
           </a:xfrm>
           <a:prstGeom prst="rect">
             <a:avLst/>
@@ -14948,7 +14938,7 @@
         <p:spPr>
           <a:xfrm>
             <a:off x="368280" y="182880"/>
-            <a:ext cx="8317800" cy="815760"/>
+            <a:ext cx="8317440" cy="815400"/>
           </a:xfrm>
           <a:prstGeom prst="rect">
             <a:avLst/>
@@ -15007,7 +14997,7 @@
         <p:spPr>
           <a:xfrm>
             <a:off x="457200" y="1005840"/>
-            <a:ext cx="8134920" cy="4405680"/>
+            <a:ext cx="8134560" cy="4405320"/>
           </a:xfrm>
           <a:prstGeom prst="rect">
             <a:avLst/>
@@ -15026,7 +15016,7 @@
         <p:txBody>
           <a:bodyPr lIns="90000" rIns="90000" tIns="45000" bIns="45000"/>
           <a:p>
-            <a:pPr marL="216000" indent="-212760">
+            <a:pPr marL="216000" indent="-212400">
               <a:lnSpc>
                 <a:spcPct val="100000"/>
               </a:lnSpc>
@@ -15170,7 +15160,7 @@
             </a:endParaRPr>
           </a:p>
           <a:p>
-            <a:pPr marL="216000" indent="-212760">
+            <a:pPr marL="216000" indent="-212400">
               <a:lnSpc>
                 <a:spcPct val="100000"/>
               </a:lnSpc>
@@ -15580,7 +15570,7 @@
         <p:spPr>
           <a:xfrm>
             <a:off x="6402240" y="1721880"/>
-            <a:ext cx="912240" cy="255960"/>
+            <a:ext cx="911880" cy="255600"/>
           </a:xfrm>
           <a:prstGeom prst="rect">
             <a:avLst/>
@@ -15633,7 +15623,7 @@
         <p:spPr>
           <a:xfrm>
             <a:off x="4754880" y="914400"/>
-            <a:ext cx="4388400" cy="806760"/>
+            <a:ext cx="4388040" cy="806400"/>
           </a:xfrm>
           <a:prstGeom prst="rect">
             <a:avLst/>
@@ -15652,7 +15642,7 @@
         <p:spPr>
           <a:xfrm>
             <a:off x="7316640" y="3218040"/>
-            <a:ext cx="912240" cy="255960"/>
+            <a:ext cx="911880" cy="255600"/>
           </a:xfrm>
           <a:prstGeom prst="rect">
             <a:avLst/>
@@ -15701,7 +15691,7 @@
         <p:spPr>
           <a:xfrm>
             <a:off x="6949440" y="5595480"/>
-            <a:ext cx="912240" cy="255960"/>
+            <a:ext cx="911880" cy="255600"/>
           </a:xfrm>
           <a:prstGeom prst="rect">
             <a:avLst/>
@@ -15754,7 +15744,7 @@
         <p:spPr>
           <a:xfrm>
             <a:off x="4378320" y="3657600"/>
-            <a:ext cx="4764960" cy="1919520"/>
+            <a:ext cx="4764600" cy="1919160"/>
           </a:xfrm>
           <a:prstGeom prst="rect">
             <a:avLst/>
@@ -15822,7 +15812,7 @@
         <p:spPr>
           <a:xfrm>
             <a:off x="365760" y="274320"/>
-            <a:ext cx="8317800" cy="815760"/>
+            <a:ext cx="8317440" cy="815400"/>
           </a:xfrm>
           <a:prstGeom prst="rect">
             <a:avLst/>
@@ -15871,7 +15861,7 @@
         <p:spPr>
           <a:xfrm>
             <a:off x="457200" y="1005840"/>
-            <a:ext cx="8134920" cy="4405680"/>
+            <a:ext cx="8134560" cy="4405320"/>
           </a:xfrm>
           <a:prstGeom prst="rect">
             <a:avLst/>
@@ -15890,7 +15880,7 @@
         <p:txBody>
           <a:bodyPr lIns="90000" rIns="90000" tIns="45000" bIns="45000"/>
           <a:p>
-            <a:pPr marL="216000" indent="-212760">
+            <a:pPr marL="216000" indent="-212400">
               <a:lnSpc>
                 <a:spcPct val="100000"/>
               </a:lnSpc>
@@ -15958,7 +15948,7 @@
             </a:endParaRPr>
           </a:p>
           <a:p>
-            <a:pPr marL="216000" indent="-212760">
+            <a:pPr marL="216000" indent="-212400">
               <a:lnSpc>
                 <a:spcPct val="100000"/>
               </a:lnSpc>
@@ -15990,7 +15980,7 @@
             </a:endParaRPr>
           </a:p>
           <a:p>
-            <a:pPr marL="216000" indent="-212760">
+            <a:pPr marL="216000" indent="-212400">
               <a:lnSpc>
                 <a:spcPct val="100000"/>
               </a:lnSpc>
@@ -16224,7 +16214,7 @@
         <p:spPr>
           <a:xfrm>
             <a:off x="4755240" y="2651760"/>
-            <a:ext cx="1004400" cy="272880"/>
+            <a:ext cx="1004040" cy="272520"/>
           </a:xfrm>
           <a:prstGeom prst="rect">
             <a:avLst/>
@@ -16273,7 +16263,7 @@
         <p:spPr>
           <a:xfrm>
             <a:off x="4846320" y="1249200"/>
-            <a:ext cx="912240" cy="255960"/>
+            <a:ext cx="911880" cy="255600"/>
           </a:xfrm>
           <a:prstGeom prst="rect">
             <a:avLst/>
@@ -16322,7 +16312,7 @@
         <p:spPr>
           <a:xfrm>
             <a:off x="6675120" y="4663800"/>
-            <a:ext cx="1004400" cy="272880"/>
+            <a:ext cx="1004040" cy="272520"/>
           </a:xfrm>
           <a:prstGeom prst="rect">
             <a:avLst/>
@@ -16375,7 +16365,7 @@
         <p:spPr>
           <a:xfrm>
             <a:off x="5577840" y="837000"/>
-            <a:ext cx="3130560" cy="1082160"/>
+            <a:ext cx="3130200" cy="1081800"/>
           </a:xfrm>
           <a:prstGeom prst="rect">
             <a:avLst/>
@@ -16398,7 +16388,7 @@
         <p:spPr>
           <a:xfrm>
             <a:off x="5669280" y="1915920"/>
-            <a:ext cx="2833560" cy="1466280"/>
+            <a:ext cx="2833200" cy="1465920"/>
           </a:xfrm>
           <a:prstGeom prst="rect">
             <a:avLst/>
@@ -16421,7 +16411,7 @@
         <p:spPr>
           <a:xfrm>
             <a:off x="5261040" y="3383280"/>
-            <a:ext cx="3790440" cy="1277280"/>
+            <a:ext cx="3790080" cy="1276920"/>
           </a:xfrm>
           <a:prstGeom prst="rect">
             <a:avLst/>
@@ -16444,7 +16434,7 @@
         <p:spPr>
           <a:xfrm>
             <a:off x="383400" y="4887000"/>
-            <a:ext cx="3913200" cy="872640"/>
+            <a:ext cx="3912840" cy="872280"/>
           </a:xfrm>
           <a:prstGeom prst="rect">
             <a:avLst/>
@@ -16463,7 +16453,7 @@
         <p:spPr>
           <a:xfrm>
             <a:off x="1371960" y="5760720"/>
-            <a:ext cx="1004400" cy="272880"/>
+            <a:ext cx="1004040" cy="272520"/>
           </a:xfrm>
           <a:prstGeom prst="rect">
             <a:avLst/>
@@ -16516,7 +16506,7 @@
         <p:spPr>
           <a:xfrm>
             <a:off x="4926960" y="4937760"/>
-            <a:ext cx="3758760" cy="884160"/>
+            <a:ext cx="3758400" cy="883800"/>
           </a:xfrm>
           <a:prstGeom prst="rect">
             <a:avLst/>
@@ -16535,7 +16525,7 @@
         <p:spPr>
           <a:xfrm>
             <a:off x="5852160" y="5761080"/>
-            <a:ext cx="1004400" cy="272880"/>
+            <a:ext cx="1004040" cy="272520"/>
           </a:xfrm>
           <a:prstGeom prst="rect">
             <a:avLst/>
@@ -16633,7 +16623,7 @@
         <p:spPr>
           <a:xfrm>
             <a:off x="365760" y="274320"/>
-            <a:ext cx="6397560" cy="451440"/>
+            <a:ext cx="6397200" cy="451080"/>
           </a:xfrm>
           <a:prstGeom prst="rect">
             <a:avLst/>
@@ -16682,7 +16672,7 @@
         <p:spPr>
           <a:xfrm>
             <a:off x="457200" y="1005840"/>
-            <a:ext cx="8134920" cy="4007880"/>
+            <a:ext cx="8134560" cy="4007520"/>
           </a:xfrm>
           <a:prstGeom prst="rect">
             <a:avLst/>
@@ -16701,7 +16691,7 @@
         <p:txBody>
           <a:bodyPr lIns="90000" rIns="90000" tIns="45000" bIns="45000"/>
           <a:p>
-            <a:pPr marL="216000" indent="-212760">
+            <a:pPr marL="216000" indent="-212400">
               <a:lnSpc>
                 <a:spcPct val="100000"/>
               </a:lnSpc>
@@ -16749,7 +16739,7 @@
             </a:endParaRPr>
           </a:p>
           <a:p>
-            <a:pPr marL="216000" indent="-212760">
+            <a:pPr marL="216000" indent="-212400">
               <a:lnSpc>
                 <a:spcPct val="100000"/>
               </a:lnSpc>
@@ -16797,7 +16787,7 @@
             </a:endParaRPr>
           </a:p>
           <a:p>
-            <a:pPr marL="216000" indent="-212760">
+            <a:pPr marL="216000" indent="-212400">
               <a:lnSpc>
                 <a:spcPct val="100000"/>
               </a:lnSpc>
@@ -16845,7 +16835,7 @@
             </a:endParaRPr>
           </a:p>
           <a:p>
-            <a:pPr marL="216000" indent="-212760">
+            <a:pPr marL="216000" indent="-212400">
               <a:lnSpc>
                 <a:spcPct val="100000"/>
               </a:lnSpc>
@@ -16956,7 +16946,7 @@
         <p:spPr>
           <a:xfrm>
             <a:off x="365760" y="274320"/>
-            <a:ext cx="8317800" cy="815760"/>
+            <a:ext cx="8317440" cy="815400"/>
           </a:xfrm>
           <a:prstGeom prst="rect">
             <a:avLst/>
@@ -17005,7 +16995,7 @@
         <p:spPr>
           <a:xfrm>
             <a:off x="457200" y="1005840"/>
-            <a:ext cx="8134920" cy="4405680"/>
+            <a:ext cx="8134560" cy="4405320"/>
           </a:xfrm>
           <a:prstGeom prst="rect">
             <a:avLst/>
@@ -17024,7 +17014,7 @@
         <p:txBody>
           <a:bodyPr lIns="90000" rIns="90000" tIns="45000" bIns="45000"/>
           <a:p>
-            <a:pPr marL="216000" indent="-212760">
+            <a:pPr marL="216000" indent="-212400">
               <a:lnSpc>
                 <a:spcPct val="100000"/>
               </a:lnSpc>
@@ -17092,7 +17082,7 @@
             </a:endParaRPr>
           </a:p>
           <a:p>
-            <a:pPr marL="216000" indent="-212760">
+            <a:pPr marL="216000" indent="-212400">
               <a:lnSpc>
                 <a:spcPct val="100000"/>
               </a:lnSpc>
@@ -17124,7 +17114,7 @@
             </a:endParaRPr>
           </a:p>
           <a:p>
-            <a:pPr marL="216000" indent="-212760">
+            <a:pPr marL="216000" indent="-212400">
               <a:lnSpc>
                 <a:spcPct val="100000"/>
               </a:lnSpc>
@@ -17364,7 +17354,7 @@
         <p:spPr>
           <a:xfrm>
             <a:off x="6217920" y="2560320"/>
-            <a:ext cx="1004400" cy="272880"/>
+            <a:ext cx="1004040" cy="272520"/>
           </a:xfrm>
           <a:prstGeom prst="rect">
             <a:avLst/>
@@ -17413,7 +17403,7 @@
         <p:spPr>
           <a:xfrm>
             <a:off x="4846320" y="1249200"/>
-            <a:ext cx="912240" cy="255960"/>
+            <a:ext cx="911880" cy="255600"/>
           </a:xfrm>
           <a:prstGeom prst="rect">
             <a:avLst/>
@@ -17462,7 +17452,7 @@
         <p:spPr>
           <a:xfrm>
             <a:off x="6675120" y="4206600"/>
-            <a:ext cx="1004400" cy="272880"/>
+            <a:ext cx="1004040" cy="272520"/>
           </a:xfrm>
           <a:prstGeom prst="rect">
             <a:avLst/>
@@ -17515,7 +17505,7 @@
         <p:spPr>
           <a:xfrm>
             <a:off x="5578200" y="837360"/>
-            <a:ext cx="3130560" cy="1082160"/>
+            <a:ext cx="3130200" cy="1081800"/>
           </a:xfrm>
           <a:prstGeom prst="rect">
             <a:avLst/>
@@ -17538,7 +17528,7 @@
         <p:spPr>
           <a:xfrm>
             <a:off x="4480560" y="1920240"/>
-            <a:ext cx="4582440" cy="657720"/>
+            <a:ext cx="4582080" cy="657360"/>
           </a:xfrm>
           <a:prstGeom prst="rect">
             <a:avLst/>
@@ -17561,7 +17551,7 @@
         <p:spPr>
           <a:xfrm>
             <a:off x="5303520" y="3008520"/>
-            <a:ext cx="3776040" cy="1196640"/>
+            <a:ext cx="3775680" cy="1196280"/>
           </a:xfrm>
           <a:prstGeom prst="rect">
             <a:avLst/>
@@ -17584,7 +17574,7 @@
         <p:spPr>
           <a:xfrm>
             <a:off x="5303520" y="4550760"/>
-            <a:ext cx="4022280" cy="934560"/>
+            <a:ext cx="4021920" cy="934200"/>
           </a:xfrm>
           <a:prstGeom prst="rect">
             <a:avLst/>
@@ -17603,7 +17593,7 @@
         <p:spPr>
           <a:xfrm>
             <a:off x="6675480" y="5577840"/>
-            <a:ext cx="1004400" cy="272880"/>
+            <a:ext cx="1004040" cy="272520"/>
           </a:xfrm>
           <a:prstGeom prst="rect">
             <a:avLst/>
@@ -17701,7 +17691,7 @@
         <p:spPr>
           <a:xfrm>
             <a:off x="365760" y="274320"/>
-            <a:ext cx="8317800" cy="815760"/>
+            <a:ext cx="8317440" cy="815400"/>
           </a:xfrm>
           <a:prstGeom prst="rect">
             <a:avLst/>
@@ -17754,7 +17744,7 @@
         <p:spPr>
           <a:xfrm>
             <a:off x="5118480" y="4572000"/>
-            <a:ext cx="3933000" cy="913320"/>
+            <a:ext cx="3932640" cy="912960"/>
           </a:xfrm>
           <a:prstGeom prst="rect">
             <a:avLst/>
@@ -17773,7 +17763,7 @@
         <p:spPr>
           <a:xfrm>
             <a:off x="457200" y="1005840"/>
-            <a:ext cx="8134920" cy="4405680"/>
+            <a:ext cx="8134560" cy="4405320"/>
           </a:xfrm>
           <a:prstGeom prst="rect">
             <a:avLst/>
@@ -17848,7 +17838,7 @@
             </a:endParaRPr>
           </a:p>
           <a:p>
-            <a:pPr marL="216000" indent="-212760">
+            <a:pPr marL="216000" indent="-212400">
               <a:lnSpc>
                 <a:spcPct val="100000"/>
               </a:lnSpc>
@@ -17880,7 +17870,7 @@
             </a:endParaRPr>
           </a:p>
           <a:p>
-            <a:pPr marL="216000" indent="-212760">
+            <a:pPr marL="216000" indent="-212400">
               <a:lnSpc>
                 <a:spcPct val="100000"/>
               </a:lnSpc>
@@ -18120,7 +18110,7 @@
         <p:spPr>
           <a:xfrm>
             <a:off x="6217920" y="2560320"/>
-            <a:ext cx="1004400" cy="272880"/>
+            <a:ext cx="1004040" cy="272520"/>
           </a:xfrm>
           <a:prstGeom prst="rect">
             <a:avLst/>
@@ -18169,7 +18159,7 @@
         <p:spPr>
           <a:xfrm>
             <a:off x="4846320" y="1249200"/>
-            <a:ext cx="912240" cy="255960"/>
+            <a:ext cx="911880" cy="255600"/>
           </a:xfrm>
           <a:prstGeom prst="rect">
             <a:avLst/>
@@ -18218,7 +18208,7 @@
         <p:spPr>
           <a:xfrm>
             <a:off x="6675120" y="4206600"/>
-            <a:ext cx="1004400" cy="272880"/>
+            <a:ext cx="1004040" cy="272520"/>
           </a:xfrm>
           <a:prstGeom prst="rect">
             <a:avLst/>
@@ -18271,7 +18261,7 @@
         <p:spPr>
           <a:xfrm>
             <a:off x="5578200" y="837360"/>
-            <a:ext cx="3130560" cy="1082160"/>
+            <a:ext cx="3130200" cy="1081800"/>
           </a:xfrm>
           <a:prstGeom prst="rect">
             <a:avLst/>
@@ -18290,7 +18280,7 @@
         <p:spPr>
           <a:xfrm>
             <a:off x="6675480" y="5577840"/>
-            <a:ext cx="1004400" cy="272880"/>
+            <a:ext cx="1004040" cy="272520"/>
           </a:xfrm>
           <a:prstGeom prst="rect">
             <a:avLst/>
@@ -18343,7 +18333,7 @@
         <p:spPr>
           <a:xfrm>
             <a:off x="4389120" y="1920240"/>
-            <a:ext cx="4753800" cy="558360"/>
+            <a:ext cx="4753440" cy="558000"/>
           </a:xfrm>
           <a:prstGeom prst="rect">
             <a:avLst/>
@@ -18366,7 +18356,7 @@
         <p:spPr>
           <a:xfrm>
             <a:off x="5577840" y="2837520"/>
-            <a:ext cx="3290760" cy="1367640"/>
+            <a:ext cx="3290400" cy="1367280"/>
           </a:xfrm>
           <a:prstGeom prst="rect">
             <a:avLst/>
@@ -18434,7 +18424,7 @@
         <p:spPr>
           <a:xfrm>
             <a:off x="365760" y="274320"/>
-            <a:ext cx="6397560" cy="451440"/>
+            <a:ext cx="6397200" cy="451080"/>
           </a:xfrm>
           <a:prstGeom prst="rect">
             <a:avLst/>
@@ -18493,7 +18483,7 @@
         <p:spPr>
           <a:xfrm>
             <a:off x="642960" y="1010520"/>
-            <a:ext cx="8134920" cy="5664240"/>
+            <a:ext cx="8134560" cy="5663880"/>
           </a:xfrm>
           <a:prstGeom prst="rect">
             <a:avLst/>
@@ -18512,7 +18502,7 @@
         <p:txBody>
           <a:bodyPr lIns="90000" rIns="90000" tIns="45000" bIns="45000"/>
           <a:p>
-            <a:pPr marL="216000" indent="-212760">
+            <a:pPr marL="216000" indent="-212400">
               <a:lnSpc>
                 <a:spcPct val="100000"/>
               </a:lnSpc>
@@ -18630,7 +18620,7 @@
             </a:endParaRPr>
           </a:p>
           <a:p>
-            <a:pPr marL="216000" indent="-215640">
+            <a:pPr marL="216000" indent="-215280">
               <a:lnSpc>
                 <a:spcPct val="100000"/>
               </a:lnSpc>
@@ -18656,7 +18646,7 @@
             </a:endParaRPr>
           </a:p>
           <a:p>
-            <a:pPr marL="216000" indent="-215640">
+            <a:pPr marL="216000" indent="-215280">
               <a:lnSpc>
                 <a:spcPct val="100000"/>
               </a:lnSpc>
@@ -18682,7 +18672,7 @@
             </a:endParaRPr>
           </a:p>
           <a:p>
-            <a:pPr marL="216000" indent="-215640">
+            <a:pPr marL="216000" indent="-215280">
               <a:lnSpc>
                 <a:spcPct val="100000"/>
               </a:lnSpc>
@@ -18708,7 +18698,7 @@
             </a:endParaRPr>
           </a:p>
           <a:p>
-            <a:pPr marL="216000" indent="-215640">
+            <a:pPr marL="216000" indent="-215280">
               <a:lnSpc>
                 <a:spcPct val="100000"/>
               </a:lnSpc>
@@ -18744,7 +18734,7 @@
             </a:endParaRPr>
           </a:p>
           <a:p>
-            <a:pPr marL="216000" indent="-215640">
+            <a:pPr marL="216000" indent="-215280">
               <a:lnSpc>
                 <a:spcPct val="100000"/>
               </a:lnSpc>
@@ -18770,7 +18760,7 @@
             </a:endParaRPr>
           </a:p>
           <a:p>
-            <a:pPr marL="216000" indent="-215640">
+            <a:pPr marL="216000" indent="-215280">
               <a:lnSpc>
                 <a:spcPct val="100000"/>
               </a:lnSpc>
@@ -18806,7 +18796,7 @@
             </a:endParaRPr>
           </a:p>
           <a:p>
-            <a:pPr marL="216000" indent="-215640">
+            <a:pPr marL="216000" indent="-215280">
               <a:lnSpc>
                 <a:spcPct val="100000"/>
               </a:lnSpc>
@@ -18832,7 +18822,7 @@
             </a:endParaRPr>
           </a:p>
           <a:p>
-            <a:pPr marL="216000" indent="-215640">
+            <a:pPr marL="216000" indent="-215280">
               <a:lnSpc>
                 <a:spcPct val="100000"/>
               </a:lnSpc>
@@ -18930,7 +18920,7 @@
             </a:endParaRPr>
           </a:p>
           <a:p>
-            <a:pPr marL="216000" indent="-212760">
+            <a:pPr marL="216000" indent="-212400">
               <a:lnSpc>
                 <a:spcPct val="100000"/>
               </a:lnSpc>
@@ -18962,7 +18952,7 @@
             </a:endParaRPr>
           </a:p>
           <a:p>
-            <a:pPr lvl="2" marL="648000" indent="-212760">
+            <a:pPr lvl="2" marL="648000" indent="-212400">
               <a:lnSpc>
                 <a:spcPct val="100000"/>
               </a:lnSpc>
@@ -18994,7 +18984,7 @@
             </a:endParaRPr>
           </a:p>
           <a:p>
-            <a:pPr lvl="2" marL="648000" indent="-212760">
+            <a:pPr lvl="2" marL="648000" indent="-212400">
               <a:lnSpc>
                 <a:spcPct val="100000"/>
               </a:lnSpc>
@@ -19095,7 +19085,7 @@
         <p:spPr>
           <a:xfrm>
             <a:off x="365760" y="274320"/>
-            <a:ext cx="6397560" cy="451440"/>
+            <a:ext cx="6397200" cy="451080"/>
           </a:xfrm>
           <a:prstGeom prst="rect">
             <a:avLst/>
@@ -19154,7 +19144,7 @@
         <p:spPr>
           <a:xfrm>
             <a:off x="642960" y="1010520"/>
-            <a:ext cx="8134920" cy="5664240"/>
+            <a:ext cx="8134560" cy="5663880"/>
           </a:xfrm>
           <a:prstGeom prst="rect">
             <a:avLst/>
@@ -19173,7 +19163,7 @@
         <p:txBody>
           <a:bodyPr lIns="90000" rIns="90000" tIns="45000" bIns="45000"/>
           <a:p>
-            <a:pPr marL="216000" indent="-212760">
+            <a:pPr marL="216000" indent="-212400">
               <a:lnSpc>
                 <a:spcPct val="100000"/>
               </a:lnSpc>
@@ -19257,7 +19247,7 @@
             </a:endParaRPr>
           </a:p>
           <a:p>
-            <a:pPr marL="216000" indent="-215640">
+            <a:pPr marL="216000" indent="-215280">
               <a:lnSpc>
                 <a:spcPct val="100000"/>
               </a:lnSpc>
@@ -19283,7 +19273,7 @@
             </a:endParaRPr>
           </a:p>
           <a:p>
-            <a:pPr marL="216000" indent="-215640">
+            <a:pPr marL="216000" indent="-215280">
               <a:lnSpc>
                 <a:spcPct val="100000"/>
               </a:lnSpc>
@@ -19309,7 +19299,7 @@
             </a:endParaRPr>
           </a:p>
           <a:p>
-            <a:pPr marL="216000" indent="-215640">
+            <a:pPr marL="216000" indent="-215280">
               <a:lnSpc>
                 <a:spcPct val="100000"/>
               </a:lnSpc>
@@ -19335,7 +19325,7 @@
             </a:endParaRPr>
           </a:p>
           <a:p>
-            <a:pPr marL="216000" indent="-215640">
+            <a:pPr marL="216000" indent="-215280">
               <a:lnSpc>
                 <a:spcPct val="100000"/>
               </a:lnSpc>
@@ -19361,7 +19351,7 @@
             </a:endParaRPr>
           </a:p>
           <a:p>
-            <a:pPr marL="216000" indent="-215640">
+            <a:pPr marL="216000" indent="-215280">
               <a:lnSpc>
                 <a:spcPct val="100000"/>
               </a:lnSpc>
@@ -19387,7 +19377,7 @@
             </a:endParaRPr>
           </a:p>
           <a:p>
-            <a:pPr marL="216000" indent="-215640">
+            <a:pPr marL="216000" indent="-215280">
               <a:lnSpc>
                 <a:spcPct val="100000"/>
               </a:lnSpc>
@@ -19413,7 +19403,7 @@
             </a:endParaRPr>
           </a:p>
           <a:p>
-            <a:pPr marL="216000" indent="-215640">
+            <a:pPr marL="216000" indent="-215280">
               <a:lnSpc>
                 <a:spcPct val="100000"/>
               </a:lnSpc>
@@ -19439,7 +19429,7 @@
             </a:endParaRPr>
           </a:p>
           <a:p>
-            <a:pPr marL="216000" indent="-215640">
+            <a:pPr marL="216000" indent="-215280">
               <a:lnSpc>
                 <a:spcPct val="100000"/>
               </a:lnSpc>
@@ -19465,7 +19455,7 @@
             </a:endParaRPr>
           </a:p>
           <a:p>
-            <a:pPr marL="216000" indent="-215640">
+            <a:pPr marL="216000" indent="-215280">
               <a:lnSpc>
                 <a:spcPct val="100000"/>
               </a:lnSpc>
@@ -19491,7 +19481,7 @@
             </a:endParaRPr>
           </a:p>
           <a:p>
-            <a:pPr marL="216000" indent="-215640">
+            <a:pPr marL="216000" indent="-215280">
               <a:lnSpc>
                 <a:spcPct val="100000"/>
               </a:lnSpc>
@@ -19517,7 +19507,7 @@
             </a:endParaRPr>
           </a:p>
           <a:p>
-            <a:pPr marL="216000" indent="-215640">
+            <a:pPr marL="216000" indent="-215280">
               <a:lnSpc>
                 <a:spcPct val="100000"/>
               </a:lnSpc>
@@ -19615,7 +19605,7 @@
             </a:endParaRPr>
           </a:p>
           <a:p>
-            <a:pPr marL="216000" indent="-212760">
+            <a:pPr marL="216000" indent="-212400">
               <a:lnSpc>
                 <a:spcPct val="100000"/>
               </a:lnSpc>
@@ -19647,7 +19637,7 @@
             </a:endParaRPr>
           </a:p>
           <a:p>
-            <a:pPr lvl="2" marL="648000" indent="-212760">
+            <a:pPr lvl="2" marL="648000" indent="-212400">
               <a:lnSpc>
                 <a:spcPct val="100000"/>
               </a:lnSpc>
@@ -19679,7 +19669,7 @@
             </a:endParaRPr>
           </a:p>
           <a:p>
-            <a:pPr lvl="2" marL="648000" indent="-212760">
+            <a:pPr lvl="2" marL="648000" indent="-212400">
               <a:lnSpc>
                 <a:spcPct val="100000"/>
               </a:lnSpc>
@@ -19780,7 +19770,7 @@
         <p:spPr>
           <a:xfrm>
             <a:off x="365760" y="274320"/>
-            <a:ext cx="6397560" cy="451440"/>
+            <a:ext cx="6397200" cy="451080"/>
           </a:xfrm>
           <a:prstGeom prst="rect">
             <a:avLst/>
@@ -19829,7 +19819,7 @@
         <p:spPr>
           <a:xfrm>
             <a:off x="457200" y="1005840"/>
-            <a:ext cx="8134920" cy="5664240"/>
+            <a:ext cx="8134560" cy="5663880"/>
           </a:xfrm>
           <a:prstGeom prst="rect">
             <a:avLst/>
@@ -19848,7 +19838,7 @@
         <p:txBody>
           <a:bodyPr lIns="90000" rIns="90000" tIns="45000" bIns="45000"/>
           <a:p>
-            <a:pPr marL="216000" indent="-212760">
+            <a:pPr marL="216000" indent="-212400">
               <a:lnSpc>
                 <a:spcPct val="100000"/>
               </a:lnSpc>
@@ -19880,7 +19870,7 @@
             </a:endParaRPr>
           </a:p>
           <a:p>
-            <a:pPr marL="216000" indent="-212760">
+            <a:pPr marL="216000" indent="-212400">
               <a:lnSpc>
                 <a:spcPct val="100000"/>
               </a:lnSpc>
@@ -19912,7 +19902,7 @@
             </a:endParaRPr>
           </a:p>
           <a:p>
-            <a:pPr marL="216000" indent="-212760">
+            <a:pPr marL="216000" indent="-212400">
               <a:lnSpc>
                 <a:spcPct val="100000"/>
               </a:lnSpc>
@@ -19944,7 +19934,7 @@
             </a:endParaRPr>
           </a:p>
           <a:p>
-            <a:pPr marL="216000" indent="-212760">
+            <a:pPr marL="216000" indent="-212400">
               <a:lnSpc>
                 <a:spcPct val="100000"/>
               </a:lnSpc>
@@ -19976,7 +19966,7 @@
             </a:endParaRPr>
           </a:p>
           <a:p>
-            <a:pPr marL="216000" indent="-212760">
+            <a:pPr marL="216000" indent="-212400">
               <a:lnSpc>
                 <a:spcPct val="100000"/>
               </a:lnSpc>
@@ -20024,7 +20014,7 @@
             </a:endParaRPr>
           </a:p>
           <a:p>
-            <a:pPr marL="216000" indent="-212760">
+            <a:pPr marL="216000" indent="-212400">
               <a:lnSpc>
                 <a:spcPct val="100000"/>
               </a:lnSpc>
@@ -20129,7 +20119,7 @@
         <p:spPr>
           <a:xfrm>
             <a:off x="1720800" y="1877760"/>
-            <a:ext cx="7422840" cy="1688040"/>
+            <a:ext cx="7422480" cy="1687680"/>
           </a:xfrm>
           <a:prstGeom prst="rect">
             <a:avLst/>
@@ -20148,7 +20138,7 @@
         <p:spPr>
           <a:xfrm>
             <a:off x="365760" y="274320"/>
-            <a:ext cx="8317800" cy="815760"/>
+            <a:ext cx="8317440" cy="815400"/>
           </a:xfrm>
           <a:prstGeom prst="rect">
             <a:avLst/>
@@ -20197,7 +20187,7 @@
         <p:spPr>
           <a:xfrm>
             <a:off x="457200" y="1005840"/>
-            <a:ext cx="8134920" cy="3644280"/>
+            <a:ext cx="8134560" cy="3643920"/>
           </a:xfrm>
           <a:prstGeom prst="rect">
             <a:avLst/>
@@ -20216,7 +20206,7 @@
         <p:txBody>
           <a:bodyPr lIns="90000" rIns="90000" tIns="45000" bIns="45000"/>
           <a:p>
-            <a:pPr marL="216000" indent="-212760">
+            <a:pPr marL="216000" indent="-212400">
               <a:lnSpc>
                 <a:spcPct val="100000"/>
               </a:lnSpc>
@@ -20248,7 +20238,7 @@
             </a:endParaRPr>
           </a:p>
           <a:p>
-            <a:pPr marL="216000" indent="-212760">
+            <a:pPr marL="216000" indent="-212400">
               <a:lnSpc>
                 <a:spcPct val="100000"/>
               </a:lnSpc>
@@ -20280,7 +20270,7 @@
             </a:endParaRPr>
           </a:p>
           <a:p>
-            <a:pPr marL="216000" indent="-212760">
+            <a:pPr marL="216000" indent="-212400">
               <a:lnSpc>
                 <a:spcPct val="100000"/>
               </a:lnSpc>
@@ -20432,7 +20422,7 @@
             </a:endParaRPr>
           </a:p>
           <a:p>
-            <a:pPr marL="216000" indent="-212760">
+            <a:pPr marL="216000" indent="-212400">
               <a:lnSpc>
                 <a:spcPct val="100000"/>
               </a:lnSpc>
@@ -20532,7 +20522,7 @@
             </a:endParaRPr>
           </a:p>
           <a:p>
-            <a:pPr marL="216000" indent="-212760">
+            <a:pPr marL="216000" indent="-212400">
               <a:lnSpc>
                 <a:spcPct val="100000"/>
               </a:lnSpc>
@@ -20675,7 +20665,7 @@
         <p:spPr>
           <a:xfrm>
             <a:off x="365760" y="274320"/>
-            <a:ext cx="6397560" cy="451440"/>
+            <a:ext cx="6397200" cy="451080"/>
           </a:xfrm>
           <a:prstGeom prst="rect">
             <a:avLst/>
@@ -20724,7 +20714,7 @@
         <p:spPr>
           <a:xfrm>
             <a:off x="457200" y="1005840"/>
-            <a:ext cx="8134920" cy="4486680"/>
+            <a:ext cx="8134560" cy="4486320"/>
           </a:xfrm>
           <a:prstGeom prst="rect">
             <a:avLst/>
@@ -20743,7 +20733,7 @@
         <p:txBody>
           <a:bodyPr lIns="90000" rIns="90000" tIns="45000" bIns="45000"/>
           <a:p>
-            <a:pPr marL="216000" indent="-212760">
+            <a:pPr marL="216000" indent="-212400">
               <a:lnSpc>
                 <a:spcPct val="100000"/>
               </a:lnSpc>
@@ -20775,7 +20765,7 @@
             </a:endParaRPr>
           </a:p>
           <a:p>
-            <a:pPr lvl="2" marL="648000" indent="-212760">
+            <a:pPr lvl="2" marL="648000" indent="-212400">
               <a:lnSpc>
                 <a:spcPct val="100000"/>
               </a:lnSpc>
@@ -20807,7 +20797,7 @@
             </a:endParaRPr>
           </a:p>
           <a:p>
-            <a:pPr lvl="2" marL="648000" indent="-212760">
+            <a:pPr lvl="2" marL="648000" indent="-212400">
               <a:lnSpc>
                 <a:spcPct val="100000"/>
               </a:lnSpc>
@@ -20865,7 +20855,7 @@
             </a:endParaRPr>
           </a:p>
           <a:p>
-            <a:pPr marL="216000" indent="-212760">
+            <a:pPr marL="216000" indent="-212400">
               <a:lnSpc>
                 <a:spcPct val="100000"/>
               </a:lnSpc>
@@ -20897,7 +20887,7 @@
             </a:endParaRPr>
           </a:p>
           <a:p>
-            <a:pPr lvl="2" marL="648000" indent="-212760">
+            <a:pPr lvl="2" marL="648000" indent="-212400">
               <a:lnSpc>
                 <a:spcPct val="100000"/>
               </a:lnSpc>
@@ -20929,7 +20919,7 @@
             </a:endParaRPr>
           </a:p>
           <a:p>
-            <a:pPr lvl="2" marL="648000" indent="-212760">
+            <a:pPr lvl="2" marL="648000" indent="-212400">
               <a:lnSpc>
                 <a:spcPct val="100000"/>
               </a:lnSpc>
@@ -20977,7 +20967,7 @@
             </a:endParaRPr>
           </a:p>
           <a:p>
-            <a:pPr marL="216000" indent="-212760">
+            <a:pPr marL="216000" indent="-212400">
               <a:lnSpc>
                 <a:spcPct val="100000"/>
               </a:lnSpc>
@@ -21092,7 +21082,7 @@
         <p:spPr>
           <a:xfrm>
             <a:off x="1188720" y="1139400"/>
-            <a:ext cx="7411320" cy="5033520"/>
+            <a:ext cx="7410960" cy="5033160"/>
           </a:xfrm>
           <a:prstGeom prst="rect">
             <a:avLst/>
@@ -21111,7 +21101,7 @@
         <p:spPr>
           <a:xfrm>
             <a:off x="457200" y="457200"/>
-            <a:ext cx="6398280" cy="302760"/>
+            <a:ext cx="6397920" cy="302400"/>
           </a:xfrm>
           <a:prstGeom prst="rect">
             <a:avLst/>
@@ -21209,7 +21199,7 @@
         <p:spPr>
           <a:xfrm>
             <a:off x="457200" y="457200"/>
-            <a:ext cx="6398280" cy="302760"/>
+            <a:ext cx="6397920" cy="302400"/>
           </a:xfrm>
           <a:prstGeom prst="rect">
             <a:avLst/>
@@ -21262,7 +21252,7 @@
         <p:spPr>
           <a:xfrm>
             <a:off x="333000" y="901800"/>
-            <a:ext cx="7802640" cy="5862240"/>
+            <a:ext cx="7802280" cy="5861880"/>
           </a:xfrm>
           <a:prstGeom prst="rect">
             <a:avLst/>
@@ -21334,7 +21324,7 @@
         <p:spPr>
           <a:xfrm>
             <a:off x="640080" y="1188720"/>
-            <a:ext cx="4626360" cy="2254680"/>
+            <a:ext cx="4626000" cy="2254320"/>
           </a:xfrm>
           <a:prstGeom prst="rect">
             <a:avLst/>
@@ -21402,7 +21392,7 @@
         <p:spPr>
           <a:xfrm>
             <a:off x="365760" y="274320"/>
-            <a:ext cx="6397560" cy="451440"/>
+            <a:ext cx="6397200" cy="451080"/>
           </a:xfrm>
           <a:prstGeom prst="rect">
             <a:avLst/>
@@ -21451,7 +21441,7 @@
         <p:spPr>
           <a:xfrm>
             <a:off x="182880" y="1005840"/>
-            <a:ext cx="8134920" cy="3213360"/>
+            <a:ext cx="8134560" cy="3213000"/>
           </a:xfrm>
           <a:prstGeom prst="rect">
             <a:avLst/>
@@ -21470,7 +21460,7 @@
         <p:txBody>
           <a:bodyPr lIns="90000" rIns="90000" tIns="45000" bIns="45000" anchor="ctr"/>
           <a:p>
-            <a:pPr marL="216000" indent="-212760">
+            <a:pPr marL="216000" indent="-212400">
               <a:lnSpc>
                 <a:spcPct val="100000"/>
               </a:lnSpc>
@@ -21502,7 +21492,7 @@
             </a:endParaRPr>
           </a:p>
           <a:p>
-            <a:pPr lvl="2" marL="648000" indent="-212760">
+            <a:pPr lvl="2" marL="648000" indent="-212400">
               <a:lnSpc>
                 <a:spcPct val="100000"/>
               </a:lnSpc>
@@ -21534,7 +21524,7 @@
             </a:endParaRPr>
           </a:p>
           <a:p>
-            <a:pPr lvl="2" marL="648000" indent="-212760">
+            <a:pPr lvl="2" marL="648000" indent="-212400">
               <a:lnSpc>
                 <a:spcPct val="100000"/>
               </a:lnSpc>
@@ -21566,7 +21556,7 @@
             </a:endParaRPr>
           </a:p>
           <a:p>
-            <a:pPr marL="216000" indent="-212760">
+            <a:pPr marL="216000" indent="-212400">
               <a:lnSpc>
                 <a:spcPct val="100000"/>
               </a:lnSpc>
@@ -21598,7 +21588,7 @@
             </a:endParaRPr>
           </a:p>
           <a:p>
-            <a:pPr lvl="2" marL="648000" indent="-212760">
+            <a:pPr lvl="2" marL="648000" indent="-212400">
               <a:lnSpc>
                 <a:spcPct val="100000"/>
               </a:lnSpc>
@@ -21664,7 +21654,7 @@
         <p:spPr>
           <a:xfrm>
             <a:off x="4114800" y="2926080"/>
-            <a:ext cx="4660200" cy="2738160"/>
+            <a:ext cx="4659840" cy="2737800"/>
           </a:xfrm>
           <a:prstGeom prst="rect">
             <a:avLst/>
@@ -21732,7 +21722,7 @@
         <p:spPr>
           <a:xfrm>
             <a:off x="365760" y="1544760"/>
-            <a:ext cx="8562960" cy="280800"/>
+            <a:ext cx="8562600" cy="280440"/>
           </a:xfrm>
           <a:prstGeom prst="rect">
             <a:avLst/>
@@ -21850,7 +21840,7 @@
         <p:spPr>
           <a:xfrm>
             <a:off x="365760" y="274320"/>
-            <a:ext cx="6397560" cy="451440"/>
+            <a:ext cx="6397200" cy="451080"/>
           </a:xfrm>
           <a:prstGeom prst="rect">
             <a:avLst/>
@@ -21899,7 +21889,7 @@
         <p:spPr>
           <a:xfrm>
             <a:off x="457200" y="1005840"/>
-            <a:ext cx="8134920" cy="5664240"/>
+            <a:ext cx="8134560" cy="5663880"/>
           </a:xfrm>
           <a:prstGeom prst="rect">
             <a:avLst/>
@@ -21918,7 +21908,7 @@
         <p:txBody>
           <a:bodyPr lIns="90000" rIns="90000" tIns="45000" bIns="45000"/>
           <a:p>
-            <a:pPr marL="216000" indent="-212760">
+            <a:pPr marL="216000" indent="-212400">
               <a:lnSpc>
                 <a:spcPct val="100000"/>
               </a:lnSpc>
@@ -21950,7 +21940,7 @@
             </a:endParaRPr>
           </a:p>
           <a:p>
-            <a:pPr lvl="2" marL="648000" indent="-212760">
+            <a:pPr lvl="2" marL="648000" indent="-212400">
               <a:lnSpc>
                 <a:spcPct val="100000"/>
               </a:lnSpc>
@@ -21992,7 +21982,7 @@
             </a:endParaRPr>
           </a:p>
           <a:p>
-            <a:pPr lvl="2" marL="648000" indent="-212760">
+            <a:pPr lvl="2" marL="648000" indent="-212400">
               <a:lnSpc>
                 <a:spcPct val="100000"/>
               </a:lnSpc>
@@ -22034,7 +22024,7 @@
             </a:endParaRPr>
           </a:p>
           <a:p>
-            <a:pPr marL="216000" indent="-212760">
+            <a:pPr marL="216000" indent="-212400">
               <a:lnSpc>
                 <a:spcPct val="100000"/>
               </a:lnSpc>
@@ -22066,7 +22056,7 @@
             </a:endParaRPr>
           </a:p>
           <a:p>
-            <a:pPr lvl="2" marL="648000" indent="-212760">
+            <a:pPr lvl="2" marL="648000" indent="-212400">
               <a:lnSpc>
                 <a:spcPct val="100000"/>
               </a:lnSpc>
@@ -22098,7 +22088,7 @@
             </a:endParaRPr>
           </a:p>
           <a:p>
-            <a:pPr lvl="2" marL="648000" indent="-212760">
+            <a:pPr lvl="2" marL="648000" indent="-212400">
               <a:lnSpc>
                 <a:spcPct val="100000"/>
               </a:lnSpc>
@@ -22130,7 +22120,7 @@
             </a:endParaRPr>
           </a:p>
           <a:p>
-            <a:pPr lvl="2" marL="648000" indent="-212760">
+            <a:pPr lvl="2" marL="648000" indent="-212400">
               <a:lnSpc>
                 <a:spcPct val="100000"/>
               </a:lnSpc>
@@ -22162,7 +22152,7 @@
             </a:endParaRPr>
           </a:p>
           <a:p>
-            <a:pPr marL="216000" indent="-212760">
+            <a:pPr marL="216000" indent="-212400">
               <a:lnSpc>
                 <a:spcPct val="100000"/>
               </a:lnSpc>
@@ -22194,7 +22184,7 @@
             </a:endParaRPr>
           </a:p>
           <a:p>
-            <a:pPr lvl="2" marL="648000" indent="-212760">
+            <a:pPr lvl="2" marL="648000" indent="-212400">
               <a:lnSpc>
                 <a:spcPct val="100000"/>
               </a:lnSpc>
@@ -22226,7 +22216,7 @@
             </a:endParaRPr>
           </a:p>
           <a:p>
-            <a:pPr lvl="2" marL="648000" indent="-212760">
+            <a:pPr lvl="2" marL="648000" indent="-212400">
               <a:lnSpc>
                 <a:spcPct val="100000"/>
               </a:lnSpc>
@@ -22258,7 +22248,7 @@
             </a:endParaRPr>
           </a:p>
           <a:p>
-            <a:pPr lvl="2" marL="648000" indent="-212760">
+            <a:pPr lvl="2" marL="648000" indent="-212400">
               <a:lnSpc>
                 <a:spcPct val="100000"/>
               </a:lnSpc>
@@ -22373,7 +22363,7 @@
         <p:spPr>
           <a:xfrm>
             <a:off x="4207680" y="5303520"/>
-            <a:ext cx="2741400" cy="1464480"/>
+            <a:ext cx="2741040" cy="1464120"/>
           </a:xfrm>
           <a:prstGeom prst="rect">
             <a:avLst/>
@@ -22392,7 +22382,7 @@
         <p:spPr>
           <a:xfrm>
             <a:off x="365760" y="274320"/>
-            <a:ext cx="8317800" cy="815760"/>
+            <a:ext cx="8317440" cy="815400"/>
           </a:xfrm>
           <a:prstGeom prst="rect">
             <a:avLst/>
@@ -22445,7 +22435,7 @@
         <p:spPr>
           <a:xfrm>
             <a:off x="4206240" y="3088440"/>
-            <a:ext cx="4936680" cy="933840"/>
+            <a:ext cx="4936320" cy="933480"/>
           </a:xfrm>
           <a:prstGeom prst="rect">
             <a:avLst/>
@@ -22464,7 +22454,7 @@
         <p:spPr>
           <a:xfrm>
             <a:off x="457200" y="1005840"/>
-            <a:ext cx="8134920" cy="4405680"/>
+            <a:ext cx="8134560" cy="4405320"/>
           </a:xfrm>
           <a:prstGeom prst="rect">
             <a:avLst/>
@@ -22483,7 +22473,7 @@
         <p:txBody>
           <a:bodyPr lIns="90000" rIns="90000" tIns="45000" bIns="45000"/>
           <a:p>
-            <a:pPr marL="216000" indent="-212760">
+            <a:pPr marL="216000" indent="-212400">
               <a:lnSpc>
                 <a:spcPct val="100000"/>
               </a:lnSpc>
@@ -22555,7 +22545,7 @@
             </a:endParaRPr>
           </a:p>
           <a:p>
-            <a:pPr marL="216000" indent="-212760">
+            <a:pPr marL="216000" indent="-212400">
               <a:lnSpc>
                 <a:spcPct val="100000"/>
               </a:lnSpc>
@@ -22587,7 +22577,7 @@
             </a:endParaRPr>
           </a:p>
           <a:p>
-            <a:pPr marL="216000" indent="-212760">
+            <a:pPr marL="216000" indent="-212400">
               <a:lnSpc>
                 <a:spcPct val="100000"/>
               </a:lnSpc>
@@ -22619,7 +22609,7 @@
             </a:endParaRPr>
           </a:p>
           <a:p>
-            <a:pPr marL="216000" indent="-212760">
+            <a:pPr marL="216000" indent="-212400">
               <a:lnSpc>
                 <a:spcPct val="100000"/>
               </a:lnSpc>
@@ -22803,7 +22793,7 @@
             </a:endParaRPr>
           </a:p>
           <a:p>
-            <a:pPr marL="216000" indent="-212760">
+            <a:pPr marL="216000" indent="-212400">
               <a:lnSpc>
                 <a:spcPct val="100000"/>
               </a:lnSpc>
@@ -22835,7 +22825,7 @@
             </a:endParaRPr>
           </a:p>
           <a:p>
-            <a:pPr marL="216000" indent="-212760">
+            <a:pPr marL="216000" indent="-212400">
               <a:lnSpc>
                 <a:spcPct val="100000"/>
               </a:lnSpc>
@@ -22897,7 +22887,7 @@
             </a:endParaRPr>
           </a:p>
           <a:p>
-            <a:pPr marL="216000" indent="-212760">
+            <a:pPr marL="216000" indent="-212400">
               <a:lnSpc>
                 <a:spcPct val="100000"/>
               </a:lnSpc>
@@ -22929,7 +22919,7 @@
             </a:endParaRPr>
           </a:p>
           <a:p>
-            <a:pPr marL="216000" indent="-212760">
+            <a:pPr marL="216000" indent="-212400">
               <a:lnSpc>
                 <a:spcPct val="100000"/>
               </a:lnSpc>
@@ -22997,7 +22987,7 @@
             </a:endParaRPr>
           </a:p>
           <a:p>
-            <a:pPr marL="216000" indent="-212760">
+            <a:pPr marL="216000" indent="-212400">
               <a:lnSpc>
                 <a:spcPct val="100000"/>
               </a:lnSpc>
@@ -23115,7 +23105,7 @@
         <p:spPr>
           <a:xfrm>
             <a:off x="5670360" y="1005840"/>
-            <a:ext cx="3197160" cy="864360"/>
+            <a:ext cx="3196800" cy="864000"/>
           </a:xfrm>
           <a:prstGeom prst="rect">
             <a:avLst/>
@@ -23138,7 +23128,7 @@
         <p:spPr>
           <a:xfrm>
             <a:off x="5852160" y="1872360"/>
-            <a:ext cx="2832480" cy="412560"/>
+            <a:ext cx="2832120" cy="412200"/>
           </a:xfrm>
           <a:prstGeom prst="rect">
             <a:avLst/>
@@ -23161,7 +23151,7 @@
         <p:spPr>
           <a:xfrm>
             <a:off x="5943600" y="2468880"/>
-            <a:ext cx="3198240" cy="456120"/>
+            <a:ext cx="3197880" cy="455760"/>
           </a:xfrm>
           <a:prstGeom prst="rect">
             <a:avLst/>
@@ -23180,7 +23170,7 @@
         <p:spPr>
           <a:xfrm>
             <a:off x="5029200" y="2560320"/>
-            <a:ext cx="1369440" cy="518040"/>
+            <a:ext cx="1369080" cy="517680"/>
           </a:xfrm>
           <a:prstGeom prst="rect">
             <a:avLst/>
@@ -23229,7 +23219,7 @@
         <p:spPr>
           <a:xfrm>
             <a:off x="4938840" y="1920240"/>
-            <a:ext cx="1095120" cy="518040"/>
+            <a:ext cx="1094760" cy="517680"/>
           </a:xfrm>
           <a:prstGeom prst="rect">
             <a:avLst/>
@@ -23278,7 +23268,7 @@
         <p:spPr>
           <a:xfrm>
             <a:off x="4846320" y="1249200"/>
-            <a:ext cx="912240" cy="255960"/>
+            <a:ext cx="911880" cy="255600"/>
           </a:xfrm>
           <a:prstGeom prst="rect">
             <a:avLst/>
@@ -23327,7 +23317,7 @@
         <p:spPr>
           <a:xfrm>
             <a:off x="6492240" y="3870000"/>
-            <a:ext cx="1369440" cy="335160"/>
+            <a:ext cx="1369080" cy="334800"/>
           </a:xfrm>
           <a:prstGeom prst="rect">
             <a:avLst/>
@@ -23376,7 +23366,7 @@
         <p:spPr>
           <a:xfrm>
             <a:off x="3200400" y="5973120"/>
-            <a:ext cx="1369440" cy="335160"/>
+            <a:ext cx="1369080" cy="334800"/>
           </a:xfrm>
           <a:prstGeom prst="rect">
             <a:avLst/>
@@ -23429,7 +23419,7 @@
         <p:spPr>
           <a:xfrm>
             <a:off x="5669280" y="4206240"/>
-            <a:ext cx="3366720" cy="1096200"/>
+            <a:ext cx="3366360" cy="1095840"/>
           </a:xfrm>
           <a:prstGeom prst="rect">
             <a:avLst/>
@@ -23448,7 +23438,7 @@
         <p:spPr>
           <a:xfrm>
             <a:off x="6949440" y="5303520"/>
-            <a:ext cx="1369440" cy="335160"/>
+            <a:ext cx="1369080" cy="334800"/>
           </a:xfrm>
           <a:prstGeom prst="rect">
             <a:avLst/>
@@ -23546,7 +23536,7 @@
         <p:spPr>
           <a:xfrm>
             <a:off x="365760" y="274320"/>
-            <a:ext cx="8317800" cy="815760"/>
+            <a:ext cx="8317440" cy="815400"/>
           </a:xfrm>
           <a:prstGeom prst="rect">
             <a:avLst/>
@@ -23595,7 +23585,7 @@
         <p:spPr>
           <a:xfrm>
             <a:off x="457200" y="1005840"/>
-            <a:ext cx="8134920" cy="4405680"/>
+            <a:ext cx="8134560" cy="4405320"/>
           </a:xfrm>
           <a:prstGeom prst="rect">
             <a:avLst/>
@@ -23614,7 +23604,7 @@
         <p:txBody>
           <a:bodyPr lIns="90000" rIns="90000" tIns="45000" bIns="45000"/>
           <a:p>
-            <a:pPr marL="216000" indent="-212760">
+            <a:pPr marL="216000" indent="-212400">
               <a:lnSpc>
                 <a:spcPct val="100000"/>
               </a:lnSpc>
@@ -23682,7 +23672,7 @@
             </a:endParaRPr>
           </a:p>
           <a:p>
-            <a:pPr marL="216000" indent="-212760">
+            <a:pPr marL="216000" indent="-212400">
               <a:lnSpc>
                 <a:spcPct val="100000"/>
               </a:lnSpc>
@@ -23714,7 +23704,7 @@
             </a:endParaRPr>
           </a:p>
           <a:p>
-            <a:pPr marL="216000" indent="-212760">
+            <a:pPr marL="216000" indent="-212400">
               <a:lnSpc>
                 <a:spcPct val="100000"/>
               </a:lnSpc>
@@ -23958,7 +23948,7 @@
         <p:spPr>
           <a:xfrm>
             <a:off x="5670360" y="1005840"/>
-            <a:ext cx="3197160" cy="864360"/>
+            <a:ext cx="3196800" cy="864000"/>
           </a:xfrm>
           <a:prstGeom prst="rect">
             <a:avLst/>
@@ -23977,7 +23967,7 @@
         <p:spPr>
           <a:xfrm>
             <a:off x="6217920" y="2560320"/>
-            <a:ext cx="1004400" cy="272880"/>
+            <a:ext cx="1004040" cy="272520"/>
           </a:xfrm>
           <a:prstGeom prst="rect">
             <a:avLst/>
@@ -24026,7 +24016,7 @@
         <p:spPr>
           <a:xfrm>
             <a:off x="4846320" y="1249200"/>
-            <a:ext cx="912240" cy="255960"/>
+            <a:ext cx="911880" cy="255600"/>
           </a:xfrm>
           <a:prstGeom prst="rect">
             <a:avLst/>
@@ -24079,7 +24069,7 @@
         <p:spPr>
           <a:xfrm>
             <a:off x="4566240" y="2061000"/>
-            <a:ext cx="4210560" cy="497880"/>
+            <a:ext cx="4210200" cy="497520"/>
           </a:xfrm>
           <a:prstGeom prst="rect">
             <a:avLst/>
@@ -24102,7 +24092,7 @@
         <p:spPr>
           <a:xfrm>
             <a:off x="5572080" y="3566160"/>
-            <a:ext cx="3478680" cy="987480"/>
+            <a:ext cx="3478320" cy="987120"/>
           </a:xfrm>
           <a:prstGeom prst="rect">
             <a:avLst/>
@@ -24121,7 +24111,7 @@
         <p:spPr>
           <a:xfrm>
             <a:off x="6583680" y="4663440"/>
-            <a:ext cx="1004400" cy="272880"/>
+            <a:ext cx="1004040" cy="272520"/>
           </a:xfrm>
           <a:prstGeom prst="rect">
             <a:avLst/>
@@ -24219,7 +24209,7 @@
         <p:spPr>
           <a:xfrm>
             <a:off x="365760" y="274320"/>
-            <a:ext cx="8317800" cy="815760"/>
+            <a:ext cx="8317440" cy="815400"/>
           </a:xfrm>
           <a:prstGeom prst="rect">
             <a:avLst/>
@@ -24268,7 +24258,7 @@
         <p:spPr>
           <a:xfrm>
             <a:off x="457200" y="1005840"/>
-            <a:ext cx="8134920" cy="4405680"/>
+            <a:ext cx="8134560" cy="4405320"/>
           </a:xfrm>
           <a:prstGeom prst="rect">
             <a:avLst/>
@@ -24287,7 +24277,7 @@
         <p:txBody>
           <a:bodyPr lIns="90000" rIns="90000" tIns="45000" bIns="45000"/>
           <a:p>
-            <a:pPr marL="216000" indent="-212760">
+            <a:pPr marL="216000" indent="-212400">
               <a:lnSpc>
                 <a:spcPct val="100000"/>
               </a:lnSpc>
@@ -24339,7 +24329,7 @@
             </a:endParaRPr>
           </a:p>
           <a:p>
-            <a:pPr marL="216000" indent="-212760">
+            <a:pPr marL="216000" indent="-212400">
               <a:lnSpc>
                 <a:spcPct val="100000"/>
               </a:lnSpc>
@@ -24371,7 +24361,7 @@
             </a:endParaRPr>
           </a:p>
           <a:p>
-            <a:pPr marL="216000" indent="-212760">
+            <a:pPr marL="216000" indent="-212400">
               <a:lnSpc>
                 <a:spcPct val="100000"/>
               </a:lnSpc>
@@ -24403,7 +24393,7 @@
             </a:endParaRPr>
           </a:p>
           <a:p>
-            <a:pPr marL="216000" indent="-212760">
+            <a:pPr marL="216000" indent="-212400">
               <a:lnSpc>
                 <a:spcPct val="100000"/>
               </a:lnSpc>
@@ -24483,7 +24473,7 @@
             </a:endParaRPr>
           </a:p>
           <a:p>
-            <a:pPr marL="216000" indent="-212760">
+            <a:pPr marL="216000" indent="-212400">
               <a:lnSpc>
                 <a:spcPct val="100000"/>
               </a:lnSpc>
@@ -24525,7 +24515,7 @@
             </a:endParaRPr>
           </a:p>
           <a:p>
-            <a:pPr marL="216000" indent="-212760">
+            <a:pPr marL="216000" indent="-212400">
               <a:lnSpc>
                 <a:spcPct val="100000"/>
               </a:lnSpc>
@@ -24557,7 +24547,7 @@
             </a:endParaRPr>
           </a:p>
           <a:p>
-            <a:pPr marL="216000" indent="-212760">
+            <a:pPr marL="216000" indent="-212400">
               <a:lnSpc>
                 <a:spcPct val="100000"/>
               </a:lnSpc>
@@ -24589,7 +24579,7 @@
             </a:endParaRPr>
           </a:p>
           <a:p>
-            <a:pPr marL="216000" indent="-212760">
+            <a:pPr marL="216000" indent="-212400">
               <a:lnSpc>
                 <a:spcPct val="100000"/>
               </a:lnSpc>
@@ -24697,7 +24687,7 @@
         <p:spPr>
           <a:xfrm>
             <a:off x="5670360" y="1005840"/>
-            <a:ext cx="3197160" cy="864360"/>
+            <a:ext cx="3196800" cy="864000"/>
           </a:xfrm>
           <a:prstGeom prst="rect">
             <a:avLst/>
@@ -24716,7 +24706,7 @@
         <p:spPr>
           <a:xfrm>
             <a:off x="6309360" y="3320280"/>
-            <a:ext cx="1369440" cy="518040"/>
+            <a:ext cx="1369080" cy="517680"/>
           </a:xfrm>
           <a:prstGeom prst="rect">
             <a:avLst/>
@@ -24765,7 +24755,7 @@
         <p:spPr>
           <a:xfrm>
             <a:off x="4937760" y="1948680"/>
-            <a:ext cx="1095120" cy="518040"/>
+            <a:ext cx="1094760" cy="517680"/>
           </a:xfrm>
           <a:prstGeom prst="rect">
             <a:avLst/>
@@ -24814,7 +24804,7 @@
         <p:spPr>
           <a:xfrm>
             <a:off x="4846320" y="1249200"/>
-            <a:ext cx="912240" cy="255960"/>
+            <a:ext cx="911880" cy="255600"/>
           </a:xfrm>
           <a:prstGeom prst="rect">
             <a:avLst/>
@@ -24863,7 +24853,7 @@
         <p:spPr>
           <a:xfrm>
             <a:off x="6675120" y="5606280"/>
-            <a:ext cx="1369440" cy="335160"/>
+            <a:ext cx="1369080" cy="334800"/>
           </a:xfrm>
           <a:prstGeom prst="rect">
             <a:avLst/>
@@ -24916,7 +24906,7 @@
         <p:spPr>
           <a:xfrm>
             <a:off x="5852160" y="1872360"/>
-            <a:ext cx="3472560" cy="456840"/>
+            <a:ext cx="3472200" cy="456480"/>
           </a:xfrm>
           <a:prstGeom prst="rect">
             <a:avLst/>
@@ -24939,7 +24929,7 @@
         <p:spPr>
           <a:xfrm>
             <a:off x="4748760" y="2740680"/>
-            <a:ext cx="4393080" cy="457560"/>
+            <a:ext cx="4392720" cy="457200"/>
           </a:xfrm>
           <a:prstGeom prst="rect">
             <a:avLst/>
@@ -24962,7 +24952,7 @@
         <p:spPr>
           <a:xfrm>
             <a:off x="5394960" y="3781440"/>
-            <a:ext cx="3589200" cy="788400"/>
+            <a:ext cx="3588840" cy="788040"/>
           </a:xfrm>
           <a:prstGeom prst="rect">
             <a:avLst/>
@@ -24985,7 +24975,7 @@
         <p:spPr>
           <a:xfrm>
             <a:off x="5388840" y="4846320"/>
-            <a:ext cx="4118760" cy="776520"/>
+            <a:ext cx="4118400" cy="776160"/>
           </a:xfrm>
           <a:prstGeom prst="rect">
             <a:avLst/>
@@ -25004,7 +24994,7 @@
         <p:spPr>
           <a:xfrm>
             <a:off x="6492240" y="4600440"/>
-            <a:ext cx="1369440" cy="335160"/>
+            <a:ext cx="1369080" cy="334800"/>
           </a:xfrm>
           <a:prstGeom prst="rect">
             <a:avLst/>
@@ -25102,7 +25092,7 @@
         <p:spPr>
           <a:xfrm>
             <a:off x="365760" y="274320"/>
-            <a:ext cx="8317800" cy="815760"/>
+            <a:ext cx="8317440" cy="815400"/>
           </a:xfrm>
           <a:prstGeom prst="rect">
             <a:avLst/>
@@ -25155,7 +25145,7 @@
         <p:spPr>
           <a:xfrm>
             <a:off x="735480" y="4846320"/>
-            <a:ext cx="5663880" cy="1095840"/>
+            <a:ext cx="5663520" cy="1095480"/>
           </a:xfrm>
           <a:prstGeom prst="rect">
             <a:avLst/>
@@ -25174,7 +25164,7 @@
         <p:spPr>
           <a:xfrm>
             <a:off x="457200" y="1005840"/>
-            <a:ext cx="8134920" cy="4405680"/>
+            <a:ext cx="8134560" cy="4405320"/>
           </a:xfrm>
           <a:prstGeom prst="rect">
             <a:avLst/>
@@ -25259,7 +25249,7 @@
             </a:endParaRPr>
           </a:p>
           <a:p>
-            <a:pPr marL="216000" indent="-212760">
+            <a:pPr marL="216000" indent="-212400">
               <a:lnSpc>
                 <a:spcPct val="100000"/>
               </a:lnSpc>
@@ -25291,7 +25281,7 @@
             </a:endParaRPr>
           </a:p>
           <a:p>
-            <a:pPr marL="216000" indent="-212760">
+            <a:pPr marL="216000" indent="-212400">
               <a:lnSpc>
                 <a:spcPct val="100000"/>
               </a:lnSpc>
@@ -25575,7 +25565,7 @@
         <p:spPr>
           <a:xfrm>
             <a:off x="5852160" y="1872360"/>
-            <a:ext cx="2832480" cy="659880"/>
+            <a:ext cx="2832120" cy="659520"/>
           </a:xfrm>
           <a:prstGeom prst="rect">
             <a:avLst/>
@@ -25594,7 +25584,7 @@
         <p:spPr>
           <a:xfrm>
             <a:off x="6309360" y="3474720"/>
-            <a:ext cx="1369440" cy="272880"/>
+            <a:ext cx="1369080" cy="272520"/>
           </a:xfrm>
           <a:prstGeom prst="rect">
             <a:avLst/>
@@ -25643,7 +25633,7 @@
         <p:spPr>
           <a:xfrm>
             <a:off x="4937760" y="2103120"/>
-            <a:ext cx="1095120" cy="518040"/>
+            <a:ext cx="1094760" cy="517680"/>
           </a:xfrm>
           <a:prstGeom prst="rect">
             <a:avLst/>
@@ -25692,7 +25682,7 @@
         <p:spPr>
           <a:xfrm>
             <a:off x="4846320" y="1249200"/>
-            <a:ext cx="912240" cy="255960"/>
+            <a:ext cx="911880" cy="255600"/>
           </a:xfrm>
           <a:prstGeom prst="rect">
             <a:avLst/>
@@ -25745,7 +25735,7 @@
         <p:spPr>
           <a:xfrm>
             <a:off x="4840920" y="2560320"/>
-            <a:ext cx="3844440" cy="859680"/>
+            <a:ext cx="3844080" cy="859320"/>
           </a:xfrm>
           <a:prstGeom prst="rect">
             <a:avLst/>
@@ -25768,7 +25758,7 @@
         <p:spPr>
           <a:xfrm>
             <a:off x="4848120" y="3749040"/>
-            <a:ext cx="3654360" cy="778680"/>
+            <a:ext cx="3654000" cy="778320"/>
           </a:xfrm>
           <a:prstGeom prst="rect">
             <a:avLst/>
@@ -25787,7 +25777,7 @@
         <p:spPr>
           <a:xfrm>
             <a:off x="6583680" y="4480560"/>
-            <a:ext cx="1369440" cy="272880"/>
+            <a:ext cx="1369080" cy="272520"/>
           </a:xfrm>
           <a:prstGeom prst="rect">
             <a:avLst/>
@@ -25836,7 +25826,7 @@
         <p:spPr>
           <a:xfrm>
             <a:off x="6767280" y="5138640"/>
-            <a:ext cx="1369440" cy="272880"/>
+            <a:ext cx="1369080" cy="272520"/>
           </a:xfrm>
           <a:prstGeom prst="rect">
             <a:avLst/>
@@ -25889,7 +25879,7 @@
         <p:spPr>
           <a:xfrm>
             <a:off x="5461920" y="947520"/>
-            <a:ext cx="3589200" cy="788400"/>
+            <a:ext cx="3588840" cy="788040"/>
           </a:xfrm>
           <a:prstGeom prst="rect">
             <a:avLst/>
@@ -25957,7 +25947,7 @@
         <p:spPr>
           <a:xfrm>
             <a:off x="365760" y="274320"/>
-            <a:ext cx="8317800" cy="815760"/>
+            <a:ext cx="8317440" cy="815400"/>
           </a:xfrm>
           <a:prstGeom prst="rect">
             <a:avLst/>
@@ -26006,7 +25996,7 @@
         <p:spPr>
           <a:xfrm>
             <a:off x="457200" y="1005840"/>
-            <a:ext cx="8134920" cy="4405680"/>
+            <a:ext cx="8134560" cy="4405320"/>
           </a:xfrm>
           <a:prstGeom prst="rect">
             <a:avLst/>
@@ -26519,7 +26509,7 @@
         <p:spPr>
           <a:xfrm>
             <a:off x="6675840" y="5412960"/>
-            <a:ext cx="1369440" cy="272880"/>
+            <a:ext cx="1369080" cy="272520"/>
           </a:xfrm>
           <a:prstGeom prst="rect">
             <a:avLst/>
@@ -26572,7 +26562,7 @@
         <p:spPr>
           <a:xfrm>
             <a:off x="4297680" y="3108960"/>
-            <a:ext cx="4838400" cy="1279440"/>
+            <a:ext cx="4838040" cy="1279080"/>
           </a:xfrm>
           <a:prstGeom prst="rect">
             <a:avLst/>
@@ -26591,7 +26581,7 @@
         <p:spPr>
           <a:xfrm>
             <a:off x="6492240" y="2926080"/>
-            <a:ext cx="1095120" cy="272880"/>
+            <a:ext cx="1094760" cy="272520"/>
           </a:xfrm>
           <a:prstGeom prst="rect">
             <a:avLst/>
@@ -26644,7 +26634,7 @@
         <p:spPr>
           <a:xfrm>
             <a:off x="5553360" y="914400"/>
-            <a:ext cx="3589200" cy="788400"/>
+            <a:ext cx="3588840" cy="788040"/>
           </a:xfrm>
           <a:prstGeom prst="rect">
             <a:avLst/>
@@ -26663,7 +26653,7 @@
         <p:spPr>
           <a:xfrm>
             <a:off x="5486400" y="1506600"/>
-            <a:ext cx="912240" cy="255960"/>
+            <a:ext cx="911880" cy="255600"/>
           </a:xfrm>
           <a:prstGeom prst="rect">
             <a:avLst/>
@@ -26712,7 +26702,7 @@
         <p:spPr>
           <a:xfrm>
             <a:off x="6950160" y="4206240"/>
-            <a:ext cx="1369440" cy="272880"/>
+            <a:ext cx="1369080" cy="272520"/>
           </a:xfrm>
           <a:prstGeom prst="rect">
             <a:avLst/>
@@ -26761,7 +26751,7 @@
         <p:spPr>
           <a:xfrm>
             <a:off x="3657600" y="5669280"/>
-            <a:ext cx="1369440" cy="272880"/>
+            <a:ext cx="1369080" cy="272520"/>
           </a:xfrm>
           <a:prstGeom prst="rect">
             <a:avLst/>
@@ -26814,7 +26804,7 @@
         <p:spPr>
           <a:xfrm>
             <a:off x="5486400" y="1977840"/>
-            <a:ext cx="3644280" cy="946800"/>
+            <a:ext cx="3643920" cy="946440"/>
           </a:xfrm>
           <a:prstGeom prst="rect">
             <a:avLst/>
@@ -26837,7 +26827,7 @@
         <p:spPr>
           <a:xfrm>
             <a:off x="4846320" y="4492440"/>
-            <a:ext cx="4254480" cy="535320"/>
+            <a:ext cx="4254120" cy="534960"/>
           </a:xfrm>
           <a:prstGeom prst="rect">
             <a:avLst/>
@@ -26860,7 +26850,7 @@
         <p:spPr>
           <a:xfrm>
             <a:off x="4572000" y="5262120"/>
-            <a:ext cx="4564080" cy="771480"/>
+            <a:ext cx="4563720" cy="771120"/>
           </a:xfrm>
           <a:prstGeom prst="rect">
             <a:avLst/>
@@ -26879,7 +26869,7 @@
         <p:spPr>
           <a:xfrm>
             <a:off x="5944320" y="4937760"/>
-            <a:ext cx="1369440" cy="272880"/>
+            <a:ext cx="1369080" cy="272520"/>
           </a:xfrm>
           <a:prstGeom prst="rect">
             <a:avLst/>

</xml_diff>